<commit_message>
added references in presentation
</commit_message>
<xml_diff>
--- a/Presentation.pptx
+++ b/Presentation.pptx
@@ -9,6 +9,7 @@
     <p:sldId id="257" r:id="rId3"/>
     <p:sldId id="259" r:id="rId4"/>
     <p:sldId id="258" r:id="rId5"/>
+    <p:sldId id="260" r:id="rId6"/>
   </p:sldIdLst>
   <p:sldSz cx="12192000" cy="6858000"/>
   <p:notesSz cx="6858000" cy="9144000"/>
@@ -107,6 +108,11 @@
       </a:defRPr>
     </a:lvl9pPr>
   </p:defaultTextStyle>
+  <p:extLst>
+    <p:ext uri="{EFAFB233-063F-42B5-8137-9DF3F51BA10A}">
+      <p15:sldGuideLst xmlns:p15="http://schemas.microsoft.com/office/powerpoint/2012/main"/>
+    </p:ext>
+  </p:extLst>
 </p:presentation>
 </file>
 
@@ -3717,6 +3723,102 @@
 </p:sld>
 </file>
 
+<file path=ppt/slides/slide5.xml><?xml version="1.0" encoding="utf-8"?>
+<p:sld xmlns:a="http://schemas.openxmlformats.org/drawingml/2006/main" xmlns:r="http://schemas.openxmlformats.org/officeDocument/2006/relationships" xmlns:p="http://schemas.openxmlformats.org/presentationml/2006/main">
+  <p:cSld>
+    <p:spTree>
+      <p:nvGrpSpPr>
+        <p:cNvPr id="1" name=""/>
+        <p:cNvGrpSpPr/>
+        <p:nvPr/>
+      </p:nvGrpSpPr>
+      <p:grpSpPr>
+        <a:xfrm>
+          <a:off x="0" y="0"/>
+          <a:ext cx="0" cy="0"/>
+          <a:chOff x="0" y="0"/>
+          <a:chExt cx="0" cy="0"/>
+        </a:xfrm>
+      </p:grpSpPr>
+      <p:sp>
+        <p:nvSpPr>
+          <p:cNvPr id="2" name="Title 1">
+            <a:extLst>
+              <a:ext uri="{FF2B5EF4-FFF2-40B4-BE49-F238E27FC236}">
+                <a16:creationId xmlns:a16="http://schemas.microsoft.com/office/drawing/2014/main" id="{D0089904-4842-4032-9617-1CD50B850D59}"/>
+              </a:ext>
+            </a:extLst>
+          </p:cNvPr>
+          <p:cNvSpPr>
+            <a:spLocks noGrp="1"/>
+          </p:cNvSpPr>
+          <p:nvPr>
+            <p:ph type="title"/>
+          </p:nvPr>
+        </p:nvSpPr>
+        <p:spPr/>
+        <p:txBody>
+          <a:bodyPr/>
+          <a:lstStyle/>
+          <a:p>
+            <a:r>
+              <a:rPr lang="en-US" dirty="0"/>
+              <a:t>References</a:t>
+            </a:r>
+          </a:p>
+        </p:txBody>
+      </p:sp>
+      <p:sp>
+        <p:nvSpPr>
+          <p:cNvPr id="3" name="Content Placeholder 2">
+            <a:extLst>
+              <a:ext uri="{FF2B5EF4-FFF2-40B4-BE49-F238E27FC236}">
+                <a16:creationId xmlns:a16="http://schemas.microsoft.com/office/drawing/2014/main" id="{6F013093-9DEF-47FB-84EE-2FD26C3A8AAE}"/>
+              </a:ext>
+            </a:extLst>
+          </p:cNvPr>
+          <p:cNvSpPr>
+            <a:spLocks noGrp="1"/>
+          </p:cNvSpPr>
+          <p:nvPr>
+            <p:ph idx="1"/>
+          </p:nvPr>
+        </p:nvSpPr>
+        <p:spPr/>
+        <p:txBody>
+          <a:bodyPr/>
+          <a:lstStyle/>
+          <a:p>
+            <a:r>
+              <a:rPr lang="en-US" dirty="0">
+                <a:hlinkClick r:id="rId2"/>
+              </a:rPr>
+              <a:t>https://julie-jiang.github.io/image-segmentation/</a:t>
+            </a:r>
+            <a:r>
+              <a:rPr lang="en-US" dirty="0"/>
+              <a:t> (useful explanation but same algorithms as those in prof. Brower’s </a:t>
+            </a:r>
+            <a:r>
+              <a:rPr lang="en-US"/>
+              <a:t>example presentation)</a:t>
+            </a:r>
+          </a:p>
+        </p:txBody>
+      </p:sp>
+    </p:spTree>
+    <p:extLst>
+      <p:ext uri="{BB962C8B-B14F-4D97-AF65-F5344CB8AC3E}">
+        <p14:creationId xmlns:p14="http://schemas.microsoft.com/office/powerpoint/2010/main" val="135493772"/>
+      </p:ext>
+    </p:extLst>
+  </p:cSld>
+  <p:clrMapOvr>
+    <a:masterClrMapping/>
+  </p:clrMapOvr>
+</p:sld>
+</file>
+
 <file path=ppt/theme/theme1.xml><?xml version="1.0" encoding="utf-8"?>
 <a:theme xmlns:a="http://schemas.openxmlformats.org/drawingml/2006/main" name="Office Theme">
   <a:themeElements>

</xml_diff>

<commit_message>
added OpenCV Python watershed and resulting images
</commit_message>
<xml_diff>
--- a/Presentation.pptx
+++ b/Presentation.pptx
@@ -263,7 +263,7 @@
           <a:p>
             <a:fld id="{98846C37-832A-41D8-B186-521B871AA37A}" type="datetimeFigureOut">
               <a:rPr lang="en-US" smtClean="0"/>
-              <a:t>11/16/2021</a:t>
+              <a:t>11/17/2021</a:t>
             </a:fld>
             <a:endParaRPr lang="en-US"/>
           </a:p>
@@ -461,7 +461,7 @@
           <a:p>
             <a:fld id="{98846C37-832A-41D8-B186-521B871AA37A}" type="datetimeFigureOut">
               <a:rPr lang="en-US" smtClean="0"/>
-              <a:t>11/16/2021</a:t>
+              <a:t>11/17/2021</a:t>
             </a:fld>
             <a:endParaRPr lang="en-US"/>
           </a:p>
@@ -669,7 +669,7 @@
           <a:p>
             <a:fld id="{98846C37-832A-41D8-B186-521B871AA37A}" type="datetimeFigureOut">
               <a:rPr lang="en-US" smtClean="0"/>
-              <a:t>11/16/2021</a:t>
+              <a:t>11/17/2021</a:t>
             </a:fld>
             <a:endParaRPr lang="en-US"/>
           </a:p>
@@ -867,7 +867,7 @@
           <a:p>
             <a:fld id="{98846C37-832A-41D8-B186-521B871AA37A}" type="datetimeFigureOut">
               <a:rPr lang="en-US" smtClean="0"/>
-              <a:t>11/16/2021</a:t>
+              <a:t>11/17/2021</a:t>
             </a:fld>
             <a:endParaRPr lang="en-US"/>
           </a:p>
@@ -1142,7 +1142,7 @@
           <a:p>
             <a:fld id="{98846C37-832A-41D8-B186-521B871AA37A}" type="datetimeFigureOut">
               <a:rPr lang="en-US" smtClean="0"/>
-              <a:t>11/16/2021</a:t>
+              <a:t>11/17/2021</a:t>
             </a:fld>
             <a:endParaRPr lang="en-US"/>
           </a:p>
@@ -1407,7 +1407,7 @@
           <a:p>
             <a:fld id="{98846C37-832A-41D8-B186-521B871AA37A}" type="datetimeFigureOut">
               <a:rPr lang="en-US" smtClean="0"/>
-              <a:t>11/16/2021</a:t>
+              <a:t>11/17/2021</a:t>
             </a:fld>
             <a:endParaRPr lang="en-US"/>
           </a:p>
@@ -1819,7 +1819,7 @@
           <a:p>
             <a:fld id="{98846C37-832A-41D8-B186-521B871AA37A}" type="datetimeFigureOut">
               <a:rPr lang="en-US" smtClean="0"/>
-              <a:t>11/16/2021</a:t>
+              <a:t>11/17/2021</a:t>
             </a:fld>
             <a:endParaRPr lang="en-US"/>
           </a:p>
@@ -1960,7 +1960,7 @@
           <a:p>
             <a:fld id="{98846C37-832A-41D8-B186-521B871AA37A}" type="datetimeFigureOut">
               <a:rPr lang="en-US" smtClean="0"/>
-              <a:t>11/16/2021</a:t>
+              <a:t>11/17/2021</a:t>
             </a:fld>
             <a:endParaRPr lang="en-US"/>
           </a:p>
@@ -2073,7 +2073,7 @@
           <a:p>
             <a:fld id="{98846C37-832A-41D8-B186-521B871AA37A}" type="datetimeFigureOut">
               <a:rPr lang="en-US" smtClean="0"/>
-              <a:t>11/16/2021</a:t>
+              <a:t>11/17/2021</a:t>
             </a:fld>
             <a:endParaRPr lang="en-US"/>
           </a:p>
@@ -2384,7 +2384,7 @@
           <a:p>
             <a:fld id="{98846C37-832A-41D8-B186-521B871AA37A}" type="datetimeFigureOut">
               <a:rPr lang="en-US" smtClean="0"/>
-              <a:t>11/16/2021</a:t>
+              <a:t>11/17/2021</a:t>
             </a:fld>
             <a:endParaRPr lang="en-US"/>
           </a:p>
@@ -2672,7 +2672,7 @@
           <a:p>
             <a:fld id="{98846C37-832A-41D8-B186-521B871AA37A}" type="datetimeFigureOut">
               <a:rPr lang="en-US" smtClean="0"/>
-              <a:t>11/16/2021</a:t>
+              <a:t>11/17/2021</a:t>
             </a:fld>
             <a:endParaRPr lang="en-US"/>
           </a:p>
@@ -2913,7 +2913,7 @@
           <a:p>
             <a:fld id="{98846C37-832A-41D8-B186-521B871AA37A}" type="datetimeFigureOut">
               <a:rPr lang="en-US" smtClean="0"/>
-              <a:t>11/16/2021</a:t>
+              <a:t>11/17/2021</a:t>
             </a:fld>
             <a:endParaRPr lang="en-US"/>
           </a:p>
@@ -3706,7 +3706,10 @@
           <a:bodyPr/>
           <a:lstStyle/>
           <a:p>
-            <a:endParaRPr lang="en-US"/>
+            <a:r>
+              <a:rPr lang="en-US"/>
+              <a:t>OpenCV Python, C++</a:t>
+            </a:r>
           </a:p>
         </p:txBody>
       </p:sp>

</xml_diff>

<commit_message>
change presentation to Darren's version
</commit_message>
<xml_diff>
--- a/Presentation.pptx
+++ b/Presentation.pptx
@@ -6,10 +6,12 @@
   </p:sldMasterIdLst>
   <p:sldIdLst>
     <p:sldId id="256" r:id="rId2"/>
-    <p:sldId id="257" r:id="rId3"/>
-    <p:sldId id="259" r:id="rId4"/>
-    <p:sldId id="258" r:id="rId5"/>
-    <p:sldId id="260" r:id="rId6"/>
+    <p:sldId id="262" r:id="rId3"/>
+    <p:sldId id="263" r:id="rId4"/>
+    <p:sldId id="257" r:id="rId5"/>
+    <p:sldId id="259" r:id="rId6"/>
+    <p:sldId id="258" r:id="rId7"/>
+    <p:sldId id="260" r:id="rId8"/>
   </p:sldIdLst>
   <p:sldSz cx="12192000" cy="6858000"/>
   <p:notesSz cx="6858000" cy="9144000"/>
@@ -3402,6 +3404,14 @@
 <file path=ppt/slides/slide2.xml><?xml version="1.0" encoding="utf-8"?>
 <p:sld xmlns:a="http://schemas.openxmlformats.org/drawingml/2006/main" xmlns:r="http://schemas.openxmlformats.org/officeDocument/2006/relationships" xmlns:p="http://schemas.openxmlformats.org/presentationml/2006/main">
   <p:cSld>
+    <p:bg>
+      <p:bgPr>
+        <a:solidFill>
+          <a:schemeClr val="bg1"/>
+        </a:solidFill>
+        <a:effectLst/>
+      </p:bgPr>
+    </p:bg>
     <p:spTree>
       <p:nvGrpSpPr>
         <p:cNvPr id="1" name=""/>
@@ -3416,12 +3426,135 @@
           <a:chExt cx="0" cy="0"/>
         </a:xfrm>
       </p:grpSpPr>
+      <p:sp useBgFill="1">
+        <p:nvSpPr>
+          <p:cNvPr id="135" name="Rectangle 134">
+            <a:extLst>
+              <a:ext uri="{FF2B5EF4-FFF2-40B4-BE49-F238E27FC236}">
+                <a16:creationId xmlns:a16="http://schemas.microsoft.com/office/drawing/2014/main" id="{33CD251C-A887-4D2F-925B-FC097198538B}"/>
+              </a:ext>
+              <a:ext uri="{C183D7F6-B498-43B3-948B-1728B52AA6E4}">
+                <adec:decorative xmlns:adec="http://schemas.microsoft.com/office/drawing/2017/decorative" val="1"/>
+              </a:ext>
+            </a:extLst>
+          </p:cNvPr>
+          <p:cNvSpPr>
+            <a:spLocks noGrp="1" noRot="1" noChangeAspect="1" noMove="1" noResize="1" noEditPoints="1" noAdjustHandles="1" noChangeArrowheads="1" noChangeShapeType="1" noTextEdit="1"/>
+          </p:cNvSpPr>
+          <p:nvPr>
+            <p:extLst>
+              <p:ext uri="{386F3935-93C4-4BCD-93E2-E3B085C9AB24}">
+                <p16:designElem xmlns:p16="http://schemas.microsoft.com/office/powerpoint/2015/main" val="1"/>
+              </p:ext>
+            </p:extLst>
+          </p:nvPr>
+        </p:nvSpPr>
+        <p:spPr>
+          <a:xfrm>
+            <a:off x="0" y="0"/>
+            <a:ext cx="12192000" cy="6858000"/>
+          </a:xfrm>
+          <a:prstGeom prst="rect">
+            <a:avLst/>
+          </a:prstGeom>
+          <a:ln>
+            <a:noFill/>
+          </a:ln>
+        </p:spPr>
+        <p:style>
+          <a:lnRef idx="2">
+            <a:schemeClr val="accent1">
+              <a:shade val="50000"/>
+            </a:schemeClr>
+          </a:lnRef>
+          <a:fillRef idx="1">
+            <a:schemeClr val="accent1"/>
+          </a:fillRef>
+          <a:effectRef idx="0">
+            <a:schemeClr val="accent1"/>
+          </a:effectRef>
+          <a:fontRef idx="minor">
+            <a:schemeClr val="lt1"/>
+          </a:fontRef>
+        </p:style>
+        <p:txBody>
+          <a:bodyPr rtlCol="0" anchor="ctr"/>
+          <a:lstStyle/>
+          <a:p>
+            <a:pPr algn="ctr"/>
+            <a:endParaRPr lang="en-US"/>
+          </a:p>
+        </p:txBody>
+      </p:sp>
+      <p:sp>
+        <p:nvSpPr>
+          <p:cNvPr id="137" name="Rectangle 136">
+            <a:extLst>
+              <a:ext uri="{FF2B5EF4-FFF2-40B4-BE49-F238E27FC236}">
+                <a16:creationId xmlns:a16="http://schemas.microsoft.com/office/drawing/2014/main" id="{B19D093C-27FB-4032-B282-42C4563F257C}"/>
+              </a:ext>
+              <a:ext uri="{C183D7F6-B498-43B3-948B-1728B52AA6E4}">
+                <adec:decorative xmlns:adec="http://schemas.microsoft.com/office/drawing/2017/decorative" val="1"/>
+              </a:ext>
+            </a:extLst>
+          </p:cNvPr>
+          <p:cNvSpPr>
+            <a:spLocks noGrp="1" noRot="1" noChangeAspect="1" noMove="1" noResize="1" noEditPoints="1" noAdjustHandles="1" noChangeArrowheads="1" noChangeShapeType="1" noTextEdit="1"/>
+          </p:cNvSpPr>
+          <p:nvPr>
+            <p:extLst>
+              <p:ext uri="{386F3935-93C4-4BCD-93E2-E3B085C9AB24}">
+                <p16:designElem xmlns:p16="http://schemas.microsoft.com/office/powerpoint/2015/main" val="1"/>
+              </p:ext>
+            </p:extLst>
+          </p:nvPr>
+        </p:nvSpPr>
+        <p:spPr>
+          <a:xfrm>
+            <a:off x="0" y="0"/>
+            <a:ext cx="4694548" cy="6858000"/>
+          </a:xfrm>
+          <a:prstGeom prst="rect">
+            <a:avLst/>
+          </a:prstGeom>
+          <a:solidFill>
+            <a:schemeClr val="tx1"/>
+          </a:solidFill>
+          <a:ln>
+            <a:noFill/>
+          </a:ln>
+        </p:spPr>
+        <p:style>
+          <a:lnRef idx="2">
+            <a:schemeClr val="accent1">
+              <a:shade val="50000"/>
+            </a:schemeClr>
+          </a:lnRef>
+          <a:fillRef idx="1">
+            <a:schemeClr val="accent1"/>
+          </a:fillRef>
+          <a:effectRef idx="0">
+            <a:schemeClr val="accent1"/>
+          </a:effectRef>
+          <a:fontRef idx="minor">
+            <a:schemeClr val="lt1"/>
+          </a:fontRef>
+        </p:style>
+        <p:txBody>
+          <a:bodyPr rtlCol="0" anchor="ctr"/>
+          <a:lstStyle/>
+          <a:p>
+            <a:pPr algn="ctr"/>
+            <a:endParaRPr lang="en-US"/>
+          </a:p>
+        </p:txBody>
+      </p:sp>
       <p:sp>
         <p:nvSpPr>
           <p:cNvPr id="2" name="Title 1">
             <a:extLst>
               <a:ext uri="{FF2B5EF4-FFF2-40B4-BE49-F238E27FC236}">
-                <a16:creationId xmlns:a16="http://schemas.microsoft.com/office/drawing/2014/main" id="{8FC5E55B-6F10-4279-8A60-28F7BFA6F1D2}"/>
+                <a16:creationId xmlns:a16="http://schemas.microsoft.com/office/drawing/2014/main" id="{9200BA96-8C2E-42A8-BD1A-F04E623212EF}"/>
               </a:ext>
             </a:extLst>
           </p:cNvPr>
@@ -3432,114 +3565,559 @@
             <p:ph type="title"/>
           </p:nvPr>
         </p:nvSpPr>
-        <p:spPr/>
-        <p:txBody>
-          <a:bodyPr/>
+        <p:spPr>
+          <a:xfrm>
+            <a:off x="767290" y="1780661"/>
+            <a:ext cx="3582073" cy="1463472"/>
+          </a:xfrm>
+        </p:spPr>
+        <p:txBody>
+          <a:bodyPr vert="horz" lIns="91440" tIns="45720" rIns="91440" bIns="45720" rtlCol="0" anchor="t">
+            <a:normAutofit/>
+          </a:bodyPr>
+          <a:lstStyle/>
+          <a:p>
+            <a:r>
+              <a:rPr lang="en-US" sz="3000" kern="1200" dirty="0">
+                <a:solidFill>
+                  <a:schemeClr val="bg1"/>
+                </a:solidFill>
+                <a:latin typeface="+mj-lt"/>
+                <a:ea typeface="+mj-ea"/>
+                <a:cs typeface="+mj-cs"/>
+              </a:rPr>
+              <a:t>What is Image Segmentation?</a:t>
+            </a:r>
+          </a:p>
+        </p:txBody>
+      </p:sp>
+      <p:grpSp>
+        <p:nvGrpSpPr>
+          <p:cNvPr id="139" name="Group 138">
+            <a:extLst>
+              <a:ext uri="{FF2B5EF4-FFF2-40B4-BE49-F238E27FC236}">
+                <a16:creationId xmlns:a16="http://schemas.microsoft.com/office/drawing/2014/main" id="{35EE815E-1BD3-4777-B652-6D98825BF66B}"/>
+              </a:ext>
+              <a:ext uri="{C183D7F6-B498-43B3-948B-1728B52AA6E4}">
+                <adec:decorative xmlns:adec="http://schemas.microsoft.com/office/drawing/2017/decorative" val="1"/>
+              </a:ext>
+            </a:extLst>
+          </p:cNvPr>
+          <p:cNvGrpSpPr>
+            <a:grpSpLocks noGrp="1" noUngrp="1" noRot="1" noChangeAspect="1" noMove="1" noResize="1"/>
+          </p:cNvGrpSpPr>
+          <p:nvPr>
+            <p:extLst>
+              <p:ext uri="{386F3935-93C4-4BCD-93E2-E3B085C9AB24}">
+                <p16:designElem xmlns:p16="http://schemas.microsoft.com/office/powerpoint/2015/main" val="1"/>
+              </p:ext>
+            </p:extLst>
+          </p:nvPr>
+        </p:nvGrpSpPr>
+        <p:grpSpPr>
+          <a:xfrm>
+            <a:off x="767290" y="681628"/>
+            <a:ext cx="1128382" cy="847206"/>
+            <a:chOff x="668003" y="1684057"/>
+            <a:chExt cx="1128382" cy="847206"/>
+          </a:xfrm>
+        </p:grpSpPr>
+        <p:sp>
+          <p:nvSpPr>
+            <p:cNvPr id="140" name="Freeform 5">
+              <a:extLst>
+                <a:ext uri="{FF2B5EF4-FFF2-40B4-BE49-F238E27FC236}">
+                  <a16:creationId xmlns:a16="http://schemas.microsoft.com/office/drawing/2014/main" id="{E6692982-4A7D-4392-87CD-F0CD4B027DDE}"/>
+                </a:ext>
+                <a:ext uri="{C183D7F6-B498-43B3-948B-1728B52AA6E4}">
+                  <adec:decorative xmlns:adec="http://schemas.microsoft.com/office/drawing/2017/decorative" val="1"/>
+                </a:ext>
+              </a:extLst>
+            </p:cNvPr>
+            <p:cNvSpPr>
+              <a:spLocks/>
+            </p:cNvSpPr>
+            <p:nvPr>
+              <p:extLst>
+                <p:ext uri="{386F3935-93C4-4BCD-93E2-E3B085C9AB24}">
+                  <p16:designElem xmlns:p16="http://schemas.microsoft.com/office/powerpoint/2015/main" val="1"/>
+                </p:ext>
+              </p:extLst>
+            </p:nvPr>
+          </p:nvSpPr>
+          <p:spPr bwMode="auto">
+            <a:xfrm>
+              <a:off x="668003" y="1935883"/>
+              <a:ext cx="675351" cy="595380"/>
+            </a:xfrm>
+            <a:custGeom>
+              <a:avLst/>
+              <a:gdLst>
+                <a:gd name="T0" fmla="*/ 225 w 785"/>
+                <a:gd name="T1" fmla="*/ 692 h 692"/>
+                <a:gd name="T2" fmla="*/ 177 w 785"/>
+                <a:gd name="T3" fmla="*/ 665 h 692"/>
+                <a:gd name="T4" fmla="*/ 9 w 785"/>
+                <a:gd name="T5" fmla="*/ 374 h 692"/>
+                <a:gd name="T6" fmla="*/ 9 w 785"/>
+                <a:gd name="T7" fmla="*/ 318 h 692"/>
+                <a:gd name="T8" fmla="*/ 177 w 785"/>
+                <a:gd name="T9" fmla="*/ 27 h 692"/>
+                <a:gd name="T10" fmla="*/ 225 w 785"/>
+                <a:gd name="T11" fmla="*/ 0 h 692"/>
+                <a:gd name="T12" fmla="*/ 561 w 785"/>
+                <a:gd name="T13" fmla="*/ 0 h 692"/>
+                <a:gd name="T14" fmla="*/ 609 w 785"/>
+                <a:gd name="T15" fmla="*/ 27 h 692"/>
+                <a:gd name="T16" fmla="*/ 777 w 785"/>
+                <a:gd name="T17" fmla="*/ 318 h 692"/>
+                <a:gd name="T18" fmla="*/ 777 w 785"/>
+                <a:gd name="T19" fmla="*/ 374 h 692"/>
+                <a:gd name="T20" fmla="*/ 609 w 785"/>
+                <a:gd name="T21" fmla="*/ 665 h 692"/>
+                <a:gd name="T22" fmla="*/ 561 w 785"/>
+                <a:gd name="T23" fmla="*/ 692 h 692"/>
+                <a:gd name="T24" fmla="*/ 225 w 785"/>
+                <a:gd name="T25" fmla="*/ 692 h 692"/>
+              </a:gdLst>
+              <a:ahLst/>
+              <a:cxnLst>
+                <a:cxn ang="0">
+                  <a:pos x="T0" y="T1"/>
+                </a:cxn>
+                <a:cxn ang="0">
+                  <a:pos x="T2" y="T3"/>
+                </a:cxn>
+                <a:cxn ang="0">
+                  <a:pos x="T4" y="T5"/>
+                </a:cxn>
+                <a:cxn ang="0">
+                  <a:pos x="T6" y="T7"/>
+                </a:cxn>
+                <a:cxn ang="0">
+                  <a:pos x="T8" y="T9"/>
+                </a:cxn>
+                <a:cxn ang="0">
+                  <a:pos x="T10" y="T11"/>
+                </a:cxn>
+                <a:cxn ang="0">
+                  <a:pos x="T12" y="T13"/>
+                </a:cxn>
+                <a:cxn ang="0">
+                  <a:pos x="T14" y="T15"/>
+                </a:cxn>
+                <a:cxn ang="0">
+                  <a:pos x="T16" y="T17"/>
+                </a:cxn>
+                <a:cxn ang="0">
+                  <a:pos x="T18" y="T19"/>
+                </a:cxn>
+                <a:cxn ang="0">
+                  <a:pos x="T20" y="T21"/>
+                </a:cxn>
+                <a:cxn ang="0">
+                  <a:pos x="T22" y="T23"/>
+                </a:cxn>
+                <a:cxn ang="0">
+                  <a:pos x="T24" y="T25"/>
+                </a:cxn>
+              </a:cxnLst>
+              <a:rect l="0" t="0" r="r" b="b"/>
+              <a:pathLst>
+                <a:path w="785" h="692">
+                  <a:moveTo>
+                    <a:pt x="225" y="692"/>
+                  </a:moveTo>
+                  <a:cubicBezTo>
+                    <a:pt x="207" y="692"/>
+                    <a:pt x="185" y="680"/>
+                    <a:pt x="177" y="665"/>
+                  </a:cubicBezTo>
+                  <a:cubicBezTo>
+                    <a:pt x="9" y="374"/>
+                    <a:pt x="9" y="374"/>
+                    <a:pt x="9" y="374"/>
+                  </a:cubicBezTo>
+                  <a:cubicBezTo>
+                    <a:pt x="0" y="358"/>
+                    <a:pt x="0" y="334"/>
+                    <a:pt x="9" y="318"/>
+                  </a:cubicBezTo>
+                  <a:cubicBezTo>
+                    <a:pt x="177" y="27"/>
+                    <a:pt x="177" y="27"/>
+                    <a:pt x="177" y="27"/>
+                  </a:cubicBezTo>
+                  <a:cubicBezTo>
+                    <a:pt x="185" y="12"/>
+                    <a:pt x="207" y="0"/>
+                    <a:pt x="225" y="0"/>
+                  </a:cubicBezTo>
+                  <a:cubicBezTo>
+                    <a:pt x="561" y="0"/>
+                    <a:pt x="561" y="0"/>
+                    <a:pt x="561" y="0"/>
+                  </a:cubicBezTo>
+                  <a:cubicBezTo>
+                    <a:pt x="578" y="0"/>
+                    <a:pt x="600" y="12"/>
+                    <a:pt x="609" y="27"/>
+                  </a:cubicBezTo>
+                  <a:cubicBezTo>
+                    <a:pt x="777" y="318"/>
+                    <a:pt x="777" y="318"/>
+                    <a:pt x="777" y="318"/>
+                  </a:cubicBezTo>
+                  <a:cubicBezTo>
+                    <a:pt x="785" y="334"/>
+                    <a:pt x="785" y="358"/>
+                    <a:pt x="777" y="374"/>
+                  </a:cubicBezTo>
+                  <a:cubicBezTo>
+                    <a:pt x="609" y="665"/>
+                    <a:pt x="609" y="665"/>
+                    <a:pt x="609" y="665"/>
+                  </a:cubicBezTo>
+                  <a:cubicBezTo>
+                    <a:pt x="600" y="680"/>
+                    <a:pt x="578" y="692"/>
+                    <a:pt x="561" y="692"/>
+                  </a:cubicBezTo>
+                  <a:lnTo>
+                    <a:pt x="225" y="692"/>
+                  </a:lnTo>
+                  <a:close/>
+                </a:path>
+              </a:pathLst>
+            </a:custGeom>
+            <a:noFill/>
+            <a:ln w="28575" cmpd="sng">
+              <a:solidFill>
+                <a:schemeClr val="bg1"/>
+              </a:solidFill>
+            </a:ln>
+          </p:spPr>
+          <p:txBody>
+            <a:bodyPr vert="horz" wrap="square" lIns="91440" tIns="45720" rIns="91440" bIns="45720" numCol="1" anchor="t" anchorCtr="0" compatLnSpc="1">
+              <a:prstTxWarp prst="textNoShape">
+                <a:avLst/>
+              </a:prstTxWarp>
+            </a:bodyPr>
+            <a:lstStyle/>
+            <a:p>
+              <a:endParaRPr lang="en-US"/>
+            </a:p>
+          </p:txBody>
+        </p:sp>
+        <p:sp>
+          <p:nvSpPr>
+            <p:cNvPr id="141" name="Freeform 5">
+              <a:extLst>
+                <a:ext uri="{FF2B5EF4-FFF2-40B4-BE49-F238E27FC236}">
+                  <a16:creationId xmlns:a16="http://schemas.microsoft.com/office/drawing/2014/main" id="{196485F7-F277-4123-AC53-98EA4C858774}"/>
+                </a:ext>
+                <a:ext uri="{C183D7F6-B498-43B3-948B-1728B52AA6E4}">
+                  <adec:decorative xmlns:adec="http://schemas.microsoft.com/office/drawing/2017/decorative" val="1"/>
+                </a:ext>
+              </a:extLst>
+            </p:cNvPr>
+            <p:cNvSpPr>
+              <a:spLocks/>
+            </p:cNvSpPr>
+            <p:nvPr>
+              <p:extLst>
+                <p:ext uri="{386F3935-93C4-4BCD-93E2-E3B085C9AB24}">
+                  <p16:designElem xmlns:p16="http://schemas.microsoft.com/office/powerpoint/2015/main" val="1"/>
+                </p:ext>
+              </p:extLst>
+            </p:nvPr>
+          </p:nvSpPr>
+          <p:spPr bwMode="auto">
+            <a:xfrm>
+              <a:off x="1245893" y="1684057"/>
+              <a:ext cx="550492" cy="485306"/>
+            </a:xfrm>
+            <a:custGeom>
+              <a:avLst/>
+              <a:gdLst>
+                <a:gd name="T0" fmla="*/ 225 w 785"/>
+                <a:gd name="T1" fmla="*/ 692 h 692"/>
+                <a:gd name="T2" fmla="*/ 177 w 785"/>
+                <a:gd name="T3" fmla="*/ 665 h 692"/>
+                <a:gd name="T4" fmla="*/ 9 w 785"/>
+                <a:gd name="T5" fmla="*/ 374 h 692"/>
+                <a:gd name="T6" fmla="*/ 9 w 785"/>
+                <a:gd name="T7" fmla="*/ 318 h 692"/>
+                <a:gd name="T8" fmla="*/ 177 w 785"/>
+                <a:gd name="T9" fmla="*/ 27 h 692"/>
+                <a:gd name="T10" fmla="*/ 225 w 785"/>
+                <a:gd name="T11" fmla="*/ 0 h 692"/>
+                <a:gd name="T12" fmla="*/ 561 w 785"/>
+                <a:gd name="T13" fmla="*/ 0 h 692"/>
+                <a:gd name="T14" fmla="*/ 609 w 785"/>
+                <a:gd name="T15" fmla="*/ 27 h 692"/>
+                <a:gd name="T16" fmla="*/ 777 w 785"/>
+                <a:gd name="T17" fmla="*/ 318 h 692"/>
+                <a:gd name="T18" fmla="*/ 777 w 785"/>
+                <a:gd name="T19" fmla="*/ 374 h 692"/>
+                <a:gd name="T20" fmla="*/ 609 w 785"/>
+                <a:gd name="T21" fmla="*/ 665 h 692"/>
+                <a:gd name="T22" fmla="*/ 561 w 785"/>
+                <a:gd name="T23" fmla="*/ 692 h 692"/>
+                <a:gd name="T24" fmla="*/ 225 w 785"/>
+                <a:gd name="T25" fmla="*/ 692 h 692"/>
+              </a:gdLst>
+              <a:ahLst/>
+              <a:cxnLst>
+                <a:cxn ang="0">
+                  <a:pos x="T0" y="T1"/>
+                </a:cxn>
+                <a:cxn ang="0">
+                  <a:pos x="T2" y="T3"/>
+                </a:cxn>
+                <a:cxn ang="0">
+                  <a:pos x="T4" y="T5"/>
+                </a:cxn>
+                <a:cxn ang="0">
+                  <a:pos x="T6" y="T7"/>
+                </a:cxn>
+                <a:cxn ang="0">
+                  <a:pos x="T8" y="T9"/>
+                </a:cxn>
+                <a:cxn ang="0">
+                  <a:pos x="T10" y="T11"/>
+                </a:cxn>
+                <a:cxn ang="0">
+                  <a:pos x="T12" y="T13"/>
+                </a:cxn>
+                <a:cxn ang="0">
+                  <a:pos x="T14" y="T15"/>
+                </a:cxn>
+                <a:cxn ang="0">
+                  <a:pos x="T16" y="T17"/>
+                </a:cxn>
+                <a:cxn ang="0">
+                  <a:pos x="T18" y="T19"/>
+                </a:cxn>
+                <a:cxn ang="0">
+                  <a:pos x="T20" y="T21"/>
+                </a:cxn>
+                <a:cxn ang="0">
+                  <a:pos x="T22" y="T23"/>
+                </a:cxn>
+                <a:cxn ang="0">
+                  <a:pos x="T24" y="T25"/>
+                </a:cxn>
+              </a:cxnLst>
+              <a:rect l="0" t="0" r="r" b="b"/>
+              <a:pathLst>
+                <a:path w="785" h="692">
+                  <a:moveTo>
+                    <a:pt x="225" y="692"/>
+                  </a:moveTo>
+                  <a:cubicBezTo>
+                    <a:pt x="207" y="692"/>
+                    <a:pt x="185" y="680"/>
+                    <a:pt x="177" y="665"/>
+                  </a:cubicBezTo>
+                  <a:cubicBezTo>
+                    <a:pt x="9" y="374"/>
+                    <a:pt x="9" y="374"/>
+                    <a:pt x="9" y="374"/>
+                  </a:cubicBezTo>
+                  <a:cubicBezTo>
+                    <a:pt x="0" y="358"/>
+                    <a:pt x="0" y="334"/>
+                    <a:pt x="9" y="318"/>
+                  </a:cubicBezTo>
+                  <a:cubicBezTo>
+                    <a:pt x="177" y="27"/>
+                    <a:pt x="177" y="27"/>
+                    <a:pt x="177" y="27"/>
+                  </a:cubicBezTo>
+                  <a:cubicBezTo>
+                    <a:pt x="185" y="12"/>
+                    <a:pt x="207" y="0"/>
+                    <a:pt x="225" y="0"/>
+                  </a:cubicBezTo>
+                  <a:cubicBezTo>
+                    <a:pt x="561" y="0"/>
+                    <a:pt x="561" y="0"/>
+                    <a:pt x="561" y="0"/>
+                  </a:cubicBezTo>
+                  <a:cubicBezTo>
+                    <a:pt x="578" y="0"/>
+                    <a:pt x="600" y="12"/>
+                    <a:pt x="609" y="27"/>
+                  </a:cubicBezTo>
+                  <a:cubicBezTo>
+                    <a:pt x="777" y="318"/>
+                    <a:pt x="777" y="318"/>
+                    <a:pt x="777" y="318"/>
+                  </a:cubicBezTo>
+                  <a:cubicBezTo>
+                    <a:pt x="785" y="334"/>
+                    <a:pt x="785" y="358"/>
+                    <a:pt x="777" y="374"/>
+                  </a:cubicBezTo>
+                  <a:cubicBezTo>
+                    <a:pt x="609" y="665"/>
+                    <a:pt x="609" y="665"/>
+                    <a:pt x="609" y="665"/>
+                  </a:cubicBezTo>
+                  <a:cubicBezTo>
+                    <a:pt x="600" y="680"/>
+                    <a:pt x="578" y="692"/>
+                    <a:pt x="561" y="692"/>
+                  </a:cubicBezTo>
+                  <a:lnTo>
+                    <a:pt x="225" y="692"/>
+                  </a:lnTo>
+                  <a:close/>
+                </a:path>
+              </a:pathLst>
+            </a:custGeom>
+            <a:noFill/>
+            <a:ln w="28575" cmpd="sng">
+              <a:solidFill>
+                <a:schemeClr val="bg1"/>
+              </a:solidFill>
+            </a:ln>
+          </p:spPr>
+          <p:txBody>
+            <a:bodyPr vert="horz" wrap="square" lIns="91440" tIns="45720" rIns="91440" bIns="45720" numCol="1" anchor="t" anchorCtr="0" compatLnSpc="1">
+              <a:prstTxWarp prst="textNoShape">
+                <a:avLst/>
+              </a:prstTxWarp>
+            </a:bodyPr>
+            <a:lstStyle/>
+            <a:p>
+              <a:endParaRPr lang="en-US"/>
+            </a:p>
+          </p:txBody>
+        </p:sp>
+      </p:grpSp>
+      <p:sp>
+        <p:nvSpPr>
+          <p:cNvPr id="3" name="Content Placeholder 2">
+            <a:extLst>
+              <a:ext uri="{FF2B5EF4-FFF2-40B4-BE49-F238E27FC236}">
+                <a16:creationId xmlns:a16="http://schemas.microsoft.com/office/drawing/2014/main" id="{0C46788F-37B7-400B-AC0E-E4E33E027B90}"/>
+              </a:ext>
+            </a:extLst>
+          </p:cNvPr>
+          <p:cNvSpPr>
+            <a:spLocks noGrp="1"/>
+          </p:cNvSpPr>
+          <p:nvPr>
+            <p:ph sz="half" idx="1"/>
+          </p:nvPr>
+        </p:nvSpPr>
+        <p:spPr>
+          <a:xfrm>
+            <a:off x="767290" y="3383121"/>
+            <a:ext cx="3582072" cy="2793251"/>
+          </a:xfrm>
+        </p:spPr>
+        <p:txBody>
+          <a:bodyPr vert="horz" lIns="91440" tIns="45720" rIns="91440" bIns="45720" rtlCol="0" anchor="t">
+            <a:normAutofit/>
+          </a:bodyPr>
+          <a:lstStyle/>
+          <a:p>
+            <a:pPr marL="0" indent="0">
+              <a:buNone/>
+            </a:pPr>
+            <a:r>
+              <a:rPr lang="en-US" sz="2000" dirty="0">
+                <a:solidFill>
+                  <a:schemeClr val="bg1"/>
+                </a:solidFill>
+              </a:rPr>
+              <a:t>Image segmentation aims to group similar regions or segments of an image under their respective class labels or masks, combining classification and localization.</a:t>
+            </a:r>
+          </a:p>
+        </p:txBody>
+      </p:sp>
+      <p:pic>
+        <p:nvPicPr>
+          <p:cNvPr id="1026" name="Picture 2" descr="A comparison between image classification, localization, object detection and instance segmentation">
+            <a:extLst>
+              <a:ext uri="{FF2B5EF4-FFF2-40B4-BE49-F238E27FC236}">
+                <a16:creationId xmlns:a16="http://schemas.microsoft.com/office/drawing/2014/main" id="{B8EB10AE-B4B0-420F-89DF-6F2655405B4D}"/>
+              </a:ext>
+            </a:extLst>
+          </p:cNvPr>
+          <p:cNvPicPr>
+            <a:picLocks noGrp="1" noChangeAspect="1" noChangeArrowheads="1"/>
+          </p:cNvPicPr>
+          <p:nvPr>
+            <p:ph sz="half" idx="2"/>
+          </p:nvPr>
+        </p:nvPicPr>
+        <p:blipFill>
+          <a:blip r:embed="rId2">
+            <a:extLst>
+              <a:ext uri="{28A0092B-C50C-407E-A947-70E740481C1C}">
+                <a14:useLocalDpi xmlns:a14="http://schemas.microsoft.com/office/drawing/2010/main" val="0"/>
+              </a:ext>
+            </a:extLst>
+          </a:blip>
+          <a:stretch>
+            <a:fillRect/>
+          </a:stretch>
+        </p:blipFill>
+        <p:spPr bwMode="auto">
+          <a:xfrm>
+            <a:off x="5116652" y="1072396"/>
+            <a:ext cx="6642532" cy="4134975"/>
+          </a:xfrm>
+          <a:prstGeom prst="rect">
+            <a:avLst/>
+          </a:prstGeom>
+          <a:noFill/>
+          <a:extLst>
+            <a:ext uri="{909E8E84-426E-40DD-AFC4-6F175D3DCCD1}">
+              <a14:hiddenFill xmlns:a14="http://schemas.microsoft.com/office/drawing/2010/main">
+                <a:solidFill>
+                  <a:srgbClr val="FFFFFF"/>
+                </a:solidFill>
+              </a14:hiddenFill>
+            </a:ext>
+          </a:extLst>
+        </p:spPr>
+      </p:pic>
+      <p:sp>
+        <p:nvSpPr>
+          <p:cNvPr id="15" name="TextBox 14">
+            <a:extLst>
+              <a:ext uri="{FF2B5EF4-FFF2-40B4-BE49-F238E27FC236}">
+                <a16:creationId xmlns:a16="http://schemas.microsoft.com/office/drawing/2014/main" id="{280E99B0-0C00-4E07-84A6-6443162A5609}"/>
+              </a:ext>
+            </a:extLst>
+          </p:cNvPr>
+          <p:cNvSpPr txBox="1"/>
+          <p:nvPr/>
+        </p:nvSpPr>
+        <p:spPr>
+          <a:xfrm>
+            <a:off x="5664806" y="5393330"/>
+            <a:ext cx="6094378" cy="369332"/>
+          </a:xfrm>
+          <a:prstGeom prst="rect">
+            <a:avLst/>
+          </a:prstGeom>
+          <a:noFill/>
+        </p:spPr>
+        <p:txBody>
+          <a:bodyPr wrap="square">
+            <a:spAutoFit/>
+          </a:bodyPr>
           <a:lstStyle/>
           <a:p>
             <a:r>
               <a:rPr lang="en-US" dirty="0"/>
-              <a:t>Proposal</a:t>
-            </a:r>
-          </a:p>
-        </p:txBody>
-      </p:sp>
-      <p:sp>
-        <p:nvSpPr>
-          <p:cNvPr id="3" name="Content Placeholder 2">
-            <a:extLst>
-              <a:ext uri="{FF2B5EF4-FFF2-40B4-BE49-F238E27FC236}">
-                <a16:creationId xmlns:a16="http://schemas.microsoft.com/office/drawing/2014/main" id="{3EB71C31-D5C0-47DF-8007-3589BBFE1D21}"/>
-              </a:ext>
-            </a:extLst>
-          </p:cNvPr>
-          <p:cNvSpPr>
-            <a:spLocks noGrp="1"/>
-          </p:cNvSpPr>
-          <p:nvPr>
-            <p:ph idx="1"/>
-          </p:nvPr>
-        </p:nvSpPr>
-        <p:spPr/>
-        <p:txBody>
-          <a:bodyPr/>
-          <a:lstStyle/>
-          <a:p>
-            <a:r>
-              <a:rPr lang="en-US" dirty="0"/>
-              <a:t>Idk just jotting down notes: </a:t>
-            </a:r>
-          </a:p>
-          <a:p>
-            <a:pPr lvl="1"/>
-            <a:r>
-              <a:rPr lang="en-US" dirty="0"/>
-              <a:t>Clustering methods: </a:t>
-            </a:r>
-            <a:r>
-              <a:rPr lang="en-US" dirty="0" err="1"/>
-              <a:t>Kmeans</a:t>
-            </a:r>
-            <a:r>
-              <a:rPr lang="en-US" dirty="0"/>
-              <a:t>, </a:t>
-            </a:r>
-            <a:r>
-              <a:rPr lang="en-US" dirty="0" err="1"/>
-              <a:t>Meanshift</a:t>
-            </a:r>
-            <a:r>
-              <a:rPr lang="en-US" dirty="0"/>
-              <a:t>, Gaussian Mixtures, </a:t>
-            </a:r>
-            <a:r>
-              <a:rPr lang="en-US" dirty="0" err="1"/>
-              <a:t>etc</a:t>
-            </a:r>
-            <a:endParaRPr lang="en-US" dirty="0"/>
-          </a:p>
-          <a:p>
-            <a:pPr lvl="1"/>
-            <a:r>
-              <a:rPr lang="en-US" dirty="0"/>
-              <a:t>Deep learning methods: </a:t>
-            </a:r>
-            <a:r>
-              <a:rPr lang="en-US" dirty="0" err="1"/>
-              <a:t>Unet</a:t>
-            </a:r>
-            <a:r>
-              <a:rPr lang="en-US" dirty="0"/>
-              <a:t> (probably not plausible to cover)</a:t>
-            </a:r>
-          </a:p>
-          <a:p>
-            <a:pPr lvl="1"/>
-            <a:r>
-              <a:rPr lang="en-US" dirty="0"/>
-              <a:t> Compression methods: Huffman coding</a:t>
-            </a:r>
-          </a:p>
-          <a:p>
-            <a:pPr lvl="1"/>
-            <a:r>
-              <a:rPr lang="en-US" dirty="0"/>
-              <a:t>Edge-based methods: Active contour model</a:t>
-            </a:r>
-          </a:p>
-          <a:p>
-            <a:pPr lvl="1"/>
-            <a:r>
-              <a:rPr lang="en-US"/>
-              <a:t>Region-based methods Watershed </a:t>
-            </a:r>
-            <a:endParaRPr lang="en-US" dirty="0"/>
-          </a:p>
-          <a:p>
-            <a:pPr lvl="1"/>
-            <a:r>
-              <a:rPr lang="en-US" dirty="0"/>
-              <a:t>Misc. Otsu’s method (binary threshold)</a:t>
+              <a:t>https://www.v7labs.com/blog/image-segmentation-guide</a:t>
             </a:r>
           </a:p>
         </p:txBody>
@@ -3547,7 +4125,7 @@
     </p:spTree>
     <p:extLst>
       <p:ext uri="{BB962C8B-B14F-4D97-AF65-F5344CB8AC3E}">
-        <p14:creationId xmlns:p14="http://schemas.microsoft.com/office/powerpoint/2010/main" val="3781552176"/>
+        <p14:creationId xmlns:p14="http://schemas.microsoft.com/office/powerpoint/2010/main" val="4068111755"/>
       </p:ext>
     </p:extLst>
   </p:cSld>
@@ -3560,6 +4138,14 @@
 <file path=ppt/slides/slide3.xml><?xml version="1.0" encoding="utf-8"?>
 <p:sld xmlns:a="http://schemas.openxmlformats.org/drawingml/2006/main" xmlns:r="http://schemas.openxmlformats.org/officeDocument/2006/relationships" xmlns:p="http://schemas.openxmlformats.org/presentationml/2006/main">
   <p:cSld>
+    <p:bg>
+      <p:bgPr>
+        <a:solidFill>
+          <a:schemeClr val="bg1"/>
+        </a:solidFill>
+        <a:effectLst/>
+      </p:bgPr>
+    </p:bg>
     <p:spTree>
       <p:nvGrpSpPr>
         <p:cNvPr id="1" name=""/>
@@ -3574,12 +4160,135 @@
           <a:chExt cx="0" cy="0"/>
         </a:xfrm>
       </p:grpSpPr>
+      <p:sp useBgFill="1">
+        <p:nvSpPr>
+          <p:cNvPr id="135" name="Rectangle 134">
+            <a:extLst>
+              <a:ext uri="{FF2B5EF4-FFF2-40B4-BE49-F238E27FC236}">
+                <a16:creationId xmlns:a16="http://schemas.microsoft.com/office/drawing/2014/main" id="{33CD251C-A887-4D2F-925B-FC097198538B}"/>
+              </a:ext>
+              <a:ext uri="{C183D7F6-B498-43B3-948B-1728B52AA6E4}">
+                <adec:decorative xmlns:adec="http://schemas.microsoft.com/office/drawing/2017/decorative" val="1"/>
+              </a:ext>
+            </a:extLst>
+          </p:cNvPr>
+          <p:cNvSpPr>
+            <a:spLocks noGrp="1" noRot="1" noChangeAspect="1" noMove="1" noResize="1" noEditPoints="1" noAdjustHandles="1" noChangeArrowheads="1" noChangeShapeType="1" noTextEdit="1"/>
+          </p:cNvSpPr>
+          <p:nvPr>
+            <p:extLst>
+              <p:ext uri="{386F3935-93C4-4BCD-93E2-E3B085C9AB24}">
+                <p16:designElem xmlns:p16="http://schemas.microsoft.com/office/powerpoint/2015/main" val="1"/>
+              </p:ext>
+            </p:extLst>
+          </p:nvPr>
+        </p:nvSpPr>
+        <p:spPr>
+          <a:xfrm>
+            <a:off x="0" y="0"/>
+            <a:ext cx="12192000" cy="6858000"/>
+          </a:xfrm>
+          <a:prstGeom prst="rect">
+            <a:avLst/>
+          </a:prstGeom>
+          <a:ln>
+            <a:noFill/>
+          </a:ln>
+        </p:spPr>
+        <p:style>
+          <a:lnRef idx="2">
+            <a:schemeClr val="accent1">
+              <a:shade val="50000"/>
+            </a:schemeClr>
+          </a:lnRef>
+          <a:fillRef idx="1">
+            <a:schemeClr val="accent1"/>
+          </a:fillRef>
+          <a:effectRef idx="0">
+            <a:schemeClr val="accent1"/>
+          </a:effectRef>
+          <a:fontRef idx="minor">
+            <a:schemeClr val="lt1"/>
+          </a:fontRef>
+        </p:style>
+        <p:txBody>
+          <a:bodyPr rtlCol="0" anchor="ctr"/>
+          <a:lstStyle/>
+          <a:p>
+            <a:pPr algn="ctr"/>
+            <a:endParaRPr lang="en-US"/>
+          </a:p>
+        </p:txBody>
+      </p:sp>
+      <p:sp>
+        <p:nvSpPr>
+          <p:cNvPr id="137" name="Rectangle 136">
+            <a:extLst>
+              <a:ext uri="{FF2B5EF4-FFF2-40B4-BE49-F238E27FC236}">
+                <a16:creationId xmlns:a16="http://schemas.microsoft.com/office/drawing/2014/main" id="{B19D093C-27FB-4032-B282-42C4563F257C}"/>
+              </a:ext>
+              <a:ext uri="{C183D7F6-B498-43B3-948B-1728B52AA6E4}">
+                <adec:decorative xmlns:adec="http://schemas.microsoft.com/office/drawing/2017/decorative" val="1"/>
+              </a:ext>
+            </a:extLst>
+          </p:cNvPr>
+          <p:cNvSpPr>
+            <a:spLocks noGrp="1" noRot="1" noChangeAspect="1" noMove="1" noResize="1" noEditPoints="1" noAdjustHandles="1" noChangeArrowheads="1" noChangeShapeType="1" noTextEdit="1"/>
+          </p:cNvSpPr>
+          <p:nvPr>
+            <p:extLst>
+              <p:ext uri="{386F3935-93C4-4BCD-93E2-E3B085C9AB24}">
+                <p16:designElem xmlns:p16="http://schemas.microsoft.com/office/powerpoint/2015/main" val="1"/>
+              </p:ext>
+            </p:extLst>
+          </p:nvPr>
+        </p:nvSpPr>
+        <p:spPr>
+          <a:xfrm>
+            <a:off x="0" y="0"/>
+            <a:ext cx="4694548" cy="6858000"/>
+          </a:xfrm>
+          <a:prstGeom prst="rect">
+            <a:avLst/>
+          </a:prstGeom>
+          <a:solidFill>
+            <a:schemeClr val="tx1"/>
+          </a:solidFill>
+          <a:ln>
+            <a:noFill/>
+          </a:ln>
+        </p:spPr>
+        <p:style>
+          <a:lnRef idx="2">
+            <a:schemeClr val="accent1">
+              <a:shade val="50000"/>
+            </a:schemeClr>
+          </a:lnRef>
+          <a:fillRef idx="1">
+            <a:schemeClr val="accent1"/>
+          </a:fillRef>
+          <a:effectRef idx="0">
+            <a:schemeClr val="accent1"/>
+          </a:effectRef>
+          <a:fontRef idx="minor">
+            <a:schemeClr val="lt1"/>
+          </a:fontRef>
+        </p:style>
+        <p:txBody>
+          <a:bodyPr rtlCol="0" anchor="ctr"/>
+          <a:lstStyle/>
+          <a:p>
+            <a:pPr algn="ctr"/>
+            <a:endParaRPr lang="en-US"/>
+          </a:p>
+        </p:txBody>
+      </p:sp>
       <p:sp>
         <p:nvSpPr>
           <p:cNvPr id="2" name="Title 1">
             <a:extLst>
               <a:ext uri="{FF2B5EF4-FFF2-40B4-BE49-F238E27FC236}">
-                <a16:creationId xmlns:a16="http://schemas.microsoft.com/office/drawing/2014/main" id="{1EF15F91-D945-4584-B48E-FE9D25F644FB}"/>
+                <a16:creationId xmlns:a16="http://schemas.microsoft.com/office/drawing/2014/main" id="{9200BA96-8C2E-42A8-BD1A-F04E623212EF}"/>
               </a:ext>
             </a:extLst>
           </p:cNvPr>
@@ -3590,47 +4299,879 @@
             <p:ph type="title"/>
           </p:nvPr>
         </p:nvSpPr>
-        <p:spPr/>
-        <p:txBody>
-          <a:bodyPr/>
-          <a:lstStyle/>
-          <a:p>
-            <a:r>
-              <a:rPr lang="en-US" dirty="0"/>
-              <a:t>Overview</a:t>
-            </a:r>
-          </a:p>
-        </p:txBody>
-      </p:sp>
+        <p:spPr>
+          <a:xfrm>
+            <a:off x="767290" y="1780661"/>
+            <a:ext cx="3582073" cy="1463472"/>
+          </a:xfrm>
+        </p:spPr>
+        <p:txBody>
+          <a:bodyPr vert="horz" lIns="91440" tIns="45720" rIns="91440" bIns="45720" rtlCol="0" anchor="t">
+            <a:normAutofit/>
+          </a:bodyPr>
+          <a:lstStyle/>
+          <a:p>
+            <a:r>
+              <a:rPr lang="en-US" sz="3000" kern="1200" dirty="0">
+                <a:solidFill>
+                  <a:schemeClr val="bg1"/>
+                </a:solidFill>
+                <a:latin typeface="+mj-lt"/>
+                <a:ea typeface="+mj-ea"/>
+                <a:cs typeface="+mj-cs"/>
+              </a:rPr>
+              <a:t>How is max flow currently used for image segmentation?</a:t>
+            </a:r>
+          </a:p>
+        </p:txBody>
+      </p:sp>
+      <p:grpSp>
+        <p:nvGrpSpPr>
+          <p:cNvPr id="139" name="Group 138">
+            <a:extLst>
+              <a:ext uri="{FF2B5EF4-FFF2-40B4-BE49-F238E27FC236}">
+                <a16:creationId xmlns:a16="http://schemas.microsoft.com/office/drawing/2014/main" id="{35EE815E-1BD3-4777-B652-6D98825BF66B}"/>
+              </a:ext>
+              <a:ext uri="{C183D7F6-B498-43B3-948B-1728B52AA6E4}">
+                <adec:decorative xmlns:adec="http://schemas.microsoft.com/office/drawing/2017/decorative" val="1"/>
+              </a:ext>
+            </a:extLst>
+          </p:cNvPr>
+          <p:cNvGrpSpPr>
+            <a:grpSpLocks noGrp="1" noUngrp="1" noRot="1" noChangeAspect="1" noMove="1" noResize="1"/>
+          </p:cNvGrpSpPr>
+          <p:nvPr>
+            <p:extLst>
+              <p:ext uri="{386F3935-93C4-4BCD-93E2-E3B085C9AB24}">
+                <p16:designElem xmlns:p16="http://schemas.microsoft.com/office/powerpoint/2015/main" val="1"/>
+              </p:ext>
+            </p:extLst>
+          </p:nvPr>
+        </p:nvGrpSpPr>
+        <p:grpSpPr>
+          <a:xfrm>
+            <a:off x="767290" y="681628"/>
+            <a:ext cx="1128382" cy="847206"/>
+            <a:chOff x="668003" y="1684057"/>
+            <a:chExt cx="1128382" cy="847206"/>
+          </a:xfrm>
+        </p:grpSpPr>
+        <p:sp>
+          <p:nvSpPr>
+            <p:cNvPr id="140" name="Freeform 5">
+              <a:extLst>
+                <a:ext uri="{FF2B5EF4-FFF2-40B4-BE49-F238E27FC236}">
+                  <a16:creationId xmlns:a16="http://schemas.microsoft.com/office/drawing/2014/main" id="{E6692982-4A7D-4392-87CD-F0CD4B027DDE}"/>
+                </a:ext>
+                <a:ext uri="{C183D7F6-B498-43B3-948B-1728B52AA6E4}">
+                  <adec:decorative xmlns:adec="http://schemas.microsoft.com/office/drawing/2017/decorative" val="1"/>
+                </a:ext>
+              </a:extLst>
+            </p:cNvPr>
+            <p:cNvSpPr>
+              <a:spLocks/>
+            </p:cNvSpPr>
+            <p:nvPr>
+              <p:extLst>
+                <p:ext uri="{386F3935-93C4-4BCD-93E2-E3B085C9AB24}">
+                  <p16:designElem xmlns:p16="http://schemas.microsoft.com/office/powerpoint/2015/main" val="1"/>
+                </p:ext>
+              </p:extLst>
+            </p:nvPr>
+          </p:nvSpPr>
+          <p:spPr bwMode="auto">
+            <a:xfrm>
+              <a:off x="668003" y="1935883"/>
+              <a:ext cx="675351" cy="595380"/>
+            </a:xfrm>
+            <a:custGeom>
+              <a:avLst/>
+              <a:gdLst>
+                <a:gd name="T0" fmla="*/ 225 w 785"/>
+                <a:gd name="T1" fmla="*/ 692 h 692"/>
+                <a:gd name="T2" fmla="*/ 177 w 785"/>
+                <a:gd name="T3" fmla="*/ 665 h 692"/>
+                <a:gd name="T4" fmla="*/ 9 w 785"/>
+                <a:gd name="T5" fmla="*/ 374 h 692"/>
+                <a:gd name="T6" fmla="*/ 9 w 785"/>
+                <a:gd name="T7" fmla="*/ 318 h 692"/>
+                <a:gd name="T8" fmla="*/ 177 w 785"/>
+                <a:gd name="T9" fmla="*/ 27 h 692"/>
+                <a:gd name="T10" fmla="*/ 225 w 785"/>
+                <a:gd name="T11" fmla="*/ 0 h 692"/>
+                <a:gd name="T12" fmla="*/ 561 w 785"/>
+                <a:gd name="T13" fmla="*/ 0 h 692"/>
+                <a:gd name="T14" fmla="*/ 609 w 785"/>
+                <a:gd name="T15" fmla="*/ 27 h 692"/>
+                <a:gd name="T16" fmla="*/ 777 w 785"/>
+                <a:gd name="T17" fmla="*/ 318 h 692"/>
+                <a:gd name="T18" fmla="*/ 777 w 785"/>
+                <a:gd name="T19" fmla="*/ 374 h 692"/>
+                <a:gd name="T20" fmla="*/ 609 w 785"/>
+                <a:gd name="T21" fmla="*/ 665 h 692"/>
+                <a:gd name="T22" fmla="*/ 561 w 785"/>
+                <a:gd name="T23" fmla="*/ 692 h 692"/>
+                <a:gd name="T24" fmla="*/ 225 w 785"/>
+                <a:gd name="T25" fmla="*/ 692 h 692"/>
+              </a:gdLst>
+              <a:ahLst/>
+              <a:cxnLst>
+                <a:cxn ang="0">
+                  <a:pos x="T0" y="T1"/>
+                </a:cxn>
+                <a:cxn ang="0">
+                  <a:pos x="T2" y="T3"/>
+                </a:cxn>
+                <a:cxn ang="0">
+                  <a:pos x="T4" y="T5"/>
+                </a:cxn>
+                <a:cxn ang="0">
+                  <a:pos x="T6" y="T7"/>
+                </a:cxn>
+                <a:cxn ang="0">
+                  <a:pos x="T8" y="T9"/>
+                </a:cxn>
+                <a:cxn ang="0">
+                  <a:pos x="T10" y="T11"/>
+                </a:cxn>
+                <a:cxn ang="0">
+                  <a:pos x="T12" y="T13"/>
+                </a:cxn>
+                <a:cxn ang="0">
+                  <a:pos x="T14" y="T15"/>
+                </a:cxn>
+                <a:cxn ang="0">
+                  <a:pos x="T16" y="T17"/>
+                </a:cxn>
+                <a:cxn ang="0">
+                  <a:pos x="T18" y="T19"/>
+                </a:cxn>
+                <a:cxn ang="0">
+                  <a:pos x="T20" y="T21"/>
+                </a:cxn>
+                <a:cxn ang="0">
+                  <a:pos x="T22" y="T23"/>
+                </a:cxn>
+                <a:cxn ang="0">
+                  <a:pos x="T24" y="T25"/>
+                </a:cxn>
+              </a:cxnLst>
+              <a:rect l="0" t="0" r="r" b="b"/>
+              <a:pathLst>
+                <a:path w="785" h="692">
+                  <a:moveTo>
+                    <a:pt x="225" y="692"/>
+                  </a:moveTo>
+                  <a:cubicBezTo>
+                    <a:pt x="207" y="692"/>
+                    <a:pt x="185" y="680"/>
+                    <a:pt x="177" y="665"/>
+                  </a:cubicBezTo>
+                  <a:cubicBezTo>
+                    <a:pt x="9" y="374"/>
+                    <a:pt x="9" y="374"/>
+                    <a:pt x="9" y="374"/>
+                  </a:cubicBezTo>
+                  <a:cubicBezTo>
+                    <a:pt x="0" y="358"/>
+                    <a:pt x="0" y="334"/>
+                    <a:pt x="9" y="318"/>
+                  </a:cubicBezTo>
+                  <a:cubicBezTo>
+                    <a:pt x="177" y="27"/>
+                    <a:pt x="177" y="27"/>
+                    <a:pt x="177" y="27"/>
+                  </a:cubicBezTo>
+                  <a:cubicBezTo>
+                    <a:pt x="185" y="12"/>
+                    <a:pt x="207" y="0"/>
+                    <a:pt x="225" y="0"/>
+                  </a:cubicBezTo>
+                  <a:cubicBezTo>
+                    <a:pt x="561" y="0"/>
+                    <a:pt x="561" y="0"/>
+                    <a:pt x="561" y="0"/>
+                  </a:cubicBezTo>
+                  <a:cubicBezTo>
+                    <a:pt x="578" y="0"/>
+                    <a:pt x="600" y="12"/>
+                    <a:pt x="609" y="27"/>
+                  </a:cubicBezTo>
+                  <a:cubicBezTo>
+                    <a:pt x="777" y="318"/>
+                    <a:pt x="777" y="318"/>
+                    <a:pt x="777" y="318"/>
+                  </a:cubicBezTo>
+                  <a:cubicBezTo>
+                    <a:pt x="785" y="334"/>
+                    <a:pt x="785" y="358"/>
+                    <a:pt x="777" y="374"/>
+                  </a:cubicBezTo>
+                  <a:cubicBezTo>
+                    <a:pt x="609" y="665"/>
+                    <a:pt x="609" y="665"/>
+                    <a:pt x="609" y="665"/>
+                  </a:cubicBezTo>
+                  <a:cubicBezTo>
+                    <a:pt x="600" y="680"/>
+                    <a:pt x="578" y="692"/>
+                    <a:pt x="561" y="692"/>
+                  </a:cubicBezTo>
+                  <a:lnTo>
+                    <a:pt x="225" y="692"/>
+                  </a:lnTo>
+                  <a:close/>
+                </a:path>
+              </a:pathLst>
+            </a:custGeom>
+            <a:noFill/>
+            <a:ln w="28575" cmpd="sng">
+              <a:solidFill>
+                <a:schemeClr val="bg1"/>
+              </a:solidFill>
+            </a:ln>
+          </p:spPr>
+          <p:txBody>
+            <a:bodyPr vert="horz" wrap="square" lIns="91440" tIns="45720" rIns="91440" bIns="45720" numCol="1" anchor="t" anchorCtr="0" compatLnSpc="1">
+              <a:prstTxWarp prst="textNoShape">
+                <a:avLst/>
+              </a:prstTxWarp>
+            </a:bodyPr>
+            <a:lstStyle/>
+            <a:p>
+              <a:endParaRPr lang="en-US"/>
+            </a:p>
+          </p:txBody>
+        </p:sp>
+        <p:sp>
+          <p:nvSpPr>
+            <p:cNvPr id="141" name="Freeform 5">
+              <a:extLst>
+                <a:ext uri="{FF2B5EF4-FFF2-40B4-BE49-F238E27FC236}">
+                  <a16:creationId xmlns:a16="http://schemas.microsoft.com/office/drawing/2014/main" id="{196485F7-F277-4123-AC53-98EA4C858774}"/>
+                </a:ext>
+                <a:ext uri="{C183D7F6-B498-43B3-948B-1728B52AA6E4}">
+                  <adec:decorative xmlns:adec="http://schemas.microsoft.com/office/drawing/2017/decorative" val="1"/>
+                </a:ext>
+              </a:extLst>
+            </p:cNvPr>
+            <p:cNvSpPr>
+              <a:spLocks/>
+            </p:cNvSpPr>
+            <p:nvPr>
+              <p:extLst>
+                <p:ext uri="{386F3935-93C4-4BCD-93E2-E3B085C9AB24}">
+                  <p16:designElem xmlns:p16="http://schemas.microsoft.com/office/powerpoint/2015/main" val="1"/>
+                </p:ext>
+              </p:extLst>
+            </p:nvPr>
+          </p:nvSpPr>
+          <p:spPr bwMode="auto">
+            <a:xfrm>
+              <a:off x="1245893" y="1684057"/>
+              <a:ext cx="550492" cy="485306"/>
+            </a:xfrm>
+            <a:custGeom>
+              <a:avLst/>
+              <a:gdLst>
+                <a:gd name="T0" fmla="*/ 225 w 785"/>
+                <a:gd name="T1" fmla="*/ 692 h 692"/>
+                <a:gd name="T2" fmla="*/ 177 w 785"/>
+                <a:gd name="T3" fmla="*/ 665 h 692"/>
+                <a:gd name="T4" fmla="*/ 9 w 785"/>
+                <a:gd name="T5" fmla="*/ 374 h 692"/>
+                <a:gd name="T6" fmla="*/ 9 w 785"/>
+                <a:gd name="T7" fmla="*/ 318 h 692"/>
+                <a:gd name="T8" fmla="*/ 177 w 785"/>
+                <a:gd name="T9" fmla="*/ 27 h 692"/>
+                <a:gd name="T10" fmla="*/ 225 w 785"/>
+                <a:gd name="T11" fmla="*/ 0 h 692"/>
+                <a:gd name="T12" fmla="*/ 561 w 785"/>
+                <a:gd name="T13" fmla="*/ 0 h 692"/>
+                <a:gd name="T14" fmla="*/ 609 w 785"/>
+                <a:gd name="T15" fmla="*/ 27 h 692"/>
+                <a:gd name="T16" fmla="*/ 777 w 785"/>
+                <a:gd name="T17" fmla="*/ 318 h 692"/>
+                <a:gd name="T18" fmla="*/ 777 w 785"/>
+                <a:gd name="T19" fmla="*/ 374 h 692"/>
+                <a:gd name="T20" fmla="*/ 609 w 785"/>
+                <a:gd name="T21" fmla="*/ 665 h 692"/>
+                <a:gd name="T22" fmla="*/ 561 w 785"/>
+                <a:gd name="T23" fmla="*/ 692 h 692"/>
+                <a:gd name="T24" fmla="*/ 225 w 785"/>
+                <a:gd name="T25" fmla="*/ 692 h 692"/>
+              </a:gdLst>
+              <a:ahLst/>
+              <a:cxnLst>
+                <a:cxn ang="0">
+                  <a:pos x="T0" y="T1"/>
+                </a:cxn>
+                <a:cxn ang="0">
+                  <a:pos x="T2" y="T3"/>
+                </a:cxn>
+                <a:cxn ang="0">
+                  <a:pos x="T4" y="T5"/>
+                </a:cxn>
+                <a:cxn ang="0">
+                  <a:pos x="T6" y="T7"/>
+                </a:cxn>
+                <a:cxn ang="0">
+                  <a:pos x="T8" y="T9"/>
+                </a:cxn>
+                <a:cxn ang="0">
+                  <a:pos x="T10" y="T11"/>
+                </a:cxn>
+                <a:cxn ang="0">
+                  <a:pos x="T12" y="T13"/>
+                </a:cxn>
+                <a:cxn ang="0">
+                  <a:pos x="T14" y="T15"/>
+                </a:cxn>
+                <a:cxn ang="0">
+                  <a:pos x="T16" y="T17"/>
+                </a:cxn>
+                <a:cxn ang="0">
+                  <a:pos x="T18" y="T19"/>
+                </a:cxn>
+                <a:cxn ang="0">
+                  <a:pos x="T20" y="T21"/>
+                </a:cxn>
+                <a:cxn ang="0">
+                  <a:pos x="T22" y="T23"/>
+                </a:cxn>
+                <a:cxn ang="0">
+                  <a:pos x="T24" y="T25"/>
+                </a:cxn>
+              </a:cxnLst>
+              <a:rect l="0" t="0" r="r" b="b"/>
+              <a:pathLst>
+                <a:path w="785" h="692">
+                  <a:moveTo>
+                    <a:pt x="225" y="692"/>
+                  </a:moveTo>
+                  <a:cubicBezTo>
+                    <a:pt x="207" y="692"/>
+                    <a:pt x="185" y="680"/>
+                    <a:pt x="177" y="665"/>
+                  </a:cubicBezTo>
+                  <a:cubicBezTo>
+                    <a:pt x="9" y="374"/>
+                    <a:pt x="9" y="374"/>
+                    <a:pt x="9" y="374"/>
+                  </a:cubicBezTo>
+                  <a:cubicBezTo>
+                    <a:pt x="0" y="358"/>
+                    <a:pt x="0" y="334"/>
+                    <a:pt x="9" y="318"/>
+                  </a:cubicBezTo>
+                  <a:cubicBezTo>
+                    <a:pt x="177" y="27"/>
+                    <a:pt x="177" y="27"/>
+                    <a:pt x="177" y="27"/>
+                  </a:cubicBezTo>
+                  <a:cubicBezTo>
+                    <a:pt x="185" y="12"/>
+                    <a:pt x="207" y="0"/>
+                    <a:pt x="225" y="0"/>
+                  </a:cubicBezTo>
+                  <a:cubicBezTo>
+                    <a:pt x="561" y="0"/>
+                    <a:pt x="561" y="0"/>
+                    <a:pt x="561" y="0"/>
+                  </a:cubicBezTo>
+                  <a:cubicBezTo>
+                    <a:pt x="578" y="0"/>
+                    <a:pt x="600" y="12"/>
+                    <a:pt x="609" y="27"/>
+                  </a:cubicBezTo>
+                  <a:cubicBezTo>
+                    <a:pt x="777" y="318"/>
+                    <a:pt x="777" y="318"/>
+                    <a:pt x="777" y="318"/>
+                  </a:cubicBezTo>
+                  <a:cubicBezTo>
+                    <a:pt x="785" y="334"/>
+                    <a:pt x="785" y="358"/>
+                    <a:pt x="777" y="374"/>
+                  </a:cubicBezTo>
+                  <a:cubicBezTo>
+                    <a:pt x="609" y="665"/>
+                    <a:pt x="609" y="665"/>
+                    <a:pt x="609" y="665"/>
+                  </a:cubicBezTo>
+                  <a:cubicBezTo>
+                    <a:pt x="600" y="680"/>
+                    <a:pt x="578" y="692"/>
+                    <a:pt x="561" y="692"/>
+                  </a:cubicBezTo>
+                  <a:lnTo>
+                    <a:pt x="225" y="692"/>
+                  </a:lnTo>
+                  <a:close/>
+                </a:path>
+              </a:pathLst>
+            </a:custGeom>
+            <a:noFill/>
+            <a:ln w="28575" cmpd="sng">
+              <a:solidFill>
+                <a:schemeClr val="bg1"/>
+              </a:solidFill>
+            </a:ln>
+          </p:spPr>
+          <p:txBody>
+            <a:bodyPr vert="horz" wrap="square" lIns="91440" tIns="45720" rIns="91440" bIns="45720" numCol="1" anchor="t" anchorCtr="0" compatLnSpc="1">
+              <a:prstTxWarp prst="textNoShape">
+                <a:avLst/>
+              </a:prstTxWarp>
+            </a:bodyPr>
+            <a:lstStyle/>
+            <a:p>
+              <a:endParaRPr lang="en-US"/>
+            </a:p>
+          </p:txBody>
+        </p:sp>
+      </p:grpSp>
       <p:sp>
         <p:nvSpPr>
           <p:cNvPr id="3" name="Content Placeholder 2">
             <a:extLst>
               <a:ext uri="{FF2B5EF4-FFF2-40B4-BE49-F238E27FC236}">
-                <a16:creationId xmlns:a16="http://schemas.microsoft.com/office/drawing/2014/main" id="{BCB72640-F1EA-4235-8F3E-D10D7F5D042E}"/>
-              </a:ext>
-            </a:extLst>
-          </p:cNvPr>
-          <p:cNvSpPr>
-            <a:spLocks noGrp="1"/>
-          </p:cNvSpPr>
-          <p:nvPr>
-            <p:ph idx="1"/>
-          </p:nvPr>
-        </p:nvSpPr>
-        <p:spPr/>
-        <p:txBody>
-          <a:bodyPr/>
-          <a:lstStyle/>
-          <a:p>
-            <a:endParaRPr lang="en-US" dirty="0"/>
+                <a16:creationId xmlns:a16="http://schemas.microsoft.com/office/drawing/2014/main" id="{0C46788F-37B7-400B-AC0E-E4E33E027B90}"/>
+              </a:ext>
+            </a:extLst>
+          </p:cNvPr>
+          <p:cNvSpPr>
+            <a:spLocks noGrp="1"/>
+          </p:cNvSpPr>
+          <p:nvPr>
+            <p:ph sz="half" idx="1"/>
+          </p:nvPr>
+        </p:nvSpPr>
+        <p:spPr>
+          <a:xfrm>
+            <a:off x="767290" y="3383121"/>
+            <a:ext cx="3582072" cy="2793251"/>
+          </a:xfrm>
+        </p:spPr>
+        <p:txBody>
+          <a:bodyPr vert="horz" lIns="91440" tIns="45720" rIns="91440" bIns="45720" rtlCol="0" anchor="t">
+            <a:normAutofit/>
+          </a:bodyPr>
+          <a:lstStyle/>
+          <a:p>
+            <a:pPr marL="0" indent="0">
+              <a:buNone/>
+            </a:pPr>
+            <a:r>
+              <a:rPr lang="en-US" sz="2000" dirty="0">
+                <a:solidFill>
+                  <a:schemeClr val="bg1"/>
+                </a:solidFill>
+              </a:rPr>
+              <a:t>Examples: </a:t>
+            </a:r>
+          </a:p>
+          <a:p>
+            <a:r>
+              <a:rPr lang="en-US" sz="2000" dirty="0">
+                <a:solidFill>
+                  <a:schemeClr val="bg1"/>
+                </a:solidFill>
+              </a:rPr>
+              <a:t>Photoshop Magnetic Lasso</a:t>
+            </a:r>
+          </a:p>
+          <a:p>
+            <a:r>
+              <a:rPr lang="en-US" sz="2000" dirty="0">
+                <a:solidFill>
+                  <a:schemeClr val="bg1"/>
+                </a:solidFill>
+              </a:rPr>
+              <a:t>Automatic partitioning of an image into multiple clinically relevant regions</a:t>
+            </a:r>
+          </a:p>
+          <a:p>
+            <a:endParaRPr lang="en-US" sz="2000" dirty="0">
+              <a:solidFill>
+                <a:schemeClr val="bg1"/>
+              </a:solidFill>
+            </a:endParaRPr>
+          </a:p>
+          <a:p>
+            <a:endParaRPr lang="en-US" sz="2000" dirty="0">
+              <a:solidFill>
+                <a:schemeClr val="bg1"/>
+              </a:solidFill>
+            </a:endParaRPr>
+          </a:p>
+          <a:p>
+            <a:endParaRPr lang="en-US" sz="2000" dirty="0">
+              <a:solidFill>
+                <a:schemeClr val="bg1"/>
+              </a:solidFill>
+            </a:endParaRPr>
+          </a:p>
+        </p:txBody>
+      </p:sp>
+      <p:pic>
+        <p:nvPicPr>
+          <p:cNvPr id="2050" name="Picture 2" descr="Using the max-flow/min-cut approach for image segmentation. a) Define set of pixels in the image belonging to one phase as connected to the source vertex, and set of pixels belonging to a second phase as connected to the sink vertex. b) Define a graph with pixels as vertices. c) Use the max-flow/min-cut approach to split the graph between the sink and source. d) Use the cut as the boundary between the two regions. ">
+            <a:extLst>
+              <a:ext uri="{FF2B5EF4-FFF2-40B4-BE49-F238E27FC236}">
+                <a16:creationId xmlns:a16="http://schemas.microsoft.com/office/drawing/2014/main" id="{63D652C1-82A9-4438-9A48-D2B05DE34F86}"/>
+              </a:ext>
+            </a:extLst>
+          </p:cNvPr>
+          <p:cNvPicPr>
+            <a:picLocks noGrp="1" noChangeAspect="1" noChangeArrowheads="1"/>
+          </p:cNvPicPr>
+          <p:nvPr>
+            <p:ph sz="half" idx="2"/>
+          </p:nvPr>
+        </p:nvPicPr>
+        <p:blipFill rotWithShape="1">
+          <a:blip r:embed="rId2">
+            <a:extLst>
+              <a:ext uri="{28A0092B-C50C-407E-A947-70E740481C1C}">
+                <a14:useLocalDpi xmlns:a14="http://schemas.microsoft.com/office/drawing/2010/main" val="0"/>
+              </a:ext>
+            </a:extLst>
+          </a:blip>
+          <a:srcRect b="14786"/>
+          <a:stretch/>
+        </p:blipFill>
+        <p:spPr bwMode="auto">
+          <a:xfrm>
+            <a:off x="5116653" y="446269"/>
+            <a:ext cx="3502935" cy="1569749"/>
+          </a:xfrm>
+          <a:prstGeom prst="rect">
+            <a:avLst/>
+          </a:prstGeom>
+          <a:noFill/>
+          <a:extLst>
+            <a:ext uri="{909E8E84-426E-40DD-AFC4-6F175D3DCCD1}">
+              <a14:hiddenFill xmlns:a14="http://schemas.microsoft.com/office/drawing/2010/main">
+                <a:solidFill>
+                  <a:srgbClr val="FFFFFF"/>
+                </a:solidFill>
+              </a14:hiddenFill>
+            </a:ext>
+          </a:extLst>
+        </p:spPr>
+      </p:pic>
+      <p:pic>
+        <p:nvPicPr>
+          <p:cNvPr id="2052" name="Picture 4" descr="Hierarchical max-flow segmentation framework for multi-atlas segmentation  with Kohonen self-organizing map based Gaussian mixture modeling -  ScienceDirect">
+            <a:extLst>
+              <a:ext uri="{FF2B5EF4-FFF2-40B4-BE49-F238E27FC236}">
+                <a16:creationId xmlns:a16="http://schemas.microsoft.com/office/drawing/2014/main" id="{FB18385B-9481-4FF2-9FAA-5C5E083FD271}"/>
+              </a:ext>
+            </a:extLst>
+          </p:cNvPr>
+          <p:cNvPicPr>
+            <a:picLocks noChangeAspect="1" noChangeArrowheads="1"/>
+          </p:cNvPicPr>
+          <p:nvPr/>
+        </p:nvPicPr>
+        <p:blipFill>
+          <a:blip r:embed="rId3">
+            <a:extLst>
+              <a:ext uri="{28A0092B-C50C-407E-A947-70E740481C1C}">
+                <a14:useLocalDpi xmlns:a14="http://schemas.microsoft.com/office/drawing/2010/main" val="0"/>
+              </a:ext>
+            </a:extLst>
+          </a:blip>
+          <a:srcRect/>
+          <a:stretch>
+            <a:fillRect/>
+          </a:stretch>
+        </p:blipFill>
+        <p:spPr bwMode="auto">
+          <a:xfrm>
+            <a:off x="1094651" y="5217742"/>
+            <a:ext cx="2808852" cy="1177448"/>
+          </a:xfrm>
+          <a:prstGeom prst="rect">
+            <a:avLst/>
+          </a:prstGeom>
+          <a:noFill/>
+          <a:extLst>
+            <a:ext uri="{909E8E84-426E-40DD-AFC4-6F175D3DCCD1}">
+              <a14:hiddenFill xmlns:a14="http://schemas.microsoft.com/office/drawing/2010/main">
+                <a:solidFill>
+                  <a:srgbClr val="FFFFFF"/>
+                </a:solidFill>
+              </a14:hiddenFill>
+            </a:ext>
+          </a:extLst>
+        </p:spPr>
+      </p:pic>
+      <p:pic>
+        <p:nvPicPr>
+          <p:cNvPr id="2054" name="Picture 6" descr="deer">
+            <a:extLst>
+              <a:ext uri="{FF2B5EF4-FFF2-40B4-BE49-F238E27FC236}">
+                <a16:creationId xmlns:a16="http://schemas.microsoft.com/office/drawing/2014/main" id="{4ADA8079-968C-4EEC-93FF-9E04003E5B48}"/>
+              </a:ext>
+            </a:extLst>
+          </p:cNvPr>
+          <p:cNvPicPr>
+            <a:picLocks noChangeAspect="1" noChangeArrowheads="1"/>
+          </p:cNvPicPr>
+          <p:nvPr/>
+        </p:nvPicPr>
+        <p:blipFill>
+          <a:blip r:embed="rId4">
+            <a:extLst>
+              <a:ext uri="{28A0092B-C50C-407E-A947-70E740481C1C}">
+                <a14:useLocalDpi xmlns:a14="http://schemas.microsoft.com/office/drawing/2010/main" val="0"/>
+              </a:ext>
+            </a:extLst>
+          </a:blip>
+          <a:srcRect/>
+          <a:stretch>
+            <a:fillRect/>
+          </a:stretch>
+        </p:blipFill>
+        <p:spPr bwMode="auto">
+          <a:xfrm>
+            <a:off x="4989951" y="2459397"/>
+            <a:ext cx="1866761" cy="1666751"/>
+          </a:xfrm>
+          <a:prstGeom prst="rect">
+            <a:avLst/>
+          </a:prstGeom>
+          <a:noFill/>
+          <a:extLst>
+            <a:ext uri="{909E8E84-426E-40DD-AFC4-6F175D3DCCD1}">
+              <a14:hiddenFill xmlns:a14="http://schemas.microsoft.com/office/drawing/2010/main">
+                <a:solidFill>
+                  <a:srgbClr val="FFFFFF"/>
+                </a:solidFill>
+              </a14:hiddenFill>
+            </a:ext>
+          </a:extLst>
+        </p:spPr>
+      </p:pic>
+      <p:pic>
+        <p:nvPicPr>
+          <p:cNvPr id="2056" name="Picture 8" descr="deer_scribed">
+            <a:extLst>
+              <a:ext uri="{FF2B5EF4-FFF2-40B4-BE49-F238E27FC236}">
+                <a16:creationId xmlns:a16="http://schemas.microsoft.com/office/drawing/2014/main" id="{AC5C4F25-FBA2-4200-92A5-406BDB50538D}"/>
+              </a:ext>
+            </a:extLst>
+          </p:cNvPr>
+          <p:cNvPicPr>
+            <a:picLocks noChangeAspect="1" noChangeArrowheads="1"/>
+          </p:cNvPicPr>
+          <p:nvPr/>
+        </p:nvPicPr>
+        <p:blipFill>
+          <a:blip r:embed="rId5">
+            <a:extLst>
+              <a:ext uri="{28A0092B-C50C-407E-A947-70E740481C1C}">
+                <a14:useLocalDpi xmlns:a14="http://schemas.microsoft.com/office/drawing/2010/main" val="0"/>
+              </a:ext>
+            </a:extLst>
+          </a:blip>
+          <a:srcRect/>
+          <a:stretch>
+            <a:fillRect/>
+          </a:stretch>
+        </p:blipFill>
+        <p:spPr bwMode="auto">
+          <a:xfrm>
+            <a:off x="4989951" y="4526565"/>
+            <a:ext cx="1866761" cy="1666751"/>
+          </a:xfrm>
+          <a:prstGeom prst="rect">
+            <a:avLst/>
+          </a:prstGeom>
+          <a:noFill/>
+          <a:extLst>
+            <a:ext uri="{909E8E84-426E-40DD-AFC4-6F175D3DCCD1}">
+              <a14:hiddenFill xmlns:a14="http://schemas.microsoft.com/office/drawing/2010/main">
+                <a:solidFill>
+                  <a:srgbClr val="FFFFFF"/>
+                </a:solidFill>
+              </a14:hiddenFill>
+            </a:ext>
+          </a:extLst>
+        </p:spPr>
+      </p:pic>
+      <p:pic>
+        <p:nvPicPr>
+          <p:cNvPr id="2058" name="Picture 10">
+            <a:extLst>
+              <a:ext uri="{FF2B5EF4-FFF2-40B4-BE49-F238E27FC236}">
+                <a16:creationId xmlns:a16="http://schemas.microsoft.com/office/drawing/2014/main" id="{FC4CB43A-517A-4AAC-838D-4D51ACCFF191}"/>
+              </a:ext>
+            </a:extLst>
+          </p:cNvPr>
+          <p:cNvPicPr>
+            <a:picLocks noChangeAspect="1" noChangeArrowheads="1"/>
+          </p:cNvPicPr>
+          <p:nvPr/>
+        </p:nvPicPr>
+        <p:blipFill>
+          <a:blip r:embed="rId6">
+            <a:extLst>
+              <a:ext uri="{28A0092B-C50C-407E-A947-70E740481C1C}">
+                <a14:useLocalDpi xmlns:a14="http://schemas.microsoft.com/office/drawing/2010/main" val="0"/>
+              </a:ext>
+            </a:extLst>
+          </a:blip>
+          <a:srcRect/>
+          <a:stretch>
+            <a:fillRect/>
+          </a:stretch>
+        </p:blipFill>
+        <p:spPr bwMode="auto">
+          <a:xfrm>
+            <a:off x="8758303" y="167031"/>
+            <a:ext cx="2666407" cy="1999805"/>
+          </a:xfrm>
+          <a:prstGeom prst="rect">
+            <a:avLst/>
+          </a:prstGeom>
+          <a:noFill/>
+          <a:extLst>
+            <a:ext uri="{909E8E84-426E-40DD-AFC4-6F175D3DCCD1}">
+              <a14:hiddenFill xmlns:a14="http://schemas.microsoft.com/office/drawing/2010/main">
+                <a:solidFill>
+                  <a:srgbClr val="FFFFFF"/>
+                </a:solidFill>
+              </a14:hiddenFill>
+            </a:ext>
+          </a:extLst>
+        </p:spPr>
+      </p:pic>
+      <p:pic>
+        <p:nvPicPr>
+          <p:cNvPr id="2060" name="Picture 12" descr="maxflow_deer">
+            <a:extLst>
+              <a:ext uri="{FF2B5EF4-FFF2-40B4-BE49-F238E27FC236}">
+                <a16:creationId xmlns:a16="http://schemas.microsoft.com/office/drawing/2014/main" id="{99D48B24-7174-4A80-AA32-3645E8CD081C}"/>
+              </a:ext>
+            </a:extLst>
+          </p:cNvPr>
+          <p:cNvPicPr>
+            <a:picLocks noChangeAspect="1" noChangeArrowheads="1"/>
+          </p:cNvPicPr>
+          <p:nvPr/>
+        </p:nvPicPr>
+        <p:blipFill rotWithShape="1">
+          <a:blip r:embed="rId7">
+            <a:extLst>
+              <a:ext uri="{28A0092B-C50C-407E-A947-70E740481C1C}">
+                <a14:useLocalDpi xmlns:a14="http://schemas.microsoft.com/office/drawing/2010/main" val="0"/>
+              </a:ext>
+            </a:extLst>
+          </a:blip>
+          <a:srcRect t="4555"/>
+          <a:stretch/>
+        </p:blipFill>
+        <p:spPr bwMode="auto">
+          <a:xfrm>
+            <a:off x="7292803" y="2288400"/>
+            <a:ext cx="4215018" cy="3987287"/>
+          </a:xfrm>
+          <a:prstGeom prst="rect">
+            <a:avLst/>
+          </a:prstGeom>
+          <a:noFill/>
+          <a:extLst>
+            <a:ext uri="{909E8E84-426E-40DD-AFC4-6F175D3DCCD1}">
+              <a14:hiddenFill xmlns:a14="http://schemas.microsoft.com/office/drawing/2010/main">
+                <a:solidFill>
+                  <a:srgbClr val="FFFFFF"/>
+                </a:solidFill>
+              </a14:hiddenFill>
+            </a:ext>
+          </a:extLst>
+        </p:spPr>
+      </p:pic>
+      <p:sp>
+        <p:nvSpPr>
+          <p:cNvPr id="18" name="TextBox 17">
+            <a:extLst>
+              <a:ext uri="{FF2B5EF4-FFF2-40B4-BE49-F238E27FC236}">
+                <a16:creationId xmlns:a16="http://schemas.microsoft.com/office/drawing/2014/main" id="{C7D5C500-5706-40E5-AFC2-2D521DD7C1DF}"/>
+              </a:ext>
+            </a:extLst>
+          </p:cNvPr>
+          <p:cNvSpPr txBox="1"/>
+          <p:nvPr/>
+        </p:nvSpPr>
+        <p:spPr>
+          <a:xfrm>
+            <a:off x="5002971" y="6465699"/>
+            <a:ext cx="6094378" cy="261610"/>
+          </a:xfrm>
+          <a:prstGeom prst="rect">
+            <a:avLst/>
+          </a:prstGeom>
+          <a:noFill/>
+        </p:spPr>
+        <p:txBody>
+          <a:bodyPr wrap="square">
+            <a:spAutoFit/>
+          </a:bodyPr>
+          <a:lstStyle/>
+          <a:p>
+            <a:r>
+              <a:rPr lang="en-US" sz="1100" dirty="0"/>
+              <a:t>https://sandipanweb.wordpress.com/2018/02/11/interactive-image-segmentation-with-graph-cut/</a:t>
+            </a:r>
+          </a:p>
+        </p:txBody>
+      </p:sp>
+      <p:sp>
+        <p:nvSpPr>
+          <p:cNvPr id="20" name="TextBox 19">
+            <a:extLst>
+              <a:ext uri="{FF2B5EF4-FFF2-40B4-BE49-F238E27FC236}">
+                <a16:creationId xmlns:a16="http://schemas.microsoft.com/office/drawing/2014/main" id="{6667B5E1-7D1B-4B9F-945D-1FB02945BF4A}"/>
+              </a:ext>
+            </a:extLst>
+          </p:cNvPr>
+          <p:cNvSpPr txBox="1"/>
+          <p:nvPr/>
+        </p:nvSpPr>
+        <p:spPr>
+          <a:xfrm>
+            <a:off x="266700" y="6477316"/>
+            <a:ext cx="6096000" cy="261610"/>
+          </a:xfrm>
+          <a:prstGeom prst="rect">
+            <a:avLst/>
+          </a:prstGeom>
+          <a:noFill/>
+        </p:spPr>
+        <p:txBody>
+          <a:bodyPr wrap="square">
+            <a:spAutoFit/>
+          </a:bodyPr>
+          <a:lstStyle/>
+          <a:p>
+            <a:r>
+              <a:rPr lang="en-US" sz="1100" dirty="0">
+                <a:solidFill>
+                  <a:schemeClr val="bg1"/>
+                </a:solidFill>
+              </a:rPr>
+              <a:t>https://www.sciencedirect.com/science/article/pii/S1361841515000729</a:t>
+            </a:r>
           </a:p>
         </p:txBody>
       </p:sp>
     </p:spTree>
     <p:extLst>
       <p:ext uri="{BB962C8B-B14F-4D97-AF65-F5344CB8AC3E}">
-        <p14:creationId xmlns:p14="http://schemas.microsoft.com/office/powerpoint/2010/main" val="3235414937"/>
+        <p14:creationId xmlns:p14="http://schemas.microsoft.com/office/powerpoint/2010/main" val="1765597763"/>
       </p:ext>
     </p:extLst>
   </p:cSld>
@@ -3662,6 +5203,247 @@
           <p:cNvPr id="2" name="Title 1">
             <a:extLst>
               <a:ext uri="{FF2B5EF4-FFF2-40B4-BE49-F238E27FC236}">
+                <a16:creationId xmlns:a16="http://schemas.microsoft.com/office/drawing/2014/main" id="{8FC5E55B-6F10-4279-8A60-28F7BFA6F1D2}"/>
+              </a:ext>
+            </a:extLst>
+          </p:cNvPr>
+          <p:cNvSpPr>
+            <a:spLocks noGrp="1"/>
+          </p:cNvSpPr>
+          <p:nvPr>
+            <p:ph type="title"/>
+          </p:nvPr>
+        </p:nvSpPr>
+        <p:spPr/>
+        <p:txBody>
+          <a:bodyPr/>
+          <a:lstStyle/>
+          <a:p>
+            <a:r>
+              <a:rPr lang="en-US" dirty="0"/>
+              <a:t>Proposal</a:t>
+            </a:r>
+          </a:p>
+        </p:txBody>
+      </p:sp>
+      <p:sp>
+        <p:nvSpPr>
+          <p:cNvPr id="3" name="Content Placeholder 2">
+            <a:extLst>
+              <a:ext uri="{FF2B5EF4-FFF2-40B4-BE49-F238E27FC236}">
+                <a16:creationId xmlns:a16="http://schemas.microsoft.com/office/drawing/2014/main" id="{3EB71C31-D5C0-47DF-8007-3589BBFE1D21}"/>
+              </a:ext>
+            </a:extLst>
+          </p:cNvPr>
+          <p:cNvSpPr>
+            <a:spLocks noGrp="1"/>
+          </p:cNvSpPr>
+          <p:nvPr>
+            <p:ph idx="1"/>
+          </p:nvPr>
+        </p:nvSpPr>
+        <p:spPr/>
+        <p:txBody>
+          <a:bodyPr/>
+          <a:lstStyle/>
+          <a:p>
+            <a:r>
+              <a:rPr lang="en-US" dirty="0"/>
+              <a:t>Idk just jotting down notes: </a:t>
+            </a:r>
+          </a:p>
+          <a:p>
+            <a:pPr lvl="1"/>
+            <a:r>
+              <a:rPr lang="en-US" dirty="0"/>
+              <a:t>Clustering methods: </a:t>
+            </a:r>
+            <a:r>
+              <a:rPr lang="en-US" dirty="0" err="1"/>
+              <a:t>Kmeans</a:t>
+            </a:r>
+            <a:r>
+              <a:rPr lang="en-US" dirty="0"/>
+              <a:t>, </a:t>
+            </a:r>
+            <a:r>
+              <a:rPr lang="en-US" dirty="0" err="1"/>
+              <a:t>Meanshift</a:t>
+            </a:r>
+            <a:r>
+              <a:rPr lang="en-US" dirty="0"/>
+              <a:t>, Gaussian Mixtures, </a:t>
+            </a:r>
+            <a:r>
+              <a:rPr lang="en-US" dirty="0" err="1"/>
+              <a:t>etc</a:t>
+            </a:r>
+            <a:endParaRPr lang="en-US" dirty="0"/>
+          </a:p>
+          <a:p>
+            <a:pPr lvl="1"/>
+            <a:r>
+              <a:rPr lang="en-US" dirty="0"/>
+              <a:t>Deep learning methods: </a:t>
+            </a:r>
+            <a:r>
+              <a:rPr lang="en-US" dirty="0" err="1"/>
+              <a:t>Unet</a:t>
+            </a:r>
+            <a:r>
+              <a:rPr lang="en-US" dirty="0"/>
+              <a:t> (probably not plausible to cover)</a:t>
+            </a:r>
+          </a:p>
+          <a:p>
+            <a:pPr lvl="1"/>
+            <a:r>
+              <a:rPr lang="en-US" dirty="0"/>
+              <a:t> Compression methods: Huffman coding</a:t>
+            </a:r>
+          </a:p>
+          <a:p>
+            <a:pPr lvl="1"/>
+            <a:r>
+              <a:rPr lang="en-US" dirty="0"/>
+              <a:t>Edge-based methods: Active contour model</a:t>
+            </a:r>
+          </a:p>
+          <a:p>
+            <a:pPr lvl="1"/>
+            <a:r>
+              <a:rPr lang="en-US"/>
+              <a:t>Region-based methods Watershed </a:t>
+            </a:r>
+            <a:endParaRPr lang="en-US" dirty="0"/>
+          </a:p>
+          <a:p>
+            <a:pPr lvl="1"/>
+            <a:r>
+              <a:rPr lang="en-US" dirty="0"/>
+              <a:t>Misc. Otsu’s method (binary threshold)</a:t>
+            </a:r>
+          </a:p>
+        </p:txBody>
+      </p:sp>
+    </p:spTree>
+    <p:extLst>
+      <p:ext uri="{BB962C8B-B14F-4D97-AF65-F5344CB8AC3E}">
+        <p14:creationId xmlns:p14="http://schemas.microsoft.com/office/powerpoint/2010/main" val="3781552176"/>
+      </p:ext>
+    </p:extLst>
+  </p:cSld>
+  <p:clrMapOvr>
+    <a:masterClrMapping/>
+  </p:clrMapOvr>
+</p:sld>
+</file>
+
+<file path=ppt/slides/slide5.xml><?xml version="1.0" encoding="utf-8"?>
+<p:sld xmlns:a="http://schemas.openxmlformats.org/drawingml/2006/main" xmlns:r="http://schemas.openxmlformats.org/officeDocument/2006/relationships" xmlns:p="http://schemas.openxmlformats.org/presentationml/2006/main">
+  <p:cSld>
+    <p:spTree>
+      <p:nvGrpSpPr>
+        <p:cNvPr id="1" name=""/>
+        <p:cNvGrpSpPr/>
+        <p:nvPr/>
+      </p:nvGrpSpPr>
+      <p:grpSpPr>
+        <a:xfrm>
+          <a:off x="0" y="0"/>
+          <a:ext cx="0" cy="0"/>
+          <a:chOff x="0" y="0"/>
+          <a:chExt cx="0" cy="0"/>
+        </a:xfrm>
+      </p:grpSpPr>
+      <p:sp>
+        <p:nvSpPr>
+          <p:cNvPr id="2" name="Title 1">
+            <a:extLst>
+              <a:ext uri="{FF2B5EF4-FFF2-40B4-BE49-F238E27FC236}">
+                <a16:creationId xmlns:a16="http://schemas.microsoft.com/office/drawing/2014/main" id="{1EF15F91-D945-4584-B48E-FE9D25F644FB}"/>
+              </a:ext>
+            </a:extLst>
+          </p:cNvPr>
+          <p:cNvSpPr>
+            <a:spLocks noGrp="1"/>
+          </p:cNvSpPr>
+          <p:nvPr>
+            <p:ph type="title"/>
+          </p:nvPr>
+        </p:nvSpPr>
+        <p:spPr/>
+        <p:txBody>
+          <a:bodyPr/>
+          <a:lstStyle/>
+          <a:p>
+            <a:r>
+              <a:rPr lang="en-US" dirty="0"/>
+              <a:t>Overview</a:t>
+            </a:r>
+          </a:p>
+        </p:txBody>
+      </p:sp>
+      <p:sp>
+        <p:nvSpPr>
+          <p:cNvPr id="3" name="Content Placeholder 2">
+            <a:extLst>
+              <a:ext uri="{FF2B5EF4-FFF2-40B4-BE49-F238E27FC236}">
+                <a16:creationId xmlns:a16="http://schemas.microsoft.com/office/drawing/2014/main" id="{BCB72640-F1EA-4235-8F3E-D10D7F5D042E}"/>
+              </a:ext>
+            </a:extLst>
+          </p:cNvPr>
+          <p:cNvSpPr>
+            <a:spLocks noGrp="1"/>
+          </p:cNvSpPr>
+          <p:nvPr>
+            <p:ph idx="1"/>
+          </p:nvPr>
+        </p:nvSpPr>
+        <p:spPr/>
+        <p:txBody>
+          <a:bodyPr/>
+          <a:lstStyle/>
+          <a:p>
+            <a:endParaRPr lang="en-US" dirty="0"/>
+          </a:p>
+        </p:txBody>
+      </p:sp>
+    </p:spTree>
+    <p:extLst>
+      <p:ext uri="{BB962C8B-B14F-4D97-AF65-F5344CB8AC3E}">
+        <p14:creationId xmlns:p14="http://schemas.microsoft.com/office/powerpoint/2010/main" val="3235414937"/>
+      </p:ext>
+    </p:extLst>
+  </p:cSld>
+  <p:clrMapOvr>
+    <a:masterClrMapping/>
+  </p:clrMapOvr>
+</p:sld>
+</file>
+
+<file path=ppt/slides/slide6.xml><?xml version="1.0" encoding="utf-8"?>
+<p:sld xmlns:a="http://schemas.openxmlformats.org/drawingml/2006/main" xmlns:r="http://schemas.openxmlformats.org/officeDocument/2006/relationships" xmlns:p="http://schemas.openxmlformats.org/presentationml/2006/main">
+  <p:cSld>
+    <p:spTree>
+      <p:nvGrpSpPr>
+        <p:cNvPr id="1" name=""/>
+        <p:cNvGrpSpPr/>
+        <p:nvPr/>
+      </p:nvGrpSpPr>
+      <p:grpSpPr>
+        <a:xfrm>
+          <a:off x="0" y="0"/>
+          <a:ext cx="0" cy="0"/>
+          <a:chOff x="0" y="0"/>
+          <a:chExt cx="0" cy="0"/>
+        </a:xfrm>
+      </p:grpSpPr>
+      <p:sp>
+        <p:nvSpPr>
+          <p:cNvPr id="2" name="Title 1">
+            <a:extLst>
+              <a:ext uri="{FF2B5EF4-FFF2-40B4-BE49-F238E27FC236}">
                 <a16:creationId xmlns:a16="http://schemas.microsoft.com/office/drawing/2014/main" id="{B2A34987-857F-4E57-ADA0-AB5507E8BEBE}"/>
               </a:ext>
             </a:extLst>
@@ -3706,10 +5488,7 @@
           <a:bodyPr/>
           <a:lstStyle/>
           <a:p>
-            <a:r>
-              <a:rPr lang="en-US"/>
-              <a:t>OpenCV Python, C++</a:t>
-            </a:r>
+            <a:endParaRPr lang="en-US"/>
           </a:p>
         </p:txBody>
       </p:sp>
@@ -3726,7 +5505,7 @@
 </p:sld>
 </file>
 
-<file path=ppt/slides/slide5.xml><?xml version="1.0" encoding="utf-8"?>
+<file path=ppt/slides/slide7.xml><?xml version="1.0" encoding="utf-8"?>
 <p:sld xmlns:a="http://schemas.openxmlformats.org/drawingml/2006/main" xmlns:r="http://schemas.openxmlformats.org/officeDocument/2006/relationships" xmlns:p="http://schemas.openxmlformats.org/presentationml/2006/main">
   <p:cSld>
     <p:spTree>

</xml_diff>

<commit_message>
added propsal and implementation slides
</commit_message>
<xml_diff>
--- a/Presentation.pptx
+++ b/Presentation.pptx
@@ -8,10 +8,9 @@
     <p:sldId id="256" r:id="rId2"/>
     <p:sldId id="262" r:id="rId3"/>
     <p:sldId id="263" r:id="rId4"/>
-    <p:sldId id="257" r:id="rId5"/>
-    <p:sldId id="259" r:id="rId6"/>
-    <p:sldId id="258" r:id="rId7"/>
-    <p:sldId id="260" r:id="rId8"/>
+    <p:sldId id="264" r:id="rId5"/>
+    <p:sldId id="265" r:id="rId6"/>
+    <p:sldId id="260" r:id="rId7"/>
   </p:sldIdLst>
   <p:sldSz cx="12192000" cy="6858000"/>
   <p:notesSz cx="6858000" cy="9144000"/>
@@ -5184,6 +5183,14 @@
 <file path=ppt/slides/slide4.xml><?xml version="1.0" encoding="utf-8"?>
 <p:sld xmlns:a="http://schemas.openxmlformats.org/drawingml/2006/main" xmlns:r="http://schemas.openxmlformats.org/officeDocument/2006/relationships" xmlns:p="http://schemas.openxmlformats.org/presentationml/2006/main">
   <p:cSld>
+    <p:bg>
+      <p:bgPr>
+        <a:solidFill>
+          <a:schemeClr val="bg1"/>
+        </a:solidFill>
+        <a:effectLst/>
+      </p:bgPr>
+    </p:bg>
     <p:spTree>
       <p:nvGrpSpPr>
         <p:cNvPr id="1" name=""/>
@@ -5198,12 +5205,193 @@
           <a:chExt cx="0" cy="0"/>
         </a:xfrm>
       </p:grpSpPr>
+      <p:sp useBgFill="1">
+        <p:nvSpPr>
+          <p:cNvPr id="135" name="Rectangle 134">
+            <a:extLst>
+              <a:ext uri="{FF2B5EF4-FFF2-40B4-BE49-F238E27FC236}">
+                <a16:creationId xmlns:a16="http://schemas.microsoft.com/office/drawing/2014/main" id="{33CD251C-A887-4D2F-925B-FC097198538B}"/>
+              </a:ext>
+              <a:ext uri="{C183D7F6-B498-43B3-948B-1728B52AA6E4}">
+                <adec:decorative xmlns:adec="http://schemas.microsoft.com/office/drawing/2017/decorative" val="1"/>
+              </a:ext>
+            </a:extLst>
+          </p:cNvPr>
+          <p:cNvSpPr>
+            <a:spLocks noGrp="1" noRot="1" noChangeAspect="1" noMove="1" noResize="1" noEditPoints="1" noAdjustHandles="1" noChangeArrowheads="1" noChangeShapeType="1" noTextEdit="1"/>
+          </p:cNvSpPr>
+          <p:nvPr>
+            <p:extLst>
+              <p:ext uri="{386F3935-93C4-4BCD-93E2-E3B085C9AB24}">
+                <p16:designElem xmlns:p16="http://schemas.microsoft.com/office/powerpoint/2015/main" val="1"/>
+              </p:ext>
+            </p:extLst>
+          </p:nvPr>
+        </p:nvSpPr>
+        <p:spPr>
+          <a:xfrm>
+            <a:off x="0" y="0"/>
+            <a:ext cx="12192000" cy="6858000"/>
+          </a:xfrm>
+          <a:prstGeom prst="rect">
+            <a:avLst/>
+          </a:prstGeom>
+          <a:ln>
+            <a:noFill/>
+          </a:ln>
+        </p:spPr>
+        <p:style>
+          <a:lnRef idx="2">
+            <a:schemeClr val="accent1">
+              <a:shade val="50000"/>
+            </a:schemeClr>
+          </a:lnRef>
+          <a:fillRef idx="1">
+            <a:schemeClr val="accent1"/>
+          </a:fillRef>
+          <a:effectRef idx="0">
+            <a:schemeClr val="accent1"/>
+          </a:effectRef>
+          <a:fontRef idx="minor">
+            <a:schemeClr val="lt1"/>
+          </a:fontRef>
+        </p:style>
+        <p:txBody>
+          <a:bodyPr rtlCol="0" anchor="ctr"/>
+          <a:lstStyle/>
+          <a:p>
+            <a:pPr marL="0" marR="0" lvl="0" indent="0" algn="ctr" defTabSz="914400" rtl="0" eaLnBrk="1" fontAlgn="auto" latinLnBrk="0" hangingPunct="1">
+              <a:lnSpc>
+                <a:spcPct val="100000"/>
+              </a:lnSpc>
+              <a:spcBef>
+                <a:spcPts val="0"/>
+              </a:spcBef>
+              <a:spcAft>
+                <a:spcPts val="0"/>
+              </a:spcAft>
+              <a:buClrTx/>
+              <a:buSzTx/>
+              <a:buFontTx/>
+              <a:buNone/>
+              <a:tabLst/>
+              <a:defRPr/>
+            </a:pPr>
+            <a:endParaRPr kumimoji="0" lang="en-US" sz="1800" b="0" i="0" u="none" strike="noStrike" kern="1200" cap="none" spc="0" normalizeH="0" baseline="0" noProof="0">
+              <a:ln>
+                <a:noFill/>
+              </a:ln>
+              <a:solidFill>
+                <a:prstClr val="white"/>
+              </a:solidFill>
+              <a:effectLst/>
+              <a:uLnTx/>
+              <a:uFillTx/>
+              <a:latin typeface="Calibri" panose="020F0502020204030204"/>
+              <a:ea typeface="+mn-ea"/>
+              <a:cs typeface="+mn-cs"/>
+            </a:endParaRPr>
+          </a:p>
+        </p:txBody>
+      </p:sp>
+      <p:sp>
+        <p:nvSpPr>
+          <p:cNvPr id="137" name="Rectangle 136">
+            <a:extLst>
+              <a:ext uri="{FF2B5EF4-FFF2-40B4-BE49-F238E27FC236}">
+                <a16:creationId xmlns:a16="http://schemas.microsoft.com/office/drawing/2014/main" id="{B19D093C-27FB-4032-B282-42C4563F257C}"/>
+              </a:ext>
+              <a:ext uri="{C183D7F6-B498-43B3-948B-1728B52AA6E4}">
+                <adec:decorative xmlns:adec="http://schemas.microsoft.com/office/drawing/2017/decorative" val="1"/>
+              </a:ext>
+            </a:extLst>
+          </p:cNvPr>
+          <p:cNvSpPr>
+            <a:spLocks noGrp="1" noRot="1" noChangeAspect="1" noMove="1" noResize="1" noEditPoints="1" noAdjustHandles="1" noChangeArrowheads="1" noChangeShapeType="1" noTextEdit="1"/>
+          </p:cNvSpPr>
+          <p:nvPr>
+            <p:extLst>
+              <p:ext uri="{386F3935-93C4-4BCD-93E2-E3B085C9AB24}">
+                <p16:designElem xmlns:p16="http://schemas.microsoft.com/office/powerpoint/2015/main" val="1"/>
+              </p:ext>
+            </p:extLst>
+          </p:nvPr>
+        </p:nvSpPr>
+        <p:spPr>
+          <a:xfrm>
+            <a:off x="0" y="0"/>
+            <a:ext cx="4694548" cy="6858000"/>
+          </a:xfrm>
+          <a:prstGeom prst="rect">
+            <a:avLst/>
+          </a:prstGeom>
+          <a:solidFill>
+            <a:schemeClr val="tx1"/>
+          </a:solidFill>
+          <a:ln>
+            <a:noFill/>
+          </a:ln>
+        </p:spPr>
+        <p:style>
+          <a:lnRef idx="2">
+            <a:schemeClr val="accent1">
+              <a:shade val="50000"/>
+            </a:schemeClr>
+          </a:lnRef>
+          <a:fillRef idx="1">
+            <a:schemeClr val="accent1"/>
+          </a:fillRef>
+          <a:effectRef idx="0">
+            <a:schemeClr val="accent1"/>
+          </a:effectRef>
+          <a:fontRef idx="minor">
+            <a:schemeClr val="lt1"/>
+          </a:fontRef>
+        </p:style>
+        <p:txBody>
+          <a:bodyPr rtlCol="0" anchor="ctr"/>
+          <a:lstStyle/>
+          <a:p>
+            <a:pPr marL="0" marR="0" lvl="0" indent="0" algn="ctr" defTabSz="914400" rtl="0" eaLnBrk="1" fontAlgn="auto" latinLnBrk="0" hangingPunct="1">
+              <a:lnSpc>
+                <a:spcPct val="100000"/>
+              </a:lnSpc>
+              <a:spcBef>
+                <a:spcPts val="0"/>
+              </a:spcBef>
+              <a:spcAft>
+                <a:spcPts val="0"/>
+              </a:spcAft>
+              <a:buClrTx/>
+              <a:buSzTx/>
+              <a:buFontTx/>
+              <a:buNone/>
+              <a:tabLst/>
+              <a:defRPr/>
+            </a:pPr>
+            <a:endParaRPr kumimoji="0" lang="en-US" sz="1800" b="0" i="0" u="none" strike="noStrike" kern="1200" cap="none" spc="0" normalizeH="0" baseline="0" noProof="0">
+              <a:ln>
+                <a:noFill/>
+              </a:ln>
+              <a:solidFill>
+                <a:prstClr val="white"/>
+              </a:solidFill>
+              <a:effectLst/>
+              <a:uLnTx/>
+              <a:uFillTx/>
+              <a:latin typeface="Calibri" panose="020F0502020204030204"/>
+              <a:ea typeface="+mn-ea"/>
+              <a:cs typeface="+mn-cs"/>
+            </a:endParaRPr>
+          </a:p>
+        </p:txBody>
+      </p:sp>
       <p:sp>
         <p:nvSpPr>
           <p:cNvPr id="2" name="Title 1">
             <a:extLst>
               <a:ext uri="{FF2B5EF4-FFF2-40B4-BE49-F238E27FC236}">
-                <a16:creationId xmlns:a16="http://schemas.microsoft.com/office/drawing/2014/main" id="{8FC5E55B-6F10-4279-8A60-28F7BFA6F1D2}"/>
+                <a16:creationId xmlns:a16="http://schemas.microsoft.com/office/drawing/2014/main" id="{9200BA96-8C2E-42A8-BD1A-F04E623212EF}"/>
               </a:ext>
             </a:extLst>
           </p:cNvPr>
@@ -5214,24 +5402,504 @@
             <p:ph type="title"/>
           </p:nvPr>
         </p:nvSpPr>
-        <p:spPr/>
-        <p:txBody>
-          <a:bodyPr/>
+        <p:spPr>
+          <a:xfrm>
+            <a:off x="767290" y="1780661"/>
+            <a:ext cx="3582073" cy="1463472"/>
+          </a:xfrm>
+        </p:spPr>
+        <p:txBody>
+          <a:bodyPr vert="horz" lIns="91440" tIns="45720" rIns="91440" bIns="45720" rtlCol="0" anchor="t">
+            <a:normAutofit/>
+          </a:bodyPr>
           <a:lstStyle/>
           <a:p>
             <a:r>
-              <a:rPr lang="en-US" dirty="0"/>
+              <a:rPr lang="en-US" sz="3000" kern="1200" dirty="0">
+                <a:solidFill>
+                  <a:schemeClr val="bg1"/>
+                </a:solidFill>
+                <a:latin typeface="+mj-lt"/>
+                <a:ea typeface="+mj-ea"/>
+                <a:cs typeface="+mj-cs"/>
+              </a:rPr>
               <a:t>Proposal</a:t>
             </a:r>
           </a:p>
         </p:txBody>
       </p:sp>
+      <p:grpSp>
+        <p:nvGrpSpPr>
+          <p:cNvPr id="139" name="Group 138">
+            <a:extLst>
+              <a:ext uri="{FF2B5EF4-FFF2-40B4-BE49-F238E27FC236}">
+                <a16:creationId xmlns:a16="http://schemas.microsoft.com/office/drawing/2014/main" id="{35EE815E-1BD3-4777-B652-6D98825BF66B}"/>
+              </a:ext>
+              <a:ext uri="{C183D7F6-B498-43B3-948B-1728B52AA6E4}">
+                <adec:decorative xmlns:adec="http://schemas.microsoft.com/office/drawing/2017/decorative" val="1"/>
+              </a:ext>
+            </a:extLst>
+          </p:cNvPr>
+          <p:cNvGrpSpPr>
+            <a:grpSpLocks noGrp="1" noUngrp="1" noRot="1" noChangeAspect="1" noMove="1" noResize="1"/>
+          </p:cNvGrpSpPr>
+          <p:nvPr>
+            <p:extLst>
+              <p:ext uri="{386F3935-93C4-4BCD-93E2-E3B085C9AB24}">
+                <p16:designElem xmlns:p16="http://schemas.microsoft.com/office/powerpoint/2015/main" val="1"/>
+              </p:ext>
+            </p:extLst>
+          </p:nvPr>
+        </p:nvGrpSpPr>
+        <p:grpSpPr>
+          <a:xfrm>
+            <a:off x="767290" y="681628"/>
+            <a:ext cx="1128382" cy="847206"/>
+            <a:chOff x="668003" y="1684057"/>
+            <a:chExt cx="1128382" cy="847206"/>
+          </a:xfrm>
+        </p:grpSpPr>
+        <p:sp>
+          <p:nvSpPr>
+            <p:cNvPr id="140" name="Freeform 5">
+              <a:extLst>
+                <a:ext uri="{FF2B5EF4-FFF2-40B4-BE49-F238E27FC236}">
+                  <a16:creationId xmlns:a16="http://schemas.microsoft.com/office/drawing/2014/main" id="{E6692982-4A7D-4392-87CD-F0CD4B027DDE}"/>
+                </a:ext>
+                <a:ext uri="{C183D7F6-B498-43B3-948B-1728B52AA6E4}">
+                  <adec:decorative xmlns:adec="http://schemas.microsoft.com/office/drawing/2017/decorative" val="1"/>
+                </a:ext>
+              </a:extLst>
+            </p:cNvPr>
+            <p:cNvSpPr>
+              <a:spLocks/>
+            </p:cNvSpPr>
+            <p:nvPr>
+              <p:extLst>
+                <p:ext uri="{386F3935-93C4-4BCD-93E2-E3B085C9AB24}">
+                  <p16:designElem xmlns:p16="http://schemas.microsoft.com/office/powerpoint/2015/main" val="1"/>
+                </p:ext>
+              </p:extLst>
+            </p:nvPr>
+          </p:nvSpPr>
+          <p:spPr bwMode="auto">
+            <a:xfrm>
+              <a:off x="668003" y="1935883"/>
+              <a:ext cx="675351" cy="595380"/>
+            </a:xfrm>
+            <a:custGeom>
+              <a:avLst/>
+              <a:gdLst>
+                <a:gd name="T0" fmla="*/ 225 w 785"/>
+                <a:gd name="T1" fmla="*/ 692 h 692"/>
+                <a:gd name="T2" fmla="*/ 177 w 785"/>
+                <a:gd name="T3" fmla="*/ 665 h 692"/>
+                <a:gd name="T4" fmla="*/ 9 w 785"/>
+                <a:gd name="T5" fmla="*/ 374 h 692"/>
+                <a:gd name="T6" fmla="*/ 9 w 785"/>
+                <a:gd name="T7" fmla="*/ 318 h 692"/>
+                <a:gd name="T8" fmla="*/ 177 w 785"/>
+                <a:gd name="T9" fmla="*/ 27 h 692"/>
+                <a:gd name="T10" fmla="*/ 225 w 785"/>
+                <a:gd name="T11" fmla="*/ 0 h 692"/>
+                <a:gd name="T12" fmla="*/ 561 w 785"/>
+                <a:gd name="T13" fmla="*/ 0 h 692"/>
+                <a:gd name="T14" fmla="*/ 609 w 785"/>
+                <a:gd name="T15" fmla="*/ 27 h 692"/>
+                <a:gd name="T16" fmla="*/ 777 w 785"/>
+                <a:gd name="T17" fmla="*/ 318 h 692"/>
+                <a:gd name="T18" fmla="*/ 777 w 785"/>
+                <a:gd name="T19" fmla="*/ 374 h 692"/>
+                <a:gd name="T20" fmla="*/ 609 w 785"/>
+                <a:gd name="T21" fmla="*/ 665 h 692"/>
+                <a:gd name="T22" fmla="*/ 561 w 785"/>
+                <a:gd name="T23" fmla="*/ 692 h 692"/>
+                <a:gd name="T24" fmla="*/ 225 w 785"/>
+                <a:gd name="T25" fmla="*/ 692 h 692"/>
+              </a:gdLst>
+              <a:ahLst/>
+              <a:cxnLst>
+                <a:cxn ang="0">
+                  <a:pos x="T0" y="T1"/>
+                </a:cxn>
+                <a:cxn ang="0">
+                  <a:pos x="T2" y="T3"/>
+                </a:cxn>
+                <a:cxn ang="0">
+                  <a:pos x="T4" y="T5"/>
+                </a:cxn>
+                <a:cxn ang="0">
+                  <a:pos x="T6" y="T7"/>
+                </a:cxn>
+                <a:cxn ang="0">
+                  <a:pos x="T8" y="T9"/>
+                </a:cxn>
+                <a:cxn ang="0">
+                  <a:pos x="T10" y="T11"/>
+                </a:cxn>
+                <a:cxn ang="0">
+                  <a:pos x="T12" y="T13"/>
+                </a:cxn>
+                <a:cxn ang="0">
+                  <a:pos x="T14" y="T15"/>
+                </a:cxn>
+                <a:cxn ang="0">
+                  <a:pos x="T16" y="T17"/>
+                </a:cxn>
+                <a:cxn ang="0">
+                  <a:pos x="T18" y="T19"/>
+                </a:cxn>
+                <a:cxn ang="0">
+                  <a:pos x="T20" y="T21"/>
+                </a:cxn>
+                <a:cxn ang="0">
+                  <a:pos x="T22" y="T23"/>
+                </a:cxn>
+                <a:cxn ang="0">
+                  <a:pos x="T24" y="T25"/>
+                </a:cxn>
+              </a:cxnLst>
+              <a:rect l="0" t="0" r="r" b="b"/>
+              <a:pathLst>
+                <a:path w="785" h="692">
+                  <a:moveTo>
+                    <a:pt x="225" y="692"/>
+                  </a:moveTo>
+                  <a:cubicBezTo>
+                    <a:pt x="207" y="692"/>
+                    <a:pt x="185" y="680"/>
+                    <a:pt x="177" y="665"/>
+                  </a:cubicBezTo>
+                  <a:cubicBezTo>
+                    <a:pt x="9" y="374"/>
+                    <a:pt x="9" y="374"/>
+                    <a:pt x="9" y="374"/>
+                  </a:cubicBezTo>
+                  <a:cubicBezTo>
+                    <a:pt x="0" y="358"/>
+                    <a:pt x="0" y="334"/>
+                    <a:pt x="9" y="318"/>
+                  </a:cubicBezTo>
+                  <a:cubicBezTo>
+                    <a:pt x="177" y="27"/>
+                    <a:pt x="177" y="27"/>
+                    <a:pt x="177" y="27"/>
+                  </a:cubicBezTo>
+                  <a:cubicBezTo>
+                    <a:pt x="185" y="12"/>
+                    <a:pt x="207" y="0"/>
+                    <a:pt x="225" y="0"/>
+                  </a:cubicBezTo>
+                  <a:cubicBezTo>
+                    <a:pt x="561" y="0"/>
+                    <a:pt x="561" y="0"/>
+                    <a:pt x="561" y="0"/>
+                  </a:cubicBezTo>
+                  <a:cubicBezTo>
+                    <a:pt x="578" y="0"/>
+                    <a:pt x="600" y="12"/>
+                    <a:pt x="609" y="27"/>
+                  </a:cubicBezTo>
+                  <a:cubicBezTo>
+                    <a:pt x="777" y="318"/>
+                    <a:pt x="777" y="318"/>
+                    <a:pt x="777" y="318"/>
+                  </a:cubicBezTo>
+                  <a:cubicBezTo>
+                    <a:pt x="785" y="334"/>
+                    <a:pt x="785" y="358"/>
+                    <a:pt x="777" y="374"/>
+                  </a:cubicBezTo>
+                  <a:cubicBezTo>
+                    <a:pt x="609" y="665"/>
+                    <a:pt x="609" y="665"/>
+                    <a:pt x="609" y="665"/>
+                  </a:cubicBezTo>
+                  <a:cubicBezTo>
+                    <a:pt x="600" y="680"/>
+                    <a:pt x="578" y="692"/>
+                    <a:pt x="561" y="692"/>
+                  </a:cubicBezTo>
+                  <a:lnTo>
+                    <a:pt x="225" y="692"/>
+                  </a:lnTo>
+                  <a:close/>
+                </a:path>
+              </a:pathLst>
+            </a:custGeom>
+            <a:noFill/>
+            <a:ln w="28575" cmpd="sng">
+              <a:solidFill>
+                <a:schemeClr val="bg1"/>
+              </a:solidFill>
+            </a:ln>
+          </p:spPr>
+          <p:txBody>
+            <a:bodyPr vert="horz" wrap="square" lIns="91440" tIns="45720" rIns="91440" bIns="45720" numCol="1" anchor="t" anchorCtr="0" compatLnSpc="1">
+              <a:prstTxWarp prst="textNoShape">
+                <a:avLst/>
+              </a:prstTxWarp>
+            </a:bodyPr>
+            <a:lstStyle/>
+            <a:p>
+              <a:pPr marL="0" marR="0" lvl="0" indent="0" algn="l" defTabSz="914400" rtl="0" eaLnBrk="1" fontAlgn="auto" latinLnBrk="0" hangingPunct="1">
+                <a:lnSpc>
+                  <a:spcPct val="100000"/>
+                </a:lnSpc>
+                <a:spcBef>
+                  <a:spcPts val="0"/>
+                </a:spcBef>
+                <a:spcAft>
+                  <a:spcPts val="0"/>
+                </a:spcAft>
+                <a:buClrTx/>
+                <a:buSzTx/>
+                <a:buFontTx/>
+                <a:buNone/>
+                <a:tabLst/>
+                <a:defRPr/>
+              </a:pPr>
+              <a:endParaRPr kumimoji="0" lang="en-US" sz="1800" b="0" i="0" u="none" strike="noStrike" kern="1200" cap="none" spc="0" normalizeH="0" baseline="0" noProof="0">
+                <a:ln>
+                  <a:noFill/>
+                </a:ln>
+                <a:solidFill>
+                  <a:prstClr val="black"/>
+                </a:solidFill>
+                <a:effectLst/>
+                <a:uLnTx/>
+                <a:uFillTx/>
+                <a:latin typeface="Calibri" panose="020F0502020204030204"/>
+                <a:ea typeface="+mn-ea"/>
+                <a:cs typeface="+mn-cs"/>
+              </a:endParaRPr>
+            </a:p>
+          </p:txBody>
+        </p:sp>
+        <p:sp>
+          <p:nvSpPr>
+            <p:cNvPr id="141" name="Freeform 5">
+              <a:extLst>
+                <a:ext uri="{FF2B5EF4-FFF2-40B4-BE49-F238E27FC236}">
+                  <a16:creationId xmlns:a16="http://schemas.microsoft.com/office/drawing/2014/main" id="{196485F7-F277-4123-AC53-98EA4C858774}"/>
+                </a:ext>
+                <a:ext uri="{C183D7F6-B498-43B3-948B-1728B52AA6E4}">
+                  <adec:decorative xmlns:adec="http://schemas.microsoft.com/office/drawing/2017/decorative" val="1"/>
+                </a:ext>
+              </a:extLst>
+            </p:cNvPr>
+            <p:cNvSpPr>
+              <a:spLocks/>
+            </p:cNvSpPr>
+            <p:nvPr>
+              <p:extLst>
+                <p:ext uri="{386F3935-93C4-4BCD-93E2-E3B085C9AB24}">
+                  <p16:designElem xmlns:p16="http://schemas.microsoft.com/office/powerpoint/2015/main" val="1"/>
+                </p:ext>
+              </p:extLst>
+            </p:nvPr>
+          </p:nvSpPr>
+          <p:spPr bwMode="auto">
+            <a:xfrm>
+              <a:off x="1245893" y="1684057"/>
+              <a:ext cx="550492" cy="485306"/>
+            </a:xfrm>
+            <a:custGeom>
+              <a:avLst/>
+              <a:gdLst>
+                <a:gd name="T0" fmla="*/ 225 w 785"/>
+                <a:gd name="T1" fmla="*/ 692 h 692"/>
+                <a:gd name="T2" fmla="*/ 177 w 785"/>
+                <a:gd name="T3" fmla="*/ 665 h 692"/>
+                <a:gd name="T4" fmla="*/ 9 w 785"/>
+                <a:gd name="T5" fmla="*/ 374 h 692"/>
+                <a:gd name="T6" fmla="*/ 9 w 785"/>
+                <a:gd name="T7" fmla="*/ 318 h 692"/>
+                <a:gd name="T8" fmla="*/ 177 w 785"/>
+                <a:gd name="T9" fmla="*/ 27 h 692"/>
+                <a:gd name="T10" fmla="*/ 225 w 785"/>
+                <a:gd name="T11" fmla="*/ 0 h 692"/>
+                <a:gd name="T12" fmla="*/ 561 w 785"/>
+                <a:gd name="T13" fmla="*/ 0 h 692"/>
+                <a:gd name="T14" fmla="*/ 609 w 785"/>
+                <a:gd name="T15" fmla="*/ 27 h 692"/>
+                <a:gd name="T16" fmla="*/ 777 w 785"/>
+                <a:gd name="T17" fmla="*/ 318 h 692"/>
+                <a:gd name="T18" fmla="*/ 777 w 785"/>
+                <a:gd name="T19" fmla="*/ 374 h 692"/>
+                <a:gd name="T20" fmla="*/ 609 w 785"/>
+                <a:gd name="T21" fmla="*/ 665 h 692"/>
+                <a:gd name="T22" fmla="*/ 561 w 785"/>
+                <a:gd name="T23" fmla="*/ 692 h 692"/>
+                <a:gd name="T24" fmla="*/ 225 w 785"/>
+                <a:gd name="T25" fmla="*/ 692 h 692"/>
+              </a:gdLst>
+              <a:ahLst/>
+              <a:cxnLst>
+                <a:cxn ang="0">
+                  <a:pos x="T0" y="T1"/>
+                </a:cxn>
+                <a:cxn ang="0">
+                  <a:pos x="T2" y="T3"/>
+                </a:cxn>
+                <a:cxn ang="0">
+                  <a:pos x="T4" y="T5"/>
+                </a:cxn>
+                <a:cxn ang="0">
+                  <a:pos x="T6" y="T7"/>
+                </a:cxn>
+                <a:cxn ang="0">
+                  <a:pos x="T8" y="T9"/>
+                </a:cxn>
+                <a:cxn ang="0">
+                  <a:pos x="T10" y="T11"/>
+                </a:cxn>
+                <a:cxn ang="0">
+                  <a:pos x="T12" y="T13"/>
+                </a:cxn>
+                <a:cxn ang="0">
+                  <a:pos x="T14" y="T15"/>
+                </a:cxn>
+                <a:cxn ang="0">
+                  <a:pos x="T16" y="T17"/>
+                </a:cxn>
+                <a:cxn ang="0">
+                  <a:pos x="T18" y="T19"/>
+                </a:cxn>
+                <a:cxn ang="0">
+                  <a:pos x="T20" y="T21"/>
+                </a:cxn>
+                <a:cxn ang="0">
+                  <a:pos x="T22" y="T23"/>
+                </a:cxn>
+                <a:cxn ang="0">
+                  <a:pos x="T24" y="T25"/>
+                </a:cxn>
+              </a:cxnLst>
+              <a:rect l="0" t="0" r="r" b="b"/>
+              <a:pathLst>
+                <a:path w="785" h="692">
+                  <a:moveTo>
+                    <a:pt x="225" y="692"/>
+                  </a:moveTo>
+                  <a:cubicBezTo>
+                    <a:pt x="207" y="692"/>
+                    <a:pt x="185" y="680"/>
+                    <a:pt x="177" y="665"/>
+                  </a:cubicBezTo>
+                  <a:cubicBezTo>
+                    <a:pt x="9" y="374"/>
+                    <a:pt x="9" y="374"/>
+                    <a:pt x="9" y="374"/>
+                  </a:cubicBezTo>
+                  <a:cubicBezTo>
+                    <a:pt x="0" y="358"/>
+                    <a:pt x="0" y="334"/>
+                    <a:pt x="9" y="318"/>
+                  </a:cubicBezTo>
+                  <a:cubicBezTo>
+                    <a:pt x="177" y="27"/>
+                    <a:pt x="177" y="27"/>
+                    <a:pt x="177" y="27"/>
+                  </a:cubicBezTo>
+                  <a:cubicBezTo>
+                    <a:pt x="185" y="12"/>
+                    <a:pt x="207" y="0"/>
+                    <a:pt x="225" y="0"/>
+                  </a:cubicBezTo>
+                  <a:cubicBezTo>
+                    <a:pt x="561" y="0"/>
+                    <a:pt x="561" y="0"/>
+                    <a:pt x="561" y="0"/>
+                  </a:cubicBezTo>
+                  <a:cubicBezTo>
+                    <a:pt x="578" y="0"/>
+                    <a:pt x="600" y="12"/>
+                    <a:pt x="609" y="27"/>
+                  </a:cubicBezTo>
+                  <a:cubicBezTo>
+                    <a:pt x="777" y="318"/>
+                    <a:pt x="777" y="318"/>
+                    <a:pt x="777" y="318"/>
+                  </a:cubicBezTo>
+                  <a:cubicBezTo>
+                    <a:pt x="785" y="334"/>
+                    <a:pt x="785" y="358"/>
+                    <a:pt x="777" y="374"/>
+                  </a:cubicBezTo>
+                  <a:cubicBezTo>
+                    <a:pt x="609" y="665"/>
+                    <a:pt x="609" y="665"/>
+                    <a:pt x="609" y="665"/>
+                  </a:cubicBezTo>
+                  <a:cubicBezTo>
+                    <a:pt x="600" y="680"/>
+                    <a:pt x="578" y="692"/>
+                    <a:pt x="561" y="692"/>
+                  </a:cubicBezTo>
+                  <a:lnTo>
+                    <a:pt x="225" y="692"/>
+                  </a:lnTo>
+                  <a:close/>
+                </a:path>
+              </a:pathLst>
+            </a:custGeom>
+            <a:noFill/>
+            <a:ln w="28575" cmpd="sng">
+              <a:solidFill>
+                <a:schemeClr val="bg1"/>
+              </a:solidFill>
+            </a:ln>
+          </p:spPr>
+          <p:txBody>
+            <a:bodyPr vert="horz" wrap="square" lIns="91440" tIns="45720" rIns="91440" bIns="45720" numCol="1" anchor="t" anchorCtr="0" compatLnSpc="1">
+              <a:prstTxWarp prst="textNoShape">
+                <a:avLst/>
+              </a:prstTxWarp>
+            </a:bodyPr>
+            <a:lstStyle/>
+            <a:p>
+              <a:pPr marL="0" marR="0" lvl="0" indent="0" algn="l" defTabSz="914400" rtl="0" eaLnBrk="1" fontAlgn="auto" latinLnBrk="0" hangingPunct="1">
+                <a:lnSpc>
+                  <a:spcPct val="100000"/>
+                </a:lnSpc>
+                <a:spcBef>
+                  <a:spcPts val="0"/>
+                </a:spcBef>
+                <a:spcAft>
+                  <a:spcPts val="0"/>
+                </a:spcAft>
+                <a:buClrTx/>
+                <a:buSzTx/>
+                <a:buFontTx/>
+                <a:buNone/>
+                <a:tabLst/>
+                <a:defRPr/>
+              </a:pPr>
+              <a:endParaRPr kumimoji="0" lang="en-US" sz="1800" b="0" i="0" u="none" strike="noStrike" kern="1200" cap="none" spc="0" normalizeH="0" baseline="0" noProof="0">
+                <a:ln>
+                  <a:noFill/>
+                </a:ln>
+                <a:solidFill>
+                  <a:prstClr val="black"/>
+                </a:solidFill>
+                <a:effectLst/>
+                <a:uLnTx/>
+                <a:uFillTx/>
+                <a:latin typeface="Calibri" panose="020F0502020204030204"/>
+                <a:ea typeface="+mn-ea"/>
+                <a:cs typeface="+mn-cs"/>
+              </a:endParaRPr>
+            </a:p>
+          </p:txBody>
+        </p:sp>
+      </p:grpSp>
       <p:sp>
         <p:nvSpPr>
           <p:cNvPr id="3" name="Content Placeholder 2">
             <a:extLst>
               <a:ext uri="{FF2B5EF4-FFF2-40B4-BE49-F238E27FC236}">
-                <a16:creationId xmlns:a16="http://schemas.microsoft.com/office/drawing/2014/main" id="{3EB71C31-D5C0-47DF-8007-3589BBFE1D21}"/>
+                <a16:creationId xmlns:a16="http://schemas.microsoft.com/office/drawing/2014/main" id="{0C46788F-37B7-400B-AC0E-E4E33E027B90}"/>
               </a:ext>
             </a:extLst>
           </p:cNvPr>
@@ -5239,89 +5907,274 @@
             <a:spLocks noGrp="1"/>
           </p:cNvSpPr>
           <p:nvPr>
-            <p:ph idx="1"/>
-          </p:nvPr>
-        </p:nvSpPr>
-        <p:spPr/>
-        <p:txBody>
-          <a:bodyPr/>
+            <p:ph sz="half" idx="1"/>
+          </p:nvPr>
+        </p:nvSpPr>
+        <p:spPr>
+          <a:xfrm>
+            <a:off x="767290" y="3383121"/>
+            <a:ext cx="3582072" cy="2793251"/>
+          </a:xfrm>
+        </p:spPr>
+        <p:txBody>
+          <a:bodyPr vert="horz" lIns="91440" tIns="45720" rIns="91440" bIns="45720" rtlCol="0" anchor="t">
+            <a:normAutofit/>
+          </a:bodyPr>
           <a:lstStyle/>
           <a:p>
             <a:r>
-              <a:rPr lang="en-US" dirty="0"/>
-              <a:t>Idk just jotting down notes: </a:t>
+              <a:rPr lang="en-US" sz="2000" dirty="0">
+                <a:solidFill>
+                  <a:schemeClr val="bg1"/>
+                </a:solidFill>
+              </a:rPr>
+              <a:t>Maximum flow segmentation </a:t>
             </a:r>
           </a:p>
           <a:p>
             <a:pPr lvl="1"/>
             <a:r>
-              <a:rPr lang="en-US" dirty="0"/>
-              <a:t>Clustering methods: </a:t>
-            </a:r>
-            <a:r>
-              <a:rPr lang="en-US" dirty="0" err="1"/>
-              <a:t>Kmeans</a:t>
-            </a:r>
-            <a:r>
-              <a:rPr lang="en-US" dirty="0"/>
-              <a:t>, </a:t>
-            </a:r>
-            <a:r>
-              <a:rPr lang="en-US" dirty="0" err="1"/>
-              <a:t>Meanshift</a:t>
-            </a:r>
-            <a:r>
-              <a:rPr lang="en-US" dirty="0"/>
-              <a:t>, Gaussian Mixtures, </a:t>
-            </a:r>
-            <a:r>
-              <a:rPr lang="en-US" dirty="0" err="1"/>
-              <a:t>etc</a:t>
-            </a:r>
-            <a:endParaRPr lang="en-US" dirty="0"/>
+              <a:rPr lang="en-US" sz="1800" dirty="0">
+                <a:solidFill>
+                  <a:schemeClr val="bg1"/>
+                </a:solidFill>
+              </a:rPr>
+              <a:t>Edmonds-Karp</a:t>
+            </a:r>
           </a:p>
           <a:p>
             <a:pPr lvl="1"/>
             <a:r>
-              <a:rPr lang="en-US" dirty="0"/>
-              <a:t>Deep learning methods: </a:t>
-            </a:r>
-            <a:r>
-              <a:rPr lang="en-US" dirty="0" err="1"/>
-              <a:t>Unet</a:t>
-            </a:r>
-            <a:r>
-              <a:rPr lang="en-US" dirty="0"/>
-              <a:t> (probably not plausible to cover)</a:t>
-            </a:r>
-          </a:p>
-          <a:p>
-            <a:pPr lvl="1"/>
-            <a:r>
-              <a:rPr lang="en-US" dirty="0"/>
-              <a:t> Compression methods: Huffman coding</a:t>
-            </a:r>
-          </a:p>
-          <a:p>
-            <a:pPr lvl="1"/>
-            <a:r>
-              <a:rPr lang="en-US" dirty="0"/>
-              <a:t>Edge-based methods: Active contour model</a:t>
-            </a:r>
-          </a:p>
-          <a:p>
-            <a:pPr lvl="1"/>
-            <a:r>
-              <a:rPr lang="en-US"/>
-              <a:t>Region-based methods Watershed </a:t>
-            </a:r>
-            <a:endParaRPr lang="en-US" dirty="0"/>
-          </a:p>
-          <a:p>
-            <a:pPr lvl="1"/>
-            <a:r>
-              <a:rPr lang="en-US" dirty="0"/>
-              <a:t>Misc. Otsu’s method (binary threshold)</a:t>
+              <a:rPr lang="en-US" sz="1800" dirty="0">
+                <a:solidFill>
+                  <a:schemeClr val="bg1"/>
+                </a:solidFill>
+              </a:rPr>
+              <a:t>Push-Relabel</a:t>
+            </a:r>
+          </a:p>
+        </p:txBody>
+      </p:sp>
+      <p:sp>
+        <p:nvSpPr>
+          <p:cNvPr id="18" name="TextBox 17">
+            <a:extLst>
+              <a:ext uri="{FF2B5EF4-FFF2-40B4-BE49-F238E27FC236}">
+                <a16:creationId xmlns:a16="http://schemas.microsoft.com/office/drawing/2014/main" id="{C7D5C500-5706-40E5-AFC2-2D521DD7C1DF}"/>
+              </a:ext>
+            </a:extLst>
+          </p:cNvPr>
+          <p:cNvSpPr txBox="1"/>
+          <p:nvPr/>
+        </p:nvSpPr>
+        <p:spPr>
+          <a:xfrm>
+            <a:off x="5999197" y="3244133"/>
+            <a:ext cx="4877916" cy="261610"/>
+          </a:xfrm>
+          <a:prstGeom prst="rect">
+            <a:avLst/>
+          </a:prstGeom>
+          <a:noFill/>
+        </p:spPr>
+        <p:txBody>
+          <a:bodyPr wrap="square">
+            <a:spAutoFit/>
+          </a:bodyPr>
+          <a:lstStyle/>
+          <a:p>
+            <a:pPr marL="0" marR="0" lvl="0" indent="0" algn="l" defTabSz="914400" rtl="0" eaLnBrk="1" fontAlgn="auto" latinLnBrk="0" hangingPunct="1">
+              <a:lnSpc>
+                <a:spcPct val="100000"/>
+              </a:lnSpc>
+              <a:spcBef>
+                <a:spcPts val="0"/>
+              </a:spcBef>
+              <a:spcAft>
+                <a:spcPts val="0"/>
+              </a:spcAft>
+              <a:buClrTx/>
+              <a:buSzTx/>
+              <a:buFontTx/>
+              <a:buNone/>
+              <a:tabLst/>
+              <a:defRPr/>
+            </a:pPr>
+            <a:r>
+              <a:rPr kumimoji="0" lang="en-US" sz="1100" b="0" i="0" u="none" strike="noStrike" kern="1200" cap="none" spc="0" normalizeH="0" baseline="0" noProof="0" dirty="0">
+                <a:ln>
+                  <a:noFill/>
+                </a:ln>
+                <a:solidFill>
+                  <a:prstClr val="black"/>
+                </a:solidFill>
+                <a:effectLst/>
+                <a:uLnTx/>
+                <a:uFillTx/>
+                <a:latin typeface="Calibri" panose="020F0502020204030204"/>
+                <a:ea typeface="+mn-ea"/>
+                <a:cs typeface="+mn-cs"/>
+              </a:rPr>
+              <a:t>https://en.wikipedia.org/wiki/File:Push-Relabel_Algorithm_Example_-_Step_9.svg.</a:t>
+            </a:r>
+          </a:p>
+        </p:txBody>
+      </p:sp>
+      <p:pic>
+        <p:nvPicPr>
+          <p:cNvPr id="1026" name="Picture 2" descr="Step 9">
+            <a:extLst>
+              <a:ext uri="{FF2B5EF4-FFF2-40B4-BE49-F238E27FC236}">
+                <a16:creationId xmlns:a16="http://schemas.microsoft.com/office/drawing/2014/main" id="{6099C334-900D-4AAF-8651-44D24673F602}"/>
+              </a:ext>
+            </a:extLst>
+          </p:cNvPr>
+          <p:cNvPicPr>
+            <a:picLocks noChangeAspect="1" noChangeArrowheads="1"/>
+          </p:cNvPicPr>
+          <p:nvPr/>
+        </p:nvPicPr>
+        <p:blipFill>
+          <a:blip r:embed="rId2">
+            <a:extLst>
+              <a:ext uri="{28A0092B-C50C-407E-A947-70E740481C1C}">
+                <a14:useLocalDpi xmlns:a14="http://schemas.microsoft.com/office/drawing/2010/main" val="0"/>
+              </a:ext>
+            </a:extLst>
+          </a:blip>
+          <a:srcRect/>
+          <a:stretch>
+            <a:fillRect/>
+          </a:stretch>
+        </p:blipFill>
+        <p:spPr bwMode="auto">
+          <a:xfrm>
+            <a:off x="6192804" y="299233"/>
+            <a:ext cx="4500939" cy="2944900"/>
+          </a:xfrm>
+          <a:prstGeom prst="rect">
+            <a:avLst/>
+          </a:prstGeom>
+          <a:noFill/>
+          <a:extLst>
+            <a:ext uri="{909E8E84-426E-40DD-AFC4-6F175D3DCCD1}">
+              <a14:hiddenFill xmlns:a14="http://schemas.microsoft.com/office/drawing/2010/main">
+                <a:solidFill>
+                  <a:srgbClr val="FFFFFF"/>
+                </a:solidFill>
+              </a14:hiddenFill>
+            </a:ext>
+          </a:extLst>
+        </p:spPr>
+      </p:pic>
+      <p:pic>
+        <p:nvPicPr>
+          <p:cNvPr id="1028" name="Picture 4">
+            <a:extLst>
+              <a:ext uri="{FF2B5EF4-FFF2-40B4-BE49-F238E27FC236}">
+                <a16:creationId xmlns:a16="http://schemas.microsoft.com/office/drawing/2014/main" id="{0A1CAA01-E42C-4C25-9C9E-6E3D1D8538AE}"/>
+              </a:ext>
+            </a:extLst>
+          </p:cNvPr>
+          <p:cNvPicPr>
+            <a:picLocks noChangeAspect="1" noChangeArrowheads="1"/>
+          </p:cNvPicPr>
+          <p:nvPr/>
+        </p:nvPicPr>
+        <p:blipFill>
+          <a:blip r:embed="rId3">
+            <a:extLst>
+              <a:ext uri="{28A0092B-C50C-407E-A947-70E740481C1C}">
+                <a14:useLocalDpi xmlns:a14="http://schemas.microsoft.com/office/drawing/2010/main" val="0"/>
+              </a:ext>
+            </a:extLst>
+          </a:blip>
+          <a:srcRect/>
+          <a:stretch>
+            <a:fillRect/>
+          </a:stretch>
+        </p:blipFill>
+        <p:spPr bwMode="auto">
+          <a:xfrm>
+            <a:off x="5974831" y="3724455"/>
+            <a:ext cx="4936886" cy="2633006"/>
+          </a:xfrm>
+          <a:prstGeom prst="rect">
+            <a:avLst/>
+          </a:prstGeom>
+          <a:noFill/>
+          <a:extLst>
+            <a:ext uri="{909E8E84-426E-40DD-AFC4-6F175D3DCCD1}">
+              <a14:hiddenFill xmlns:a14="http://schemas.microsoft.com/office/drawing/2010/main">
+                <a:solidFill>
+                  <a:srgbClr val="FFFFFF"/>
+                </a:solidFill>
+              </a14:hiddenFill>
+            </a:ext>
+          </a:extLst>
+        </p:spPr>
+      </p:pic>
+      <p:sp>
+        <p:nvSpPr>
+          <p:cNvPr id="22" name="TextBox 21">
+            <a:extLst>
+              <a:ext uri="{FF2B5EF4-FFF2-40B4-BE49-F238E27FC236}">
+                <a16:creationId xmlns:a16="http://schemas.microsoft.com/office/drawing/2014/main" id="{74C2FB0B-D297-4349-9616-A8B6E428ADBC}"/>
+              </a:ext>
+            </a:extLst>
+          </p:cNvPr>
+          <p:cNvSpPr txBox="1"/>
+          <p:nvPr/>
+        </p:nvSpPr>
+        <p:spPr>
+          <a:xfrm>
+            <a:off x="6096000" y="6357461"/>
+            <a:ext cx="4877916" cy="261610"/>
+          </a:xfrm>
+          <a:prstGeom prst="rect">
+            <a:avLst/>
+          </a:prstGeom>
+          <a:noFill/>
+        </p:spPr>
+        <p:txBody>
+          <a:bodyPr wrap="square">
+            <a:spAutoFit/>
+          </a:bodyPr>
+          <a:lstStyle/>
+          <a:p>
+            <a:pPr marL="0" marR="0" lvl="0" indent="0" algn="l" defTabSz="914400" rtl="0" eaLnBrk="1" fontAlgn="auto" latinLnBrk="0" hangingPunct="1">
+              <a:lnSpc>
+                <a:spcPct val="100000"/>
+              </a:lnSpc>
+              <a:spcBef>
+                <a:spcPts val="0"/>
+              </a:spcBef>
+              <a:spcAft>
+                <a:spcPts val="0"/>
+              </a:spcAft>
+              <a:buClrTx/>
+              <a:buSzTx/>
+              <a:buFontTx/>
+              <a:buNone/>
+              <a:tabLst/>
+              <a:defRPr/>
+            </a:pPr>
+            <a:r>
+              <a:rPr kumimoji="0" lang="en-US" sz="1100" b="0" i="0" u="none" strike="noStrike" kern="1200" cap="none" spc="0" normalizeH="0" baseline="0" noProof="0" dirty="0">
+                <a:ln>
+                  <a:noFill/>
+                </a:ln>
+                <a:solidFill>
+                  <a:prstClr val="black"/>
+                </a:solidFill>
+                <a:effectLst/>
+                <a:uLnTx/>
+                <a:uFillTx/>
+                <a:latin typeface="Calibri" panose="020F0502020204030204"/>
+                <a:ea typeface="+mn-ea"/>
+                <a:cs typeface="+mn-cs"/>
+              </a:rPr>
+              <a:t>https://en.wikipedia.org/wiki/File:Edmonds-Karp_flow_example_4.svg</a:t>
             </a:r>
           </a:p>
         </p:txBody>
@@ -5329,7 +6182,7 @@
     </p:spTree>
     <p:extLst>
       <p:ext uri="{BB962C8B-B14F-4D97-AF65-F5344CB8AC3E}">
-        <p14:creationId xmlns:p14="http://schemas.microsoft.com/office/powerpoint/2010/main" val="3781552176"/>
+        <p14:creationId xmlns:p14="http://schemas.microsoft.com/office/powerpoint/2010/main" val="2913319063"/>
       </p:ext>
     </p:extLst>
   </p:cSld>
@@ -5342,6 +6195,14 @@
 <file path=ppt/slides/slide5.xml><?xml version="1.0" encoding="utf-8"?>
 <p:sld xmlns:a="http://schemas.openxmlformats.org/drawingml/2006/main" xmlns:r="http://schemas.openxmlformats.org/officeDocument/2006/relationships" xmlns:p="http://schemas.openxmlformats.org/presentationml/2006/main">
   <p:cSld>
+    <p:bg>
+      <p:bgPr>
+        <a:solidFill>
+          <a:schemeClr val="bg1"/>
+        </a:solidFill>
+        <a:effectLst/>
+      </p:bgPr>
+    </p:bg>
     <p:spTree>
       <p:nvGrpSpPr>
         <p:cNvPr id="1" name=""/>
@@ -5356,12 +6217,193 @@
           <a:chExt cx="0" cy="0"/>
         </a:xfrm>
       </p:grpSpPr>
+      <p:sp useBgFill="1">
+        <p:nvSpPr>
+          <p:cNvPr id="135" name="Rectangle 134">
+            <a:extLst>
+              <a:ext uri="{FF2B5EF4-FFF2-40B4-BE49-F238E27FC236}">
+                <a16:creationId xmlns:a16="http://schemas.microsoft.com/office/drawing/2014/main" id="{33CD251C-A887-4D2F-925B-FC097198538B}"/>
+              </a:ext>
+              <a:ext uri="{C183D7F6-B498-43B3-948B-1728B52AA6E4}">
+                <adec:decorative xmlns:adec="http://schemas.microsoft.com/office/drawing/2017/decorative" val="1"/>
+              </a:ext>
+            </a:extLst>
+          </p:cNvPr>
+          <p:cNvSpPr>
+            <a:spLocks noGrp="1" noRot="1" noChangeAspect="1" noMove="1" noResize="1" noEditPoints="1" noAdjustHandles="1" noChangeArrowheads="1" noChangeShapeType="1" noTextEdit="1"/>
+          </p:cNvSpPr>
+          <p:nvPr>
+            <p:extLst>
+              <p:ext uri="{386F3935-93C4-4BCD-93E2-E3B085C9AB24}">
+                <p16:designElem xmlns:p16="http://schemas.microsoft.com/office/powerpoint/2015/main" val="1"/>
+              </p:ext>
+            </p:extLst>
+          </p:nvPr>
+        </p:nvSpPr>
+        <p:spPr>
+          <a:xfrm>
+            <a:off x="0" y="0"/>
+            <a:ext cx="12192000" cy="6858000"/>
+          </a:xfrm>
+          <a:prstGeom prst="rect">
+            <a:avLst/>
+          </a:prstGeom>
+          <a:ln>
+            <a:noFill/>
+          </a:ln>
+        </p:spPr>
+        <p:style>
+          <a:lnRef idx="2">
+            <a:schemeClr val="accent1">
+              <a:shade val="50000"/>
+            </a:schemeClr>
+          </a:lnRef>
+          <a:fillRef idx="1">
+            <a:schemeClr val="accent1"/>
+          </a:fillRef>
+          <a:effectRef idx="0">
+            <a:schemeClr val="accent1"/>
+          </a:effectRef>
+          <a:fontRef idx="minor">
+            <a:schemeClr val="lt1"/>
+          </a:fontRef>
+        </p:style>
+        <p:txBody>
+          <a:bodyPr rtlCol="0" anchor="ctr"/>
+          <a:lstStyle/>
+          <a:p>
+            <a:pPr marL="0" marR="0" lvl="0" indent="0" algn="ctr" defTabSz="914400" rtl="0" eaLnBrk="1" fontAlgn="auto" latinLnBrk="0" hangingPunct="1">
+              <a:lnSpc>
+                <a:spcPct val="100000"/>
+              </a:lnSpc>
+              <a:spcBef>
+                <a:spcPts val="0"/>
+              </a:spcBef>
+              <a:spcAft>
+                <a:spcPts val="0"/>
+              </a:spcAft>
+              <a:buClrTx/>
+              <a:buSzTx/>
+              <a:buFontTx/>
+              <a:buNone/>
+              <a:tabLst/>
+              <a:defRPr/>
+            </a:pPr>
+            <a:endParaRPr kumimoji="0" lang="en-US" sz="1800" b="0" i="0" u="none" strike="noStrike" kern="1200" cap="none" spc="0" normalizeH="0" baseline="0" noProof="0">
+              <a:ln>
+                <a:noFill/>
+              </a:ln>
+              <a:solidFill>
+                <a:prstClr val="white"/>
+              </a:solidFill>
+              <a:effectLst/>
+              <a:uLnTx/>
+              <a:uFillTx/>
+              <a:latin typeface="Calibri" panose="020F0502020204030204"/>
+              <a:ea typeface="+mn-ea"/>
+              <a:cs typeface="+mn-cs"/>
+            </a:endParaRPr>
+          </a:p>
+        </p:txBody>
+      </p:sp>
+      <p:sp>
+        <p:nvSpPr>
+          <p:cNvPr id="137" name="Rectangle 136">
+            <a:extLst>
+              <a:ext uri="{FF2B5EF4-FFF2-40B4-BE49-F238E27FC236}">
+                <a16:creationId xmlns:a16="http://schemas.microsoft.com/office/drawing/2014/main" id="{B19D093C-27FB-4032-B282-42C4563F257C}"/>
+              </a:ext>
+              <a:ext uri="{C183D7F6-B498-43B3-948B-1728B52AA6E4}">
+                <adec:decorative xmlns:adec="http://schemas.microsoft.com/office/drawing/2017/decorative" val="1"/>
+              </a:ext>
+            </a:extLst>
+          </p:cNvPr>
+          <p:cNvSpPr>
+            <a:spLocks noGrp="1" noRot="1" noChangeAspect="1" noMove="1" noResize="1" noEditPoints="1" noAdjustHandles="1" noChangeArrowheads="1" noChangeShapeType="1" noTextEdit="1"/>
+          </p:cNvSpPr>
+          <p:nvPr>
+            <p:extLst>
+              <p:ext uri="{386F3935-93C4-4BCD-93E2-E3B085C9AB24}">
+                <p16:designElem xmlns:p16="http://schemas.microsoft.com/office/powerpoint/2015/main" val="1"/>
+              </p:ext>
+            </p:extLst>
+          </p:nvPr>
+        </p:nvSpPr>
+        <p:spPr>
+          <a:xfrm>
+            <a:off x="0" y="0"/>
+            <a:ext cx="4694548" cy="6858000"/>
+          </a:xfrm>
+          <a:prstGeom prst="rect">
+            <a:avLst/>
+          </a:prstGeom>
+          <a:solidFill>
+            <a:schemeClr val="tx1"/>
+          </a:solidFill>
+          <a:ln>
+            <a:noFill/>
+          </a:ln>
+        </p:spPr>
+        <p:style>
+          <a:lnRef idx="2">
+            <a:schemeClr val="accent1">
+              <a:shade val="50000"/>
+            </a:schemeClr>
+          </a:lnRef>
+          <a:fillRef idx="1">
+            <a:schemeClr val="accent1"/>
+          </a:fillRef>
+          <a:effectRef idx="0">
+            <a:schemeClr val="accent1"/>
+          </a:effectRef>
+          <a:fontRef idx="minor">
+            <a:schemeClr val="lt1"/>
+          </a:fontRef>
+        </p:style>
+        <p:txBody>
+          <a:bodyPr rtlCol="0" anchor="ctr"/>
+          <a:lstStyle/>
+          <a:p>
+            <a:pPr marL="0" marR="0" lvl="0" indent="0" algn="ctr" defTabSz="914400" rtl="0" eaLnBrk="1" fontAlgn="auto" latinLnBrk="0" hangingPunct="1">
+              <a:lnSpc>
+                <a:spcPct val="100000"/>
+              </a:lnSpc>
+              <a:spcBef>
+                <a:spcPts val="0"/>
+              </a:spcBef>
+              <a:spcAft>
+                <a:spcPts val="0"/>
+              </a:spcAft>
+              <a:buClrTx/>
+              <a:buSzTx/>
+              <a:buFontTx/>
+              <a:buNone/>
+              <a:tabLst/>
+              <a:defRPr/>
+            </a:pPr>
+            <a:endParaRPr kumimoji="0" lang="en-US" sz="1800" b="0" i="0" u="none" strike="noStrike" kern="1200" cap="none" spc="0" normalizeH="0" baseline="0" noProof="0">
+              <a:ln>
+                <a:noFill/>
+              </a:ln>
+              <a:solidFill>
+                <a:prstClr val="white"/>
+              </a:solidFill>
+              <a:effectLst/>
+              <a:uLnTx/>
+              <a:uFillTx/>
+              <a:latin typeface="Calibri" panose="020F0502020204030204"/>
+              <a:ea typeface="+mn-ea"/>
+              <a:cs typeface="+mn-cs"/>
+            </a:endParaRPr>
+          </a:p>
+        </p:txBody>
+      </p:sp>
       <p:sp>
         <p:nvSpPr>
           <p:cNvPr id="2" name="Title 1">
             <a:extLst>
               <a:ext uri="{FF2B5EF4-FFF2-40B4-BE49-F238E27FC236}">
-                <a16:creationId xmlns:a16="http://schemas.microsoft.com/office/drawing/2014/main" id="{1EF15F91-D945-4584-B48E-FE9D25F644FB}"/>
+                <a16:creationId xmlns:a16="http://schemas.microsoft.com/office/drawing/2014/main" id="{9200BA96-8C2E-42A8-BD1A-F04E623212EF}"/>
               </a:ext>
             </a:extLst>
           </p:cNvPr>
@@ -5372,24 +6414,504 @@
             <p:ph type="title"/>
           </p:nvPr>
         </p:nvSpPr>
-        <p:spPr/>
-        <p:txBody>
-          <a:bodyPr/>
+        <p:spPr>
+          <a:xfrm>
+            <a:off x="767290" y="1780661"/>
+            <a:ext cx="3582073" cy="1463472"/>
+          </a:xfrm>
+        </p:spPr>
+        <p:txBody>
+          <a:bodyPr vert="horz" lIns="91440" tIns="45720" rIns="91440" bIns="45720" rtlCol="0" anchor="t">
+            <a:normAutofit/>
+          </a:bodyPr>
           <a:lstStyle/>
           <a:p>
             <a:r>
-              <a:rPr lang="en-US" dirty="0"/>
-              <a:t>Overview</a:t>
-            </a:r>
-          </a:p>
-        </p:txBody>
-      </p:sp>
+              <a:rPr lang="en-US" sz="3000" kern="1200" dirty="0">
+                <a:solidFill>
+                  <a:schemeClr val="bg1"/>
+                </a:solidFill>
+                <a:latin typeface="+mj-lt"/>
+                <a:ea typeface="+mj-ea"/>
+                <a:cs typeface="+mj-cs"/>
+              </a:rPr>
+              <a:t>Implementation</a:t>
+            </a:r>
+          </a:p>
+        </p:txBody>
+      </p:sp>
+      <p:grpSp>
+        <p:nvGrpSpPr>
+          <p:cNvPr id="139" name="Group 138">
+            <a:extLst>
+              <a:ext uri="{FF2B5EF4-FFF2-40B4-BE49-F238E27FC236}">
+                <a16:creationId xmlns:a16="http://schemas.microsoft.com/office/drawing/2014/main" id="{35EE815E-1BD3-4777-B652-6D98825BF66B}"/>
+              </a:ext>
+              <a:ext uri="{C183D7F6-B498-43B3-948B-1728B52AA6E4}">
+                <adec:decorative xmlns:adec="http://schemas.microsoft.com/office/drawing/2017/decorative" val="1"/>
+              </a:ext>
+            </a:extLst>
+          </p:cNvPr>
+          <p:cNvGrpSpPr>
+            <a:grpSpLocks noGrp="1" noUngrp="1" noRot="1" noChangeAspect="1" noMove="1" noResize="1"/>
+          </p:cNvGrpSpPr>
+          <p:nvPr>
+            <p:extLst>
+              <p:ext uri="{386F3935-93C4-4BCD-93E2-E3B085C9AB24}">
+                <p16:designElem xmlns:p16="http://schemas.microsoft.com/office/powerpoint/2015/main" val="1"/>
+              </p:ext>
+            </p:extLst>
+          </p:nvPr>
+        </p:nvGrpSpPr>
+        <p:grpSpPr>
+          <a:xfrm>
+            <a:off x="767290" y="681628"/>
+            <a:ext cx="1128382" cy="847206"/>
+            <a:chOff x="668003" y="1684057"/>
+            <a:chExt cx="1128382" cy="847206"/>
+          </a:xfrm>
+        </p:grpSpPr>
+        <p:sp>
+          <p:nvSpPr>
+            <p:cNvPr id="140" name="Freeform 5">
+              <a:extLst>
+                <a:ext uri="{FF2B5EF4-FFF2-40B4-BE49-F238E27FC236}">
+                  <a16:creationId xmlns:a16="http://schemas.microsoft.com/office/drawing/2014/main" id="{E6692982-4A7D-4392-87CD-F0CD4B027DDE}"/>
+                </a:ext>
+                <a:ext uri="{C183D7F6-B498-43B3-948B-1728B52AA6E4}">
+                  <adec:decorative xmlns:adec="http://schemas.microsoft.com/office/drawing/2017/decorative" val="1"/>
+                </a:ext>
+              </a:extLst>
+            </p:cNvPr>
+            <p:cNvSpPr>
+              <a:spLocks/>
+            </p:cNvSpPr>
+            <p:nvPr>
+              <p:extLst>
+                <p:ext uri="{386F3935-93C4-4BCD-93E2-E3B085C9AB24}">
+                  <p16:designElem xmlns:p16="http://schemas.microsoft.com/office/powerpoint/2015/main" val="1"/>
+                </p:ext>
+              </p:extLst>
+            </p:nvPr>
+          </p:nvSpPr>
+          <p:spPr bwMode="auto">
+            <a:xfrm>
+              <a:off x="668003" y="1935883"/>
+              <a:ext cx="675351" cy="595380"/>
+            </a:xfrm>
+            <a:custGeom>
+              <a:avLst/>
+              <a:gdLst>
+                <a:gd name="T0" fmla="*/ 225 w 785"/>
+                <a:gd name="T1" fmla="*/ 692 h 692"/>
+                <a:gd name="T2" fmla="*/ 177 w 785"/>
+                <a:gd name="T3" fmla="*/ 665 h 692"/>
+                <a:gd name="T4" fmla="*/ 9 w 785"/>
+                <a:gd name="T5" fmla="*/ 374 h 692"/>
+                <a:gd name="T6" fmla="*/ 9 w 785"/>
+                <a:gd name="T7" fmla="*/ 318 h 692"/>
+                <a:gd name="T8" fmla="*/ 177 w 785"/>
+                <a:gd name="T9" fmla="*/ 27 h 692"/>
+                <a:gd name="T10" fmla="*/ 225 w 785"/>
+                <a:gd name="T11" fmla="*/ 0 h 692"/>
+                <a:gd name="T12" fmla="*/ 561 w 785"/>
+                <a:gd name="T13" fmla="*/ 0 h 692"/>
+                <a:gd name="T14" fmla="*/ 609 w 785"/>
+                <a:gd name="T15" fmla="*/ 27 h 692"/>
+                <a:gd name="T16" fmla="*/ 777 w 785"/>
+                <a:gd name="T17" fmla="*/ 318 h 692"/>
+                <a:gd name="T18" fmla="*/ 777 w 785"/>
+                <a:gd name="T19" fmla="*/ 374 h 692"/>
+                <a:gd name="T20" fmla="*/ 609 w 785"/>
+                <a:gd name="T21" fmla="*/ 665 h 692"/>
+                <a:gd name="T22" fmla="*/ 561 w 785"/>
+                <a:gd name="T23" fmla="*/ 692 h 692"/>
+                <a:gd name="T24" fmla="*/ 225 w 785"/>
+                <a:gd name="T25" fmla="*/ 692 h 692"/>
+              </a:gdLst>
+              <a:ahLst/>
+              <a:cxnLst>
+                <a:cxn ang="0">
+                  <a:pos x="T0" y="T1"/>
+                </a:cxn>
+                <a:cxn ang="0">
+                  <a:pos x="T2" y="T3"/>
+                </a:cxn>
+                <a:cxn ang="0">
+                  <a:pos x="T4" y="T5"/>
+                </a:cxn>
+                <a:cxn ang="0">
+                  <a:pos x="T6" y="T7"/>
+                </a:cxn>
+                <a:cxn ang="0">
+                  <a:pos x="T8" y="T9"/>
+                </a:cxn>
+                <a:cxn ang="0">
+                  <a:pos x="T10" y="T11"/>
+                </a:cxn>
+                <a:cxn ang="0">
+                  <a:pos x="T12" y="T13"/>
+                </a:cxn>
+                <a:cxn ang="0">
+                  <a:pos x="T14" y="T15"/>
+                </a:cxn>
+                <a:cxn ang="0">
+                  <a:pos x="T16" y="T17"/>
+                </a:cxn>
+                <a:cxn ang="0">
+                  <a:pos x="T18" y="T19"/>
+                </a:cxn>
+                <a:cxn ang="0">
+                  <a:pos x="T20" y="T21"/>
+                </a:cxn>
+                <a:cxn ang="0">
+                  <a:pos x="T22" y="T23"/>
+                </a:cxn>
+                <a:cxn ang="0">
+                  <a:pos x="T24" y="T25"/>
+                </a:cxn>
+              </a:cxnLst>
+              <a:rect l="0" t="0" r="r" b="b"/>
+              <a:pathLst>
+                <a:path w="785" h="692">
+                  <a:moveTo>
+                    <a:pt x="225" y="692"/>
+                  </a:moveTo>
+                  <a:cubicBezTo>
+                    <a:pt x="207" y="692"/>
+                    <a:pt x="185" y="680"/>
+                    <a:pt x="177" y="665"/>
+                  </a:cubicBezTo>
+                  <a:cubicBezTo>
+                    <a:pt x="9" y="374"/>
+                    <a:pt x="9" y="374"/>
+                    <a:pt x="9" y="374"/>
+                  </a:cubicBezTo>
+                  <a:cubicBezTo>
+                    <a:pt x="0" y="358"/>
+                    <a:pt x="0" y="334"/>
+                    <a:pt x="9" y="318"/>
+                  </a:cubicBezTo>
+                  <a:cubicBezTo>
+                    <a:pt x="177" y="27"/>
+                    <a:pt x="177" y="27"/>
+                    <a:pt x="177" y="27"/>
+                  </a:cubicBezTo>
+                  <a:cubicBezTo>
+                    <a:pt x="185" y="12"/>
+                    <a:pt x="207" y="0"/>
+                    <a:pt x="225" y="0"/>
+                  </a:cubicBezTo>
+                  <a:cubicBezTo>
+                    <a:pt x="561" y="0"/>
+                    <a:pt x="561" y="0"/>
+                    <a:pt x="561" y="0"/>
+                  </a:cubicBezTo>
+                  <a:cubicBezTo>
+                    <a:pt x="578" y="0"/>
+                    <a:pt x="600" y="12"/>
+                    <a:pt x="609" y="27"/>
+                  </a:cubicBezTo>
+                  <a:cubicBezTo>
+                    <a:pt x="777" y="318"/>
+                    <a:pt x="777" y="318"/>
+                    <a:pt x="777" y="318"/>
+                  </a:cubicBezTo>
+                  <a:cubicBezTo>
+                    <a:pt x="785" y="334"/>
+                    <a:pt x="785" y="358"/>
+                    <a:pt x="777" y="374"/>
+                  </a:cubicBezTo>
+                  <a:cubicBezTo>
+                    <a:pt x="609" y="665"/>
+                    <a:pt x="609" y="665"/>
+                    <a:pt x="609" y="665"/>
+                  </a:cubicBezTo>
+                  <a:cubicBezTo>
+                    <a:pt x="600" y="680"/>
+                    <a:pt x="578" y="692"/>
+                    <a:pt x="561" y="692"/>
+                  </a:cubicBezTo>
+                  <a:lnTo>
+                    <a:pt x="225" y="692"/>
+                  </a:lnTo>
+                  <a:close/>
+                </a:path>
+              </a:pathLst>
+            </a:custGeom>
+            <a:noFill/>
+            <a:ln w="28575" cmpd="sng">
+              <a:solidFill>
+                <a:schemeClr val="bg1"/>
+              </a:solidFill>
+            </a:ln>
+          </p:spPr>
+          <p:txBody>
+            <a:bodyPr vert="horz" wrap="square" lIns="91440" tIns="45720" rIns="91440" bIns="45720" numCol="1" anchor="t" anchorCtr="0" compatLnSpc="1">
+              <a:prstTxWarp prst="textNoShape">
+                <a:avLst/>
+              </a:prstTxWarp>
+            </a:bodyPr>
+            <a:lstStyle/>
+            <a:p>
+              <a:pPr marL="0" marR="0" lvl="0" indent="0" algn="l" defTabSz="914400" rtl="0" eaLnBrk="1" fontAlgn="auto" latinLnBrk="0" hangingPunct="1">
+                <a:lnSpc>
+                  <a:spcPct val="100000"/>
+                </a:lnSpc>
+                <a:spcBef>
+                  <a:spcPts val="0"/>
+                </a:spcBef>
+                <a:spcAft>
+                  <a:spcPts val="0"/>
+                </a:spcAft>
+                <a:buClrTx/>
+                <a:buSzTx/>
+                <a:buFontTx/>
+                <a:buNone/>
+                <a:tabLst/>
+                <a:defRPr/>
+              </a:pPr>
+              <a:endParaRPr kumimoji="0" lang="en-US" sz="1800" b="0" i="0" u="none" strike="noStrike" kern="1200" cap="none" spc="0" normalizeH="0" baseline="0" noProof="0">
+                <a:ln>
+                  <a:noFill/>
+                </a:ln>
+                <a:solidFill>
+                  <a:prstClr val="black"/>
+                </a:solidFill>
+                <a:effectLst/>
+                <a:uLnTx/>
+                <a:uFillTx/>
+                <a:latin typeface="Calibri" panose="020F0502020204030204"/>
+                <a:ea typeface="+mn-ea"/>
+                <a:cs typeface="+mn-cs"/>
+              </a:endParaRPr>
+            </a:p>
+          </p:txBody>
+        </p:sp>
+        <p:sp>
+          <p:nvSpPr>
+            <p:cNvPr id="141" name="Freeform 5">
+              <a:extLst>
+                <a:ext uri="{FF2B5EF4-FFF2-40B4-BE49-F238E27FC236}">
+                  <a16:creationId xmlns:a16="http://schemas.microsoft.com/office/drawing/2014/main" id="{196485F7-F277-4123-AC53-98EA4C858774}"/>
+                </a:ext>
+                <a:ext uri="{C183D7F6-B498-43B3-948B-1728B52AA6E4}">
+                  <adec:decorative xmlns:adec="http://schemas.microsoft.com/office/drawing/2017/decorative" val="1"/>
+                </a:ext>
+              </a:extLst>
+            </p:cNvPr>
+            <p:cNvSpPr>
+              <a:spLocks/>
+            </p:cNvSpPr>
+            <p:nvPr>
+              <p:extLst>
+                <p:ext uri="{386F3935-93C4-4BCD-93E2-E3B085C9AB24}">
+                  <p16:designElem xmlns:p16="http://schemas.microsoft.com/office/powerpoint/2015/main" val="1"/>
+                </p:ext>
+              </p:extLst>
+            </p:nvPr>
+          </p:nvSpPr>
+          <p:spPr bwMode="auto">
+            <a:xfrm>
+              <a:off x="1245893" y="1684057"/>
+              <a:ext cx="550492" cy="485306"/>
+            </a:xfrm>
+            <a:custGeom>
+              <a:avLst/>
+              <a:gdLst>
+                <a:gd name="T0" fmla="*/ 225 w 785"/>
+                <a:gd name="T1" fmla="*/ 692 h 692"/>
+                <a:gd name="T2" fmla="*/ 177 w 785"/>
+                <a:gd name="T3" fmla="*/ 665 h 692"/>
+                <a:gd name="T4" fmla="*/ 9 w 785"/>
+                <a:gd name="T5" fmla="*/ 374 h 692"/>
+                <a:gd name="T6" fmla="*/ 9 w 785"/>
+                <a:gd name="T7" fmla="*/ 318 h 692"/>
+                <a:gd name="T8" fmla="*/ 177 w 785"/>
+                <a:gd name="T9" fmla="*/ 27 h 692"/>
+                <a:gd name="T10" fmla="*/ 225 w 785"/>
+                <a:gd name="T11" fmla="*/ 0 h 692"/>
+                <a:gd name="T12" fmla="*/ 561 w 785"/>
+                <a:gd name="T13" fmla="*/ 0 h 692"/>
+                <a:gd name="T14" fmla="*/ 609 w 785"/>
+                <a:gd name="T15" fmla="*/ 27 h 692"/>
+                <a:gd name="T16" fmla="*/ 777 w 785"/>
+                <a:gd name="T17" fmla="*/ 318 h 692"/>
+                <a:gd name="T18" fmla="*/ 777 w 785"/>
+                <a:gd name="T19" fmla="*/ 374 h 692"/>
+                <a:gd name="T20" fmla="*/ 609 w 785"/>
+                <a:gd name="T21" fmla="*/ 665 h 692"/>
+                <a:gd name="T22" fmla="*/ 561 w 785"/>
+                <a:gd name="T23" fmla="*/ 692 h 692"/>
+                <a:gd name="T24" fmla="*/ 225 w 785"/>
+                <a:gd name="T25" fmla="*/ 692 h 692"/>
+              </a:gdLst>
+              <a:ahLst/>
+              <a:cxnLst>
+                <a:cxn ang="0">
+                  <a:pos x="T0" y="T1"/>
+                </a:cxn>
+                <a:cxn ang="0">
+                  <a:pos x="T2" y="T3"/>
+                </a:cxn>
+                <a:cxn ang="0">
+                  <a:pos x="T4" y="T5"/>
+                </a:cxn>
+                <a:cxn ang="0">
+                  <a:pos x="T6" y="T7"/>
+                </a:cxn>
+                <a:cxn ang="0">
+                  <a:pos x="T8" y="T9"/>
+                </a:cxn>
+                <a:cxn ang="0">
+                  <a:pos x="T10" y="T11"/>
+                </a:cxn>
+                <a:cxn ang="0">
+                  <a:pos x="T12" y="T13"/>
+                </a:cxn>
+                <a:cxn ang="0">
+                  <a:pos x="T14" y="T15"/>
+                </a:cxn>
+                <a:cxn ang="0">
+                  <a:pos x="T16" y="T17"/>
+                </a:cxn>
+                <a:cxn ang="0">
+                  <a:pos x="T18" y="T19"/>
+                </a:cxn>
+                <a:cxn ang="0">
+                  <a:pos x="T20" y="T21"/>
+                </a:cxn>
+                <a:cxn ang="0">
+                  <a:pos x="T22" y="T23"/>
+                </a:cxn>
+                <a:cxn ang="0">
+                  <a:pos x="T24" y="T25"/>
+                </a:cxn>
+              </a:cxnLst>
+              <a:rect l="0" t="0" r="r" b="b"/>
+              <a:pathLst>
+                <a:path w="785" h="692">
+                  <a:moveTo>
+                    <a:pt x="225" y="692"/>
+                  </a:moveTo>
+                  <a:cubicBezTo>
+                    <a:pt x="207" y="692"/>
+                    <a:pt x="185" y="680"/>
+                    <a:pt x="177" y="665"/>
+                  </a:cubicBezTo>
+                  <a:cubicBezTo>
+                    <a:pt x="9" y="374"/>
+                    <a:pt x="9" y="374"/>
+                    <a:pt x="9" y="374"/>
+                  </a:cubicBezTo>
+                  <a:cubicBezTo>
+                    <a:pt x="0" y="358"/>
+                    <a:pt x="0" y="334"/>
+                    <a:pt x="9" y="318"/>
+                  </a:cubicBezTo>
+                  <a:cubicBezTo>
+                    <a:pt x="177" y="27"/>
+                    <a:pt x="177" y="27"/>
+                    <a:pt x="177" y="27"/>
+                  </a:cubicBezTo>
+                  <a:cubicBezTo>
+                    <a:pt x="185" y="12"/>
+                    <a:pt x="207" y="0"/>
+                    <a:pt x="225" y="0"/>
+                  </a:cubicBezTo>
+                  <a:cubicBezTo>
+                    <a:pt x="561" y="0"/>
+                    <a:pt x="561" y="0"/>
+                    <a:pt x="561" y="0"/>
+                  </a:cubicBezTo>
+                  <a:cubicBezTo>
+                    <a:pt x="578" y="0"/>
+                    <a:pt x="600" y="12"/>
+                    <a:pt x="609" y="27"/>
+                  </a:cubicBezTo>
+                  <a:cubicBezTo>
+                    <a:pt x="777" y="318"/>
+                    <a:pt x="777" y="318"/>
+                    <a:pt x="777" y="318"/>
+                  </a:cubicBezTo>
+                  <a:cubicBezTo>
+                    <a:pt x="785" y="334"/>
+                    <a:pt x="785" y="358"/>
+                    <a:pt x="777" y="374"/>
+                  </a:cubicBezTo>
+                  <a:cubicBezTo>
+                    <a:pt x="609" y="665"/>
+                    <a:pt x="609" y="665"/>
+                    <a:pt x="609" y="665"/>
+                  </a:cubicBezTo>
+                  <a:cubicBezTo>
+                    <a:pt x="600" y="680"/>
+                    <a:pt x="578" y="692"/>
+                    <a:pt x="561" y="692"/>
+                  </a:cubicBezTo>
+                  <a:lnTo>
+                    <a:pt x="225" y="692"/>
+                  </a:lnTo>
+                  <a:close/>
+                </a:path>
+              </a:pathLst>
+            </a:custGeom>
+            <a:noFill/>
+            <a:ln w="28575" cmpd="sng">
+              <a:solidFill>
+                <a:schemeClr val="bg1"/>
+              </a:solidFill>
+            </a:ln>
+          </p:spPr>
+          <p:txBody>
+            <a:bodyPr vert="horz" wrap="square" lIns="91440" tIns="45720" rIns="91440" bIns="45720" numCol="1" anchor="t" anchorCtr="0" compatLnSpc="1">
+              <a:prstTxWarp prst="textNoShape">
+                <a:avLst/>
+              </a:prstTxWarp>
+            </a:bodyPr>
+            <a:lstStyle/>
+            <a:p>
+              <a:pPr marL="0" marR="0" lvl="0" indent="0" algn="l" defTabSz="914400" rtl="0" eaLnBrk="1" fontAlgn="auto" latinLnBrk="0" hangingPunct="1">
+                <a:lnSpc>
+                  <a:spcPct val="100000"/>
+                </a:lnSpc>
+                <a:spcBef>
+                  <a:spcPts val="0"/>
+                </a:spcBef>
+                <a:spcAft>
+                  <a:spcPts val="0"/>
+                </a:spcAft>
+                <a:buClrTx/>
+                <a:buSzTx/>
+                <a:buFontTx/>
+                <a:buNone/>
+                <a:tabLst/>
+                <a:defRPr/>
+              </a:pPr>
+              <a:endParaRPr kumimoji="0" lang="en-US" sz="1800" b="0" i="0" u="none" strike="noStrike" kern="1200" cap="none" spc="0" normalizeH="0" baseline="0" noProof="0">
+                <a:ln>
+                  <a:noFill/>
+                </a:ln>
+                <a:solidFill>
+                  <a:prstClr val="black"/>
+                </a:solidFill>
+                <a:effectLst/>
+                <a:uLnTx/>
+                <a:uFillTx/>
+                <a:latin typeface="Calibri" panose="020F0502020204030204"/>
+                <a:ea typeface="+mn-ea"/>
+                <a:cs typeface="+mn-cs"/>
+              </a:endParaRPr>
+            </a:p>
+          </p:txBody>
+        </p:sp>
+      </p:grpSp>
       <p:sp>
         <p:nvSpPr>
           <p:cNvPr id="3" name="Content Placeholder 2">
             <a:extLst>
               <a:ext uri="{FF2B5EF4-FFF2-40B4-BE49-F238E27FC236}">
-                <a16:creationId xmlns:a16="http://schemas.microsoft.com/office/drawing/2014/main" id="{BCB72640-F1EA-4235-8F3E-D10D7F5D042E}"/>
+                <a16:creationId xmlns:a16="http://schemas.microsoft.com/office/drawing/2014/main" id="{0C46788F-37B7-400B-AC0E-E4E33E027B90}"/>
               </a:ext>
             </a:extLst>
           </p:cNvPr>
@@ -5397,22 +6919,426 @@
             <a:spLocks noGrp="1"/>
           </p:cNvSpPr>
           <p:nvPr>
-            <p:ph idx="1"/>
-          </p:nvPr>
-        </p:nvSpPr>
-        <p:spPr/>
-        <p:txBody>
-          <a:bodyPr/>
+            <p:ph sz="half" idx="1"/>
+          </p:nvPr>
+        </p:nvSpPr>
+        <p:spPr>
+          <a:xfrm>
+            <a:off x="767290" y="3383121"/>
+            <a:ext cx="3582072" cy="2793251"/>
+          </a:xfrm>
+        </p:spPr>
+        <p:txBody>
+          <a:bodyPr vert="horz" lIns="91440" tIns="45720" rIns="91440" bIns="45720" rtlCol="0" anchor="t">
+            <a:normAutofit/>
+          </a:bodyPr>
           <a:lstStyle/>
           <a:p>
-            <a:endParaRPr lang="en-US" dirty="0"/>
+            <a:r>
+              <a:rPr lang="en-US" sz="1800" dirty="0">
+                <a:solidFill>
+                  <a:schemeClr val="bg1"/>
+                </a:solidFill>
+              </a:rPr>
+              <a:t>OpenCV (Python, C++)</a:t>
+            </a:r>
+          </a:p>
+          <a:p>
+            <a:r>
+              <a:rPr lang="en-US" sz="1800" dirty="0">
+                <a:solidFill>
+                  <a:schemeClr val="bg1"/>
+                </a:solidFill>
+              </a:rPr>
+              <a:t>Comparison OpenCV’s watershed and </a:t>
+            </a:r>
+            <a:r>
+              <a:rPr lang="en-US" sz="1800" dirty="0" err="1">
+                <a:solidFill>
+                  <a:schemeClr val="bg1"/>
+                </a:solidFill>
+              </a:rPr>
+              <a:t>GrabCut</a:t>
+            </a:r>
+            <a:r>
+              <a:rPr lang="en-US" sz="1800" dirty="0">
+                <a:solidFill>
+                  <a:schemeClr val="bg1"/>
+                </a:solidFill>
+              </a:rPr>
+              <a:t> implementation</a:t>
+            </a:r>
+          </a:p>
+          <a:p>
+            <a:r>
+              <a:rPr lang="en-US" sz="1800" dirty="0">
+                <a:solidFill>
+                  <a:schemeClr val="bg1"/>
+                </a:solidFill>
+              </a:rPr>
+              <a:t>Comparison with Otsu’s method</a:t>
+            </a:r>
+          </a:p>
+          <a:p>
+            <a:r>
+              <a:rPr lang="en-US" sz="1800" dirty="0">
+                <a:solidFill>
+                  <a:schemeClr val="bg1"/>
+                </a:solidFill>
+              </a:rPr>
+              <a:t>Gaussian Mixtures, </a:t>
+            </a:r>
+            <a:r>
+              <a:rPr lang="en-US" sz="1800" dirty="0" err="1">
+                <a:solidFill>
+                  <a:schemeClr val="bg1"/>
+                </a:solidFill>
+              </a:rPr>
+              <a:t>Kmeans</a:t>
+            </a:r>
+            <a:r>
+              <a:rPr lang="en-US" sz="1800" dirty="0">
+                <a:solidFill>
+                  <a:schemeClr val="bg1"/>
+                </a:solidFill>
+              </a:rPr>
+              <a:t> (not sure, just put </a:t>
+            </a:r>
+            <a:r>
+              <a:rPr lang="en-US" sz="1800">
+                <a:solidFill>
+                  <a:schemeClr val="bg1"/>
+                </a:solidFill>
+              </a:rPr>
+              <a:t>this clustering part down for now)</a:t>
+            </a:r>
+            <a:endParaRPr lang="en-US" sz="1800" dirty="0">
+              <a:solidFill>
+                <a:schemeClr val="bg1"/>
+              </a:solidFill>
+            </a:endParaRPr>
+          </a:p>
+        </p:txBody>
+      </p:sp>
+      <p:pic>
+        <p:nvPicPr>
+          <p:cNvPr id="5" name="Picture 4" descr="A picture containing text, weapon, brass knucks&#10;&#10;Description automatically generated">
+            <a:extLst>
+              <a:ext uri="{FF2B5EF4-FFF2-40B4-BE49-F238E27FC236}">
+                <a16:creationId xmlns:a16="http://schemas.microsoft.com/office/drawing/2014/main" id="{DE21CE15-16F0-4080-BF02-9D529C8506DA}"/>
+              </a:ext>
+            </a:extLst>
+          </p:cNvPr>
+          <p:cNvPicPr>
+            <a:picLocks noChangeAspect="1"/>
+          </p:cNvPicPr>
+          <p:nvPr/>
+        </p:nvPicPr>
+        <p:blipFill>
+          <a:blip r:embed="rId2">
+            <a:extLst>
+              <a:ext uri="{28A0092B-C50C-407E-A947-70E740481C1C}">
+                <a14:useLocalDpi xmlns:a14="http://schemas.microsoft.com/office/drawing/2010/main" val="0"/>
+              </a:ext>
+            </a:extLst>
+          </a:blip>
+          <a:stretch>
+            <a:fillRect/>
+          </a:stretch>
+        </p:blipFill>
+        <p:spPr>
+          <a:xfrm>
+            <a:off x="9638497" y="385834"/>
+            <a:ext cx="1714500" cy="2286000"/>
+          </a:xfrm>
+          <a:prstGeom prst="rect">
+            <a:avLst/>
+          </a:prstGeom>
+        </p:spPr>
+      </p:pic>
+      <p:pic>
+        <p:nvPicPr>
+          <p:cNvPr id="7" name="Picture 6" descr="A group of coins&#10;&#10;Description automatically generated with medium confidence">
+            <a:extLst>
+              <a:ext uri="{FF2B5EF4-FFF2-40B4-BE49-F238E27FC236}">
+                <a16:creationId xmlns:a16="http://schemas.microsoft.com/office/drawing/2014/main" id="{9B034A17-AE2B-4006-9516-E5FB092BC41B}"/>
+              </a:ext>
+            </a:extLst>
+          </p:cNvPr>
+          <p:cNvPicPr>
+            <a:picLocks noChangeAspect="1"/>
+          </p:cNvPicPr>
+          <p:nvPr/>
+        </p:nvPicPr>
+        <p:blipFill>
+          <a:blip r:embed="rId3">
+            <a:extLst>
+              <a:ext uri="{28A0092B-C50C-407E-A947-70E740481C1C}">
+                <a14:useLocalDpi xmlns:a14="http://schemas.microsoft.com/office/drawing/2010/main" val="0"/>
+              </a:ext>
+            </a:extLst>
+          </a:blip>
+          <a:stretch>
+            <a:fillRect/>
+          </a:stretch>
+        </p:blipFill>
+        <p:spPr>
+          <a:xfrm>
+            <a:off x="6094609" y="385834"/>
+            <a:ext cx="1714500" cy="2286000"/>
+          </a:xfrm>
+          <a:prstGeom prst="rect">
+            <a:avLst/>
+          </a:prstGeom>
+        </p:spPr>
+      </p:pic>
+      <p:sp>
+        <p:nvSpPr>
+          <p:cNvPr id="17" name="TextBox 16">
+            <a:extLst>
+              <a:ext uri="{FF2B5EF4-FFF2-40B4-BE49-F238E27FC236}">
+                <a16:creationId xmlns:a16="http://schemas.microsoft.com/office/drawing/2014/main" id="{CEE908CE-6FFE-45CF-A559-1CD08F188212}"/>
+              </a:ext>
+            </a:extLst>
+          </p:cNvPr>
+          <p:cNvSpPr txBox="1"/>
+          <p:nvPr/>
+        </p:nvSpPr>
+        <p:spPr>
+          <a:xfrm>
+            <a:off x="6004316" y="2671834"/>
+            <a:ext cx="1714500" cy="261610"/>
+          </a:xfrm>
+          <a:prstGeom prst="rect">
+            <a:avLst/>
+          </a:prstGeom>
+          <a:noFill/>
+        </p:spPr>
+        <p:txBody>
+          <a:bodyPr wrap="square">
+            <a:spAutoFit/>
+          </a:bodyPr>
+          <a:lstStyle/>
+          <a:p>
+            <a:pPr marL="0" marR="0" lvl="0" indent="0" algn="l" defTabSz="914400" rtl="0" eaLnBrk="1" fontAlgn="auto" latinLnBrk="0" hangingPunct="1">
+              <a:lnSpc>
+                <a:spcPct val="100000"/>
+              </a:lnSpc>
+              <a:spcBef>
+                <a:spcPts val="0"/>
+              </a:spcBef>
+              <a:spcAft>
+                <a:spcPts val="0"/>
+              </a:spcAft>
+              <a:buClrTx/>
+              <a:buSzTx/>
+              <a:buFontTx/>
+              <a:buNone/>
+              <a:tabLst/>
+              <a:defRPr/>
+            </a:pPr>
+            <a:r>
+              <a:rPr kumimoji="0" lang="en-US" sz="1100" b="0" i="0" u="none" strike="noStrike" kern="1200" cap="none" spc="0" normalizeH="0" baseline="0" noProof="0" dirty="0">
+                <a:ln>
+                  <a:noFill/>
+                </a:ln>
+                <a:solidFill>
+                  <a:prstClr val="black"/>
+                </a:solidFill>
+                <a:effectLst/>
+                <a:uLnTx/>
+                <a:uFillTx/>
+                <a:latin typeface="Calibri" panose="020F0502020204030204"/>
+                <a:ea typeface="+mn-ea"/>
+                <a:cs typeface="+mn-cs"/>
+              </a:rPr>
+              <a:t>Coins.jpg</a:t>
+            </a:r>
+          </a:p>
+        </p:txBody>
+      </p:sp>
+      <p:sp>
+        <p:nvSpPr>
+          <p:cNvPr id="19" name="TextBox 18">
+            <a:extLst>
+              <a:ext uri="{FF2B5EF4-FFF2-40B4-BE49-F238E27FC236}">
+                <a16:creationId xmlns:a16="http://schemas.microsoft.com/office/drawing/2014/main" id="{D1772A38-9B7C-472A-A019-C37C52EF7159}"/>
+              </a:ext>
+            </a:extLst>
+          </p:cNvPr>
+          <p:cNvSpPr txBox="1"/>
+          <p:nvPr/>
+        </p:nvSpPr>
+        <p:spPr>
+          <a:xfrm>
+            <a:off x="9581053" y="2718000"/>
+            <a:ext cx="1714500" cy="430887"/>
+          </a:xfrm>
+          <a:prstGeom prst="rect">
+            <a:avLst/>
+          </a:prstGeom>
+          <a:noFill/>
+        </p:spPr>
+        <p:txBody>
+          <a:bodyPr wrap="square">
+            <a:spAutoFit/>
+          </a:bodyPr>
+          <a:lstStyle/>
+          <a:p>
+            <a:pPr marL="0" marR="0" lvl="0" indent="0" algn="l" defTabSz="914400" rtl="0" eaLnBrk="1" fontAlgn="auto" latinLnBrk="0" hangingPunct="1">
+              <a:lnSpc>
+                <a:spcPct val="100000"/>
+              </a:lnSpc>
+              <a:spcBef>
+                <a:spcPts val="0"/>
+              </a:spcBef>
+              <a:spcAft>
+                <a:spcPts val="0"/>
+              </a:spcAft>
+              <a:buClrTx/>
+              <a:buSzTx/>
+              <a:buFontTx/>
+              <a:buNone/>
+              <a:tabLst/>
+              <a:defRPr/>
+            </a:pPr>
+            <a:r>
+              <a:rPr lang="en-US" sz="1100" dirty="0">
+                <a:solidFill>
+                  <a:prstClr val="black"/>
+                </a:solidFill>
+                <a:latin typeface="Calibri" panose="020F0502020204030204"/>
+              </a:rPr>
+              <a:t>Coins segmented with OpenCV’s watershed</a:t>
+            </a:r>
+            <a:endParaRPr kumimoji="0" lang="en-US" sz="1100" b="0" i="0" u="none" strike="noStrike" kern="1200" cap="none" spc="0" normalizeH="0" baseline="0" noProof="0" dirty="0">
+              <a:ln>
+                <a:noFill/>
+              </a:ln>
+              <a:solidFill>
+                <a:prstClr val="black"/>
+              </a:solidFill>
+              <a:effectLst/>
+              <a:uLnTx/>
+              <a:uFillTx/>
+              <a:latin typeface="Calibri" panose="020F0502020204030204"/>
+              <a:ea typeface="+mn-ea"/>
+              <a:cs typeface="+mn-cs"/>
+            </a:endParaRPr>
+          </a:p>
+        </p:txBody>
+      </p:sp>
+      <p:pic>
+        <p:nvPicPr>
+          <p:cNvPr id="9" name="Picture 8" descr="A picture containing text&#10;&#10;Description automatically generated">
+            <a:extLst>
+              <a:ext uri="{FF2B5EF4-FFF2-40B4-BE49-F238E27FC236}">
+                <a16:creationId xmlns:a16="http://schemas.microsoft.com/office/drawing/2014/main" id="{5E379CAF-F61D-4992-B90D-0A48CA5FE17A}"/>
+              </a:ext>
+            </a:extLst>
+          </p:cNvPr>
+          <p:cNvPicPr>
+            <a:picLocks noChangeAspect="1"/>
+          </p:cNvPicPr>
+          <p:nvPr/>
+        </p:nvPicPr>
+        <p:blipFill>
+          <a:blip r:embed="rId4">
+            <a:extLst>
+              <a:ext uri="{28A0092B-C50C-407E-A947-70E740481C1C}">
+                <a14:useLocalDpi xmlns:a14="http://schemas.microsoft.com/office/drawing/2010/main" val="0"/>
+              </a:ext>
+            </a:extLst>
+          </a:blip>
+          <a:stretch>
+            <a:fillRect/>
+          </a:stretch>
+        </p:blipFill>
+        <p:spPr>
+          <a:xfrm>
+            <a:off x="7866553" y="390594"/>
+            <a:ext cx="1714500" cy="2286000"/>
+          </a:xfrm>
+          <a:prstGeom prst="rect">
+            <a:avLst/>
+          </a:prstGeom>
+        </p:spPr>
+      </p:pic>
+      <p:sp>
+        <p:nvSpPr>
+          <p:cNvPr id="21" name="TextBox 20">
+            <a:extLst>
+              <a:ext uri="{FF2B5EF4-FFF2-40B4-BE49-F238E27FC236}">
+                <a16:creationId xmlns:a16="http://schemas.microsoft.com/office/drawing/2014/main" id="{D52407FB-B1AB-450B-A346-2C781A6F618C}"/>
+              </a:ext>
+            </a:extLst>
+          </p:cNvPr>
+          <p:cNvSpPr txBox="1"/>
+          <p:nvPr/>
+        </p:nvSpPr>
+        <p:spPr>
+          <a:xfrm>
+            <a:off x="7866553" y="2706868"/>
+            <a:ext cx="1714500" cy="261610"/>
+          </a:xfrm>
+          <a:prstGeom prst="rect">
+            <a:avLst/>
+          </a:prstGeom>
+          <a:noFill/>
+        </p:spPr>
+        <p:txBody>
+          <a:bodyPr wrap="square">
+            <a:spAutoFit/>
+          </a:bodyPr>
+          <a:lstStyle/>
+          <a:p>
+            <a:pPr marL="0" marR="0" lvl="0" indent="0" algn="l" defTabSz="914400" rtl="0" eaLnBrk="1" fontAlgn="auto" latinLnBrk="0" hangingPunct="1">
+              <a:lnSpc>
+                <a:spcPct val="100000"/>
+              </a:lnSpc>
+              <a:spcBef>
+                <a:spcPts val="0"/>
+              </a:spcBef>
+              <a:spcAft>
+                <a:spcPts val="0"/>
+              </a:spcAft>
+              <a:buClrTx/>
+              <a:buSzTx/>
+              <a:buFontTx/>
+              <a:buNone/>
+              <a:tabLst/>
+              <a:defRPr/>
+            </a:pPr>
+            <a:r>
+              <a:rPr lang="en-US" sz="1100" dirty="0">
+                <a:solidFill>
+                  <a:prstClr val="black"/>
+                </a:solidFill>
+                <a:latin typeface="Calibri" panose="020F0502020204030204"/>
+              </a:rPr>
+              <a:t>Otsu’s method</a:t>
+            </a:r>
+            <a:endParaRPr kumimoji="0" lang="en-US" sz="1100" b="0" i="0" u="none" strike="noStrike" kern="1200" cap="none" spc="0" normalizeH="0" baseline="0" noProof="0" dirty="0">
+              <a:ln>
+                <a:noFill/>
+              </a:ln>
+              <a:solidFill>
+                <a:prstClr val="black"/>
+              </a:solidFill>
+              <a:effectLst/>
+              <a:uLnTx/>
+              <a:uFillTx/>
+              <a:latin typeface="Calibri" panose="020F0502020204030204"/>
+              <a:ea typeface="+mn-ea"/>
+              <a:cs typeface="+mn-cs"/>
+            </a:endParaRPr>
           </a:p>
         </p:txBody>
       </p:sp>
     </p:spTree>
     <p:extLst>
       <p:ext uri="{BB962C8B-B14F-4D97-AF65-F5344CB8AC3E}">
-        <p14:creationId xmlns:p14="http://schemas.microsoft.com/office/powerpoint/2010/main" val="3235414937"/>
+        <p14:creationId xmlns:p14="http://schemas.microsoft.com/office/powerpoint/2010/main" val="2084877044"/>
       </p:ext>
     </p:extLst>
   </p:cSld>
@@ -5423,89 +7349,6 @@
 </file>
 
 <file path=ppt/slides/slide6.xml><?xml version="1.0" encoding="utf-8"?>
-<p:sld xmlns:a="http://schemas.openxmlformats.org/drawingml/2006/main" xmlns:r="http://schemas.openxmlformats.org/officeDocument/2006/relationships" xmlns:p="http://schemas.openxmlformats.org/presentationml/2006/main">
-  <p:cSld>
-    <p:spTree>
-      <p:nvGrpSpPr>
-        <p:cNvPr id="1" name=""/>
-        <p:cNvGrpSpPr/>
-        <p:nvPr/>
-      </p:nvGrpSpPr>
-      <p:grpSpPr>
-        <a:xfrm>
-          <a:off x="0" y="0"/>
-          <a:ext cx="0" cy="0"/>
-          <a:chOff x="0" y="0"/>
-          <a:chExt cx="0" cy="0"/>
-        </a:xfrm>
-      </p:grpSpPr>
-      <p:sp>
-        <p:nvSpPr>
-          <p:cNvPr id="2" name="Title 1">
-            <a:extLst>
-              <a:ext uri="{FF2B5EF4-FFF2-40B4-BE49-F238E27FC236}">
-                <a16:creationId xmlns:a16="http://schemas.microsoft.com/office/drawing/2014/main" id="{B2A34987-857F-4E57-ADA0-AB5507E8BEBE}"/>
-              </a:ext>
-            </a:extLst>
-          </p:cNvPr>
-          <p:cNvSpPr>
-            <a:spLocks noGrp="1"/>
-          </p:cNvSpPr>
-          <p:nvPr>
-            <p:ph type="title"/>
-          </p:nvPr>
-        </p:nvSpPr>
-        <p:spPr/>
-        <p:txBody>
-          <a:bodyPr/>
-          <a:lstStyle/>
-          <a:p>
-            <a:r>
-              <a:rPr lang="en-US" dirty="0"/>
-              <a:t>Implementation</a:t>
-            </a:r>
-          </a:p>
-        </p:txBody>
-      </p:sp>
-      <p:sp>
-        <p:nvSpPr>
-          <p:cNvPr id="3" name="Content Placeholder 2">
-            <a:extLst>
-              <a:ext uri="{FF2B5EF4-FFF2-40B4-BE49-F238E27FC236}">
-                <a16:creationId xmlns:a16="http://schemas.microsoft.com/office/drawing/2014/main" id="{8BEEC30E-C1E3-4718-8633-0039E415885A}"/>
-              </a:ext>
-            </a:extLst>
-          </p:cNvPr>
-          <p:cNvSpPr>
-            <a:spLocks noGrp="1"/>
-          </p:cNvSpPr>
-          <p:nvPr>
-            <p:ph idx="1"/>
-          </p:nvPr>
-        </p:nvSpPr>
-        <p:spPr/>
-        <p:txBody>
-          <a:bodyPr/>
-          <a:lstStyle/>
-          <a:p>
-            <a:endParaRPr lang="en-US"/>
-          </a:p>
-        </p:txBody>
-      </p:sp>
-    </p:spTree>
-    <p:extLst>
-      <p:ext uri="{BB962C8B-B14F-4D97-AF65-F5344CB8AC3E}">
-        <p14:creationId xmlns:p14="http://schemas.microsoft.com/office/powerpoint/2010/main" val="348128138"/>
-      </p:ext>
-    </p:extLst>
-  </p:cSld>
-  <p:clrMapOvr>
-    <a:masterClrMapping/>
-  </p:clrMapOvr>
-</p:sld>
-</file>
-
-<file path=ppt/slides/slide7.xml><?xml version="1.0" encoding="utf-8"?>
 <p:sld xmlns:a="http://schemas.openxmlformats.org/drawingml/2006/main" xmlns:r="http://schemas.openxmlformats.org/officeDocument/2006/relationships" xmlns:p="http://schemas.openxmlformats.org/presentationml/2006/main">
   <p:cSld>
     <p:spTree>

</xml_diff>